<commit_message>
[feature] update some content
</commit_message>
<xml_diff>
--- a/Presentation2.pptx
+++ b/Presentation2.pptx
@@ -4,18 +4,29 @@
   <p:sldMasterIdLst>
     <p:sldMasterId id="2147483648" r:id="rId1"/>
   </p:sldMasterIdLst>
+  <p:notesMasterIdLst>
+    <p:notesMasterId r:id="rId21"/>
+  </p:notesMasterIdLst>
   <p:sldIdLst>
     <p:sldId id="256" r:id="rId2"/>
     <p:sldId id="257" r:id="rId3"/>
     <p:sldId id="258" r:id="rId4"/>
-    <p:sldId id="259" r:id="rId5"/>
-    <p:sldId id="260" r:id="rId6"/>
-    <p:sldId id="266" r:id="rId7"/>
-    <p:sldId id="265" r:id="rId8"/>
-    <p:sldId id="261" r:id="rId9"/>
-    <p:sldId id="262" r:id="rId10"/>
-    <p:sldId id="264" r:id="rId11"/>
-    <p:sldId id="263" r:id="rId12"/>
+    <p:sldId id="267" r:id="rId5"/>
+    <p:sldId id="269" r:id="rId6"/>
+    <p:sldId id="268" r:id="rId7"/>
+    <p:sldId id="259" r:id="rId8"/>
+    <p:sldId id="270" r:id="rId9"/>
+    <p:sldId id="271" r:id="rId10"/>
+    <p:sldId id="273" r:id="rId11"/>
+    <p:sldId id="274" r:id="rId12"/>
+    <p:sldId id="275" r:id="rId13"/>
+    <p:sldId id="260" r:id="rId14"/>
+    <p:sldId id="266" r:id="rId15"/>
+    <p:sldId id="265" r:id="rId16"/>
+    <p:sldId id="261" r:id="rId17"/>
+    <p:sldId id="262" r:id="rId18"/>
+    <p:sldId id="264" r:id="rId19"/>
+    <p:sldId id="263" r:id="rId20"/>
   </p:sldIdLst>
   <p:sldSz cx="12192000" cy="6858000"/>
   <p:notesSz cx="6858000" cy="9144000"/>
@@ -120,6 +131,548 @@
     </p:ext>
   </p:extLst>
 </p:presentation>
+</file>
+
+<file path=ppt/notesMasters/notesMaster1.xml><?xml version="1.0" encoding="utf-8"?>
+<p:notesMaster xmlns:a="http://schemas.openxmlformats.org/drawingml/2006/main" xmlns:r="http://schemas.openxmlformats.org/officeDocument/2006/relationships" xmlns:p="http://schemas.openxmlformats.org/presentationml/2006/main">
+  <p:cSld>
+    <p:bg>
+      <p:bgRef idx="1001">
+        <a:schemeClr val="bg1"/>
+      </p:bgRef>
+    </p:bg>
+    <p:spTree>
+      <p:nvGrpSpPr>
+        <p:cNvPr id="1" name=""/>
+        <p:cNvGrpSpPr/>
+        <p:nvPr/>
+      </p:nvGrpSpPr>
+      <p:grpSpPr>
+        <a:xfrm>
+          <a:off x="0" y="0"/>
+          <a:ext cx="0" cy="0"/>
+          <a:chOff x="0" y="0"/>
+          <a:chExt cx="0" cy="0"/>
+        </a:xfrm>
+      </p:grpSpPr>
+      <p:sp>
+        <p:nvSpPr>
+          <p:cNvPr id="2" name="Header Placeholder 1"/>
+          <p:cNvSpPr>
+            <a:spLocks noGrp="1"/>
+          </p:cNvSpPr>
+          <p:nvPr>
+            <p:ph type="hdr" sz="quarter"/>
+          </p:nvPr>
+        </p:nvSpPr>
+        <p:spPr>
+          <a:xfrm>
+            <a:off x="0" y="0"/>
+            <a:ext cx="2971800" cy="458788"/>
+          </a:xfrm>
+          <a:prstGeom prst="rect">
+            <a:avLst/>
+          </a:prstGeom>
+        </p:spPr>
+        <p:txBody>
+          <a:bodyPr vert="horz" lIns="91440" tIns="45720" rIns="91440" bIns="45720" rtlCol="0"/>
+          <a:lstStyle>
+            <a:lvl1pPr algn="l">
+              <a:defRPr sz="1200"/>
+            </a:lvl1pPr>
+          </a:lstStyle>
+          <a:p>
+            <a:endParaRPr lang="en-VN"/>
+          </a:p>
+        </p:txBody>
+      </p:sp>
+      <p:sp>
+        <p:nvSpPr>
+          <p:cNvPr id="3" name="Date Placeholder 2"/>
+          <p:cNvSpPr>
+            <a:spLocks noGrp="1"/>
+          </p:cNvSpPr>
+          <p:nvPr>
+            <p:ph type="dt" idx="1"/>
+          </p:nvPr>
+        </p:nvSpPr>
+        <p:spPr>
+          <a:xfrm>
+            <a:off x="3884613" y="0"/>
+            <a:ext cx="2971800" cy="458788"/>
+          </a:xfrm>
+          <a:prstGeom prst="rect">
+            <a:avLst/>
+          </a:prstGeom>
+        </p:spPr>
+        <p:txBody>
+          <a:bodyPr vert="horz" lIns="91440" tIns="45720" rIns="91440" bIns="45720" rtlCol="0"/>
+          <a:lstStyle>
+            <a:lvl1pPr algn="r">
+              <a:defRPr sz="1200"/>
+            </a:lvl1pPr>
+          </a:lstStyle>
+          <a:p>
+            <a:fld id="{5935F8B8-1294-1043-AED6-D4CF3819FC2D}" type="datetimeFigureOut">
+              <a:rPr lang="en-VN" smtClean="0"/>
+              <a:t>30/3/25</a:t>
+            </a:fld>
+            <a:endParaRPr lang="en-VN"/>
+          </a:p>
+        </p:txBody>
+      </p:sp>
+      <p:sp>
+        <p:nvSpPr>
+          <p:cNvPr id="4" name="Slide Image Placeholder 3"/>
+          <p:cNvSpPr>
+            <a:spLocks noGrp="1" noRot="1" noChangeAspect="1"/>
+          </p:cNvSpPr>
+          <p:nvPr>
+            <p:ph type="sldImg" idx="2"/>
+          </p:nvPr>
+        </p:nvSpPr>
+        <p:spPr>
+          <a:xfrm>
+            <a:off x="685800" y="1143000"/>
+            <a:ext cx="5486400" cy="3086100"/>
+          </a:xfrm>
+          <a:prstGeom prst="rect">
+            <a:avLst/>
+          </a:prstGeom>
+          <a:noFill/>
+          <a:ln w="12700">
+            <a:solidFill>
+              <a:prstClr val="black"/>
+            </a:solidFill>
+          </a:ln>
+        </p:spPr>
+        <p:txBody>
+          <a:bodyPr vert="horz" lIns="91440" tIns="45720" rIns="91440" bIns="45720" rtlCol="0" anchor="ctr"/>
+          <a:lstStyle/>
+          <a:p>
+            <a:endParaRPr lang="en-VN"/>
+          </a:p>
+        </p:txBody>
+      </p:sp>
+      <p:sp>
+        <p:nvSpPr>
+          <p:cNvPr id="5" name="Notes Placeholder 4"/>
+          <p:cNvSpPr>
+            <a:spLocks noGrp="1"/>
+          </p:cNvSpPr>
+          <p:nvPr>
+            <p:ph type="body" sz="quarter" idx="3"/>
+          </p:nvPr>
+        </p:nvSpPr>
+        <p:spPr>
+          <a:xfrm>
+            <a:off x="685800" y="4400550"/>
+            <a:ext cx="5486400" cy="3600450"/>
+          </a:xfrm>
+          <a:prstGeom prst="rect">
+            <a:avLst/>
+          </a:prstGeom>
+        </p:spPr>
+        <p:txBody>
+          <a:bodyPr vert="horz" lIns="91440" tIns="45720" rIns="91440" bIns="45720" rtlCol="0"/>
+          <a:lstStyle/>
+          <a:p>
+            <a:pPr lvl="0"/>
+            <a:r>
+              <a:rPr lang="en-US"/>
+              <a:t>Click to edit Master text styles</a:t>
+            </a:r>
+          </a:p>
+          <a:p>
+            <a:pPr lvl="1"/>
+            <a:r>
+              <a:rPr lang="en-US"/>
+              <a:t>Second level</a:t>
+            </a:r>
+          </a:p>
+          <a:p>
+            <a:pPr lvl="2"/>
+            <a:r>
+              <a:rPr lang="en-US"/>
+              <a:t>Third level</a:t>
+            </a:r>
+          </a:p>
+          <a:p>
+            <a:pPr lvl="3"/>
+            <a:r>
+              <a:rPr lang="en-US"/>
+              <a:t>Fourth level</a:t>
+            </a:r>
+          </a:p>
+          <a:p>
+            <a:pPr lvl="4"/>
+            <a:r>
+              <a:rPr lang="en-US"/>
+              <a:t>Fifth level</a:t>
+            </a:r>
+            <a:endParaRPr lang="en-VN"/>
+          </a:p>
+        </p:txBody>
+      </p:sp>
+      <p:sp>
+        <p:nvSpPr>
+          <p:cNvPr id="6" name="Footer Placeholder 5"/>
+          <p:cNvSpPr>
+            <a:spLocks noGrp="1"/>
+          </p:cNvSpPr>
+          <p:nvPr>
+            <p:ph type="ftr" sz="quarter" idx="4"/>
+          </p:nvPr>
+        </p:nvSpPr>
+        <p:spPr>
+          <a:xfrm>
+            <a:off x="0" y="8685213"/>
+            <a:ext cx="2971800" cy="458787"/>
+          </a:xfrm>
+          <a:prstGeom prst="rect">
+            <a:avLst/>
+          </a:prstGeom>
+        </p:spPr>
+        <p:txBody>
+          <a:bodyPr vert="horz" lIns="91440" tIns="45720" rIns="91440" bIns="45720" rtlCol="0" anchor="b"/>
+          <a:lstStyle>
+            <a:lvl1pPr algn="l">
+              <a:defRPr sz="1200"/>
+            </a:lvl1pPr>
+          </a:lstStyle>
+          <a:p>
+            <a:endParaRPr lang="en-VN"/>
+          </a:p>
+        </p:txBody>
+      </p:sp>
+      <p:sp>
+        <p:nvSpPr>
+          <p:cNvPr id="7" name="Slide Number Placeholder 6"/>
+          <p:cNvSpPr>
+            <a:spLocks noGrp="1"/>
+          </p:cNvSpPr>
+          <p:nvPr>
+            <p:ph type="sldNum" sz="quarter" idx="5"/>
+          </p:nvPr>
+        </p:nvSpPr>
+        <p:spPr>
+          <a:xfrm>
+            <a:off x="3884613" y="8685213"/>
+            <a:ext cx="2971800" cy="458787"/>
+          </a:xfrm>
+          <a:prstGeom prst="rect">
+            <a:avLst/>
+          </a:prstGeom>
+        </p:spPr>
+        <p:txBody>
+          <a:bodyPr vert="horz" lIns="91440" tIns="45720" rIns="91440" bIns="45720" rtlCol="0" anchor="b"/>
+          <a:lstStyle>
+            <a:lvl1pPr algn="r">
+              <a:defRPr sz="1200"/>
+            </a:lvl1pPr>
+          </a:lstStyle>
+          <a:p>
+            <a:fld id="{04F7EF38-B65A-5E42-A2E9-61BA14FDB12C}" type="slidenum">
+              <a:rPr lang="en-VN" smtClean="0"/>
+              <a:t>‹#›</a:t>
+            </a:fld>
+            <a:endParaRPr lang="en-VN"/>
+          </a:p>
+        </p:txBody>
+      </p:sp>
+    </p:spTree>
+    <p:extLst>
+      <p:ext uri="{BB962C8B-B14F-4D97-AF65-F5344CB8AC3E}">
+        <p14:creationId xmlns:p14="http://schemas.microsoft.com/office/powerpoint/2010/main" val="583621133"/>
+      </p:ext>
+    </p:extLst>
+  </p:cSld>
+  <p:clrMap bg1="lt1" tx1="dk1" bg2="lt2" tx2="dk2" accent1="accent1" accent2="accent2" accent3="accent3" accent4="accent4" accent5="accent5" accent6="accent6" hlink="hlink" folHlink="folHlink"/>
+  <p:notesStyle>
+    <a:lvl1pPr marL="0" algn="l" defTabSz="914400" rtl="0" eaLnBrk="1" latinLnBrk="0" hangingPunct="1">
+      <a:defRPr sz="1200" kern="1200">
+        <a:solidFill>
+          <a:schemeClr val="tx1"/>
+        </a:solidFill>
+        <a:latin typeface="+mn-lt"/>
+        <a:ea typeface="+mn-ea"/>
+        <a:cs typeface="+mn-cs"/>
+      </a:defRPr>
+    </a:lvl1pPr>
+    <a:lvl2pPr marL="457200" algn="l" defTabSz="914400" rtl="0" eaLnBrk="1" latinLnBrk="0" hangingPunct="1">
+      <a:defRPr sz="1200" kern="1200">
+        <a:solidFill>
+          <a:schemeClr val="tx1"/>
+        </a:solidFill>
+        <a:latin typeface="+mn-lt"/>
+        <a:ea typeface="+mn-ea"/>
+        <a:cs typeface="+mn-cs"/>
+      </a:defRPr>
+    </a:lvl2pPr>
+    <a:lvl3pPr marL="914400" algn="l" defTabSz="914400" rtl="0" eaLnBrk="1" latinLnBrk="0" hangingPunct="1">
+      <a:defRPr sz="1200" kern="1200">
+        <a:solidFill>
+          <a:schemeClr val="tx1"/>
+        </a:solidFill>
+        <a:latin typeface="+mn-lt"/>
+        <a:ea typeface="+mn-ea"/>
+        <a:cs typeface="+mn-cs"/>
+      </a:defRPr>
+    </a:lvl3pPr>
+    <a:lvl4pPr marL="1371600" algn="l" defTabSz="914400" rtl="0" eaLnBrk="1" latinLnBrk="0" hangingPunct="1">
+      <a:defRPr sz="1200" kern="1200">
+        <a:solidFill>
+          <a:schemeClr val="tx1"/>
+        </a:solidFill>
+        <a:latin typeface="+mn-lt"/>
+        <a:ea typeface="+mn-ea"/>
+        <a:cs typeface="+mn-cs"/>
+      </a:defRPr>
+    </a:lvl4pPr>
+    <a:lvl5pPr marL="1828800" algn="l" defTabSz="914400" rtl="0" eaLnBrk="1" latinLnBrk="0" hangingPunct="1">
+      <a:defRPr sz="1200" kern="1200">
+        <a:solidFill>
+          <a:schemeClr val="tx1"/>
+        </a:solidFill>
+        <a:latin typeface="+mn-lt"/>
+        <a:ea typeface="+mn-ea"/>
+        <a:cs typeface="+mn-cs"/>
+      </a:defRPr>
+    </a:lvl5pPr>
+    <a:lvl6pPr marL="2286000" algn="l" defTabSz="914400" rtl="0" eaLnBrk="1" latinLnBrk="0" hangingPunct="1">
+      <a:defRPr sz="1200" kern="1200">
+        <a:solidFill>
+          <a:schemeClr val="tx1"/>
+        </a:solidFill>
+        <a:latin typeface="+mn-lt"/>
+        <a:ea typeface="+mn-ea"/>
+        <a:cs typeface="+mn-cs"/>
+      </a:defRPr>
+    </a:lvl6pPr>
+    <a:lvl7pPr marL="2743200" algn="l" defTabSz="914400" rtl="0" eaLnBrk="1" latinLnBrk="0" hangingPunct="1">
+      <a:defRPr sz="1200" kern="1200">
+        <a:solidFill>
+          <a:schemeClr val="tx1"/>
+        </a:solidFill>
+        <a:latin typeface="+mn-lt"/>
+        <a:ea typeface="+mn-ea"/>
+        <a:cs typeface="+mn-cs"/>
+      </a:defRPr>
+    </a:lvl7pPr>
+    <a:lvl8pPr marL="3200400" algn="l" defTabSz="914400" rtl="0" eaLnBrk="1" latinLnBrk="0" hangingPunct="1">
+      <a:defRPr sz="1200" kern="1200">
+        <a:solidFill>
+          <a:schemeClr val="tx1"/>
+        </a:solidFill>
+        <a:latin typeface="+mn-lt"/>
+        <a:ea typeface="+mn-ea"/>
+        <a:cs typeface="+mn-cs"/>
+      </a:defRPr>
+    </a:lvl8pPr>
+    <a:lvl9pPr marL="3657600" algn="l" defTabSz="914400" rtl="0" eaLnBrk="1" latinLnBrk="0" hangingPunct="1">
+      <a:defRPr sz="1200" kern="1200">
+        <a:solidFill>
+          <a:schemeClr val="tx1"/>
+        </a:solidFill>
+        <a:latin typeface="+mn-lt"/>
+        <a:ea typeface="+mn-ea"/>
+        <a:cs typeface="+mn-cs"/>
+      </a:defRPr>
+    </a:lvl9pPr>
+  </p:notesStyle>
+</p:notesMaster>
+</file>
+
+<file path=ppt/notesSlides/notesSlide1.xml><?xml version="1.0" encoding="utf-8"?>
+<p:notes xmlns:a="http://schemas.openxmlformats.org/drawingml/2006/main" xmlns:r="http://schemas.openxmlformats.org/officeDocument/2006/relationships" xmlns:p="http://schemas.openxmlformats.org/presentationml/2006/main">
+  <p:cSld>
+    <p:spTree>
+      <p:nvGrpSpPr>
+        <p:cNvPr id="1" name=""/>
+        <p:cNvGrpSpPr/>
+        <p:nvPr/>
+      </p:nvGrpSpPr>
+      <p:grpSpPr>
+        <a:xfrm>
+          <a:off x="0" y="0"/>
+          <a:ext cx="0" cy="0"/>
+          <a:chOff x="0" y="0"/>
+          <a:chExt cx="0" cy="0"/>
+        </a:xfrm>
+      </p:grpSpPr>
+      <p:sp>
+        <p:nvSpPr>
+          <p:cNvPr id="2" name="Slide Image Placeholder 1"/>
+          <p:cNvSpPr>
+            <a:spLocks noGrp="1" noRot="1" noChangeAspect="1"/>
+          </p:cNvSpPr>
+          <p:nvPr>
+            <p:ph type="sldImg"/>
+          </p:nvPr>
+        </p:nvSpPr>
+        <p:spPr/>
+      </p:sp>
+      <p:sp>
+        <p:nvSpPr>
+          <p:cNvPr id="3" name="Notes Placeholder 2"/>
+          <p:cNvSpPr>
+            <a:spLocks noGrp="1"/>
+          </p:cNvSpPr>
+          <p:nvPr>
+            <p:ph type="body" idx="1"/>
+          </p:nvPr>
+        </p:nvSpPr>
+        <p:spPr/>
+        <p:txBody>
+          <a:bodyPr/>
+          <a:lstStyle/>
+          <a:p>
+            <a:endParaRPr lang="en-VN" dirty="0"/>
+          </a:p>
+        </p:txBody>
+      </p:sp>
+      <p:sp>
+        <p:nvSpPr>
+          <p:cNvPr id="4" name="Slide Number Placeholder 3"/>
+          <p:cNvSpPr>
+            <a:spLocks noGrp="1"/>
+          </p:cNvSpPr>
+          <p:nvPr>
+            <p:ph type="sldNum" sz="quarter" idx="5"/>
+          </p:nvPr>
+        </p:nvSpPr>
+        <p:spPr/>
+        <p:txBody>
+          <a:bodyPr/>
+          <a:lstStyle/>
+          <a:p>
+            <a:fld id="{04F7EF38-B65A-5E42-A2E9-61BA14FDB12C}" type="slidenum">
+              <a:rPr lang="en-VN" smtClean="0"/>
+              <a:t>11</a:t>
+            </a:fld>
+            <a:endParaRPr lang="en-VN"/>
+          </a:p>
+        </p:txBody>
+      </p:sp>
+    </p:spTree>
+    <p:extLst>
+      <p:ext uri="{BB962C8B-B14F-4D97-AF65-F5344CB8AC3E}">
+        <p14:creationId xmlns:p14="http://schemas.microsoft.com/office/powerpoint/2010/main" val="3608279642"/>
+      </p:ext>
+    </p:extLst>
+  </p:cSld>
+  <p:clrMapOvr>
+    <a:masterClrMapping/>
+  </p:clrMapOvr>
+</p:notes>
+</file>
+
+<file path=ppt/notesSlides/notesSlide2.xml><?xml version="1.0" encoding="utf-8"?>
+<p:notes xmlns:a="http://schemas.openxmlformats.org/drawingml/2006/main" xmlns:r="http://schemas.openxmlformats.org/officeDocument/2006/relationships" xmlns:p="http://schemas.openxmlformats.org/presentationml/2006/main">
+  <p:cSld>
+    <p:spTree>
+      <p:nvGrpSpPr>
+        <p:cNvPr id="1" name="">
+          <a:extLst>
+            <a:ext uri="{FF2B5EF4-FFF2-40B4-BE49-F238E27FC236}">
+              <a16:creationId xmlns:a16="http://schemas.microsoft.com/office/drawing/2014/main" id="{E483CBE5-220A-7DA9-3C11-9B802044885F}"/>
+            </a:ext>
+          </a:extLst>
+        </p:cNvPr>
+        <p:cNvGrpSpPr/>
+        <p:nvPr/>
+      </p:nvGrpSpPr>
+      <p:grpSpPr>
+        <a:xfrm>
+          <a:off x="0" y="0"/>
+          <a:ext cx="0" cy="0"/>
+          <a:chOff x="0" y="0"/>
+          <a:chExt cx="0" cy="0"/>
+        </a:xfrm>
+      </p:grpSpPr>
+      <p:sp>
+        <p:nvSpPr>
+          <p:cNvPr id="2" name="Slide Image Placeholder 1">
+            <a:extLst>
+              <a:ext uri="{FF2B5EF4-FFF2-40B4-BE49-F238E27FC236}">
+                <a16:creationId xmlns:a16="http://schemas.microsoft.com/office/drawing/2014/main" id="{22D5DB50-FA3A-0D5E-A6D2-5939AB4FB3CE}"/>
+              </a:ext>
+            </a:extLst>
+          </p:cNvPr>
+          <p:cNvSpPr>
+            <a:spLocks noGrp="1" noRot="1" noChangeAspect="1"/>
+          </p:cNvSpPr>
+          <p:nvPr>
+            <p:ph type="sldImg"/>
+          </p:nvPr>
+        </p:nvSpPr>
+        <p:spPr/>
+      </p:sp>
+      <p:sp>
+        <p:nvSpPr>
+          <p:cNvPr id="3" name="Notes Placeholder 2">
+            <a:extLst>
+              <a:ext uri="{FF2B5EF4-FFF2-40B4-BE49-F238E27FC236}">
+                <a16:creationId xmlns:a16="http://schemas.microsoft.com/office/drawing/2014/main" id="{6D5016C9-A9BE-6A4F-CF37-F34263C4D644}"/>
+              </a:ext>
+            </a:extLst>
+          </p:cNvPr>
+          <p:cNvSpPr>
+            <a:spLocks noGrp="1"/>
+          </p:cNvSpPr>
+          <p:nvPr>
+            <p:ph type="body" idx="1"/>
+          </p:nvPr>
+        </p:nvSpPr>
+        <p:spPr/>
+        <p:txBody>
+          <a:bodyPr/>
+          <a:lstStyle/>
+          <a:p>
+            <a:endParaRPr lang="en-VN" dirty="0"/>
+          </a:p>
+        </p:txBody>
+      </p:sp>
+      <p:sp>
+        <p:nvSpPr>
+          <p:cNvPr id="4" name="Slide Number Placeholder 3">
+            <a:extLst>
+              <a:ext uri="{FF2B5EF4-FFF2-40B4-BE49-F238E27FC236}">
+                <a16:creationId xmlns:a16="http://schemas.microsoft.com/office/drawing/2014/main" id="{4F3ABE54-7CC9-9434-A87F-38B0C1608274}"/>
+              </a:ext>
+            </a:extLst>
+          </p:cNvPr>
+          <p:cNvSpPr>
+            <a:spLocks noGrp="1"/>
+          </p:cNvSpPr>
+          <p:nvPr>
+            <p:ph type="sldNum" sz="quarter" idx="5"/>
+          </p:nvPr>
+        </p:nvSpPr>
+        <p:spPr/>
+        <p:txBody>
+          <a:bodyPr/>
+          <a:lstStyle/>
+          <a:p>
+            <a:fld id="{04F7EF38-B65A-5E42-A2E9-61BA14FDB12C}" type="slidenum">
+              <a:rPr lang="en-VN" smtClean="0"/>
+              <a:t>12</a:t>
+            </a:fld>
+            <a:endParaRPr lang="en-VN"/>
+          </a:p>
+        </p:txBody>
+      </p:sp>
+    </p:spTree>
+    <p:extLst>
+      <p:ext uri="{BB962C8B-B14F-4D97-AF65-F5344CB8AC3E}">
+        <p14:creationId xmlns:p14="http://schemas.microsoft.com/office/powerpoint/2010/main" val="2560516935"/>
+      </p:ext>
+    </p:extLst>
+  </p:cSld>
+  <p:clrMapOvr>
+    <a:masterClrMapping/>
+  </p:clrMapOvr>
+</p:notes>
 </file>
 
 <file path=ppt/slideLayouts/slideLayout1.xml><?xml version="1.0" encoding="utf-8"?>
@@ -3687,7 +4240,7 @@
         <p:cNvPr id="1" name="">
           <a:extLst>
             <a:ext uri="{FF2B5EF4-FFF2-40B4-BE49-F238E27FC236}">
-              <a16:creationId xmlns:a16="http://schemas.microsoft.com/office/drawing/2014/main" id="{2ECF9B82-9092-53D2-22A8-178930CB4388}"/>
+              <a16:creationId xmlns:a16="http://schemas.microsoft.com/office/drawing/2014/main" id="{96ED2C2D-44AE-3A12-C24B-64E84B018B25}"/>
             </a:ext>
           </a:extLst>
         </p:cNvPr>
@@ -3707,7 +4260,7 @@
           <p:cNvPr id="2" name="Title 1">
             <a:extLst>
               <a:ext uri="{FF2B5EF4-FFF2-40B4-BE49-F238E27FC236}">
-                <a16:creationId xmlns:a16="http://schemas.microsoft.com/office/drawing/2014/main" id="{1834C7CA-DCA9-F8DB-304C-F3E5D5BBD283}"/>
+                <a16:creationId xmlns:a16="http://schemas.microsoft.com/office/drawing/2014/main" id="{3C209ADD-C83B-DBBA-1A14-1758CF036839}"/>
               </a:ext>
             </a:extLst>
           </p:cNvPr>
@@ -3720,8 +4273,8 @@
         </p:nvSpPr>
         <p:spPr>
           <a:xfrm>
-            <a:off x="1451579" y="1096069"/>
-            <a:ext cx="9603275" cy="721351"/>
+            <a:off x="1451579" y="839244"/>
+            <a:ext cx="9603275" cy="1014510"/>
           </a:xfrm>
         </p:spPr>
         <p:txBody>
@@ -3732,7 +4285,7 @@
           <a:p>
             <a:pPr algn="ctr"/>
             <a:r>
-              <a:rPr lang="en-US" b="1" i="0" u="none" strike="noStrike" dirty="0">
+              <a:rPr lang="en-US" sz="3200" b="1" i="0" u="none" strike="noStrike" dirty="0">
                 <a:solidFill>
                   <a:srgbClr val="000000"/>
                 </a:solidFill>
@@ -3740,9 +4293,30 @@
                 <a:latin typeface="Calibri" panose="020F0502020204030204" pitchFamily="34" charset="0"/>
                 <a:cs typeface="Calibri" panose="020F0502020204030204" pitchFamily="34" charset="0"/>
               </a:rPr>
-              <a:t>Ref</a:t>
-            </a:r>
-            <a:endParaRPr lang="en-US" b="0" i="0" u="none" strike="noStrike" dirty="0">
+              <a:t>Incremental Hydration </a:t>
+            </a:r>
+            <a:br>
+              <a:rPr lang="en-US" sz="3200" b="1" i="0" u="none" strike="noStrike" dirty="0">
+                <a:solidFill>
+                  <a:srgbClr val="000000"/>
+                </a:solidFill>
+                <a:effectLst/>
+                <a:latin typeface="Calibri" panose="020F0502020204030204" pitchFamily="34" charset="0"/>
+                <a:cs typeface="Calibri" panose="020F0502020204030204" pitchFamily="34" charset="0"/>
+              </a:rPr>
+            </a:br>
+            <a:r>
+              <a:rPr lang="en-US" sz="3200" b="1" i="0" u="none" strike="noStrike" dirty="0">
+                <a:solidFill>
+                  <a:srgbClr val="000000"/>
+                </a:solidFill>
+                <a:effectLst/>
+                <a:latin typeface="Calibri" panose="020F0502020204030204" pitchFamily="34" charset="0"/>
+                <a:cs typeface="Calibri" panose="020F0502020204030204" pitchFamily="34" charset="0"/>
+              </a:rPr>
+              <a:t>(Developer Preview)</a:t>
+            </a:r>
+            <a:endParaRPr lang="en-US" sz="3200" b="0" i="0" u="none" strike="noStrike" dirty="0">
               <a:solidFill>
                 <a:srgbClr val="000000"/>
               </a:solidFill>
@@ -3758,7 +4332,7 @@
           <p:cNvPr id="3" name="Content Placeholder 2">
             <a:extLst>
               <a:ext uri="{FF2B5EF4-FFF2-40B4-BE49-F238E27FC236}">
-                <a16:creationId xmlns:a16="http://schemas.microsoft.com/office/drawing/2014/main" id="{8B413D6F-0F6A-A21E-2870-29F22A11001E}"/>
+                <a16:creationId xmlns:a16="http://schemas.microsoft.com/office/drawing/2014/main" id="{420BB563-47F9-2AE0-6CDC-CF099E20649F}"/>
               </a:ext>
             </a:extLst>
           </p:cNvPr>
@@ -3776,89 +4350,105 @@
           </a:bodyPr>
           <a:lstStyle/>
           <a:p>
+            <a:pPr marL="0" indent="0" algn="l">
+              <a:buNone/>
+            </a:pPr>
+            <a:r>
+              <a:rPr lang="en-US" sz="2400" b="1" dirty="0">
+                <a:latin typeface="Calibri" panose="020F0502020204030204" pitchFamily="34" charset="0"/>
+                <a:cs typeface="Calibri" panose="020F0502020204030204" pitchFamily="34" charset="0"/>
+              </a:rPr>
+              <a:t>Incremental Hydration history</a:t>
+            </a:r>
+          </a:p>
+          <a:p>
             <a:pPr algn="l">
-              <a:buFont typeface="Arial" panose="020B0604020202020204" pitchFamily="34" charset="0"/>
-              <a:buChar char="•"/>
+              <a:buFont typeface="Wingdings" pitchFamily="2" charset="2"/>
+              <a:buChar char="v"/>
             </a:pPr>
             <a:r>
-              <a:rPr lang="en-US" dirty="0">
-                <a:latin typeface="Calibri" panose="020F0502020204030204" pitchFamily="34" charset="0"/>
-                <a:cs typeface="Calibri" panose="020F0502020204030204" pitchFamily="34" charset="0"/>
-                <a:hlinkClick r:id="rId2">
-                  <a:extLst>
-                    <a:ext uri="{A12FA001-AC4F-418D-AE19-62706E023703}">
-                      <ahyp:hlinkClr xmlns:ahyp="http://schemas.microsoft.com/office/drawing/2018/hyperlinkcolor" val="tx"/>
-                    </a:ext>
-                  </a:extLst>
-                </a:hlinkClick>
-              </a:rPr>
-              <a:t>https://blog.angular.dev/angular-v18-is-now-available-e79d5ac0affe</a:t>
-            </a:r>
-            <a:endParaRPr lang="en-US" dirty="0">
+              <a:rPr lang="en-US" sz="2000" b="1" dirty="0">
+                <a:latin typeface="Calibri" panose="020F0502020204030204" pitchFamily="34" charset="0"/>
+                <a:cs typeface="Calibri" panose="020F0502020204030204" pitchFamily="34" charset="0"/>
+              </a:rPr>
+              <a:t> Full Application Hydration:</a:t>
+            </a:r>
+            <a:r>
+              <a:rPr lang="en-US" sz="2000" dirty="0">
+                <a:latin typeface="Calibri" panose="020F0502020204030204" pitchFamily="34" charset="0"/>
+                <a:cs typeface="Calibri" panose="020F0502020204030204" pitchFamily="34" charset="0"/>
+              </a:rPr>
+              <a:t> This ensures that server-rendered HTML is reused when the app bootstraps on the client side.</a:t>
+            </a:r>
+          </a:p>
+          <a:p>
+            <a:pPr algn="l">
+              <a:buFont typeface="Wingdings" pitchFamily="2" charset="2"/>
+              <a:buChar char="v"/>
+            </a:pPr>
+            <a:r>
+              <a:rPr lang="en-US" sz="2000" b="1" dirty="0">
+                <a:latin typeface="Calibri" panose="020F0502020204030204" pitchFamily="34" charset="0"/>
+                <a:cs typeface="Calibri" panose="020F0502020204030204" pitchFamily="34" charset="0"/>
+              </a:rPr>
+              <a:t> Defer:</a:t>
+            </a:r>
+            <a:r>
+              <a:rPr lang="en-US" sz="2000" dirty="0">
+                <a:latin typeface="Calibri" panose="020F0502020204030204" pitchFamily="34" charset="0"/>
+                <a:cs typeface="Calibri" panose="020F0502020204030204" pitchFamily="34" charset="0"/>
+              </a:rPr>
+              <a:t> To delay the loading of app chunks.</a:t>
+            </a:r>
+          </a:p>
+          <a:p>
+            <a:pPr algn="l">
+              <a:buFont typeface="Wingdings" pitchFamily="2" charset="2"/>
+              <a:buChar char="v"/>
+            </a:pPr>
+            <a:r>
+              <a:rPr lang="en-US" sz="2000" b="1" dirty="0">
+                <a:latin typeface="Calibri" panose="020F0502020204030204" pitchFamily="34" charset="0"/>
+                <a:cs typeface="Calibri" panose="020F0502020204030204" pitchFamily="34" charset="0"/>
+              </a:rPr>
+              <a:t> </a:t>
+            </a:r>
+            <a:r>
+              <a:rPr lang="en-US" sz="2000" b="1" dirty="0" err="1">
+                <a:latin typeface="Calibri" panose="020F0502020204030204" pitchFamily="34" charset="0"/>
+                <a:cs typeface="Calibri" panose="020F0502020204030204" pitchFamily="34" charset="0"/>
+              </a:rPr>
+              <a:t>eventReplay</a:t>
+            </a:r>
+            <a:r>
+              <a:rPr lang="en-US" sz="2000" b="1" dirty="0">
+                <a:latin typeface="Calibri" panose="020F0502020204030204" pitchFamily="34" charset="0"/>
+                <a:cs typeface="Calibri" panose="020F0502020204030204" pitchFamily="34" charset="0"/>
+              </a:rPr>
+              <a:t>:</a:t>
+            </a:r>
+            <a:r>
+              <a:rPr lang="en-US" sz="2000" dirty="0">
+                <a:latin typeface="Calibri" panose="020F0502020204030204" pitchFamily="34" charset="0"/>
+                <a:cs typeface="Calibri" panose="020F0502020204030204" pitchFamily="34" charset="0"/>
+              </a:rPr>
+              <a:t> To ensure that no user interactions are lost when hydration finishes.</a:t>
+            </a:r>
+            <a:endParaRPr lang="en-US" sz="2400" b="0" i="0" u="none" strike="noStrike" dirty="0">
+              <a:solidFill>
+                <a:srgbClr val="000000"/>
+              </a:solidFill>
+              <a:effectLst/>
               <a:latin typeface="Calibri" panose="020F0502020204030204" pitchFamily="34" charset="0"/>
               <a:cs typeface="Calibri" panose="020F0502020204030204" pitchFamily="34" charset="0"/>
             </a:endParaRPr>
           </a:p>
-          <a:p>
-            <a:pPr algn="l">
-              <a:buFont typeface="Arial" panose="020B0604020202020204" pitchFamily="34" charset="0"/>
-              <a:buChar char="•"/>
-            </a:pPr>
-            <a:r>
-              <a:rPr lang="en-US" dirty="0">
-                <a:latin typeface="Calibri" panose="020F0502020204030204" pitchFamily="34" charset="0"/>
-                <a:cs typeface="Calibri" panose="020F0502020204030204" pitchFamily="34" charset="0"/>
-                <a:hlinkClick r:id="rId3">
-                  <a:extLst>
-                    <a:ext uri="{A12FA001-AC4F-418D-AE19-62706E023703}">
-                      <ahyp:hlinkClr xmlns:ahyp="http://schemas.microsoft.com/office/drawing/2018/hyperlinkcolor" val="tx"/>
-                    </a:ext>
-                  </a:extLst>
-                </a:hlinkClick>
-              </a:rPr>
-              <a:t>https://blog.angular.dev/meet-angular-v19-7b29dfd05b8</a:t>
-            </a:r>
-            <a:r>
-              <a:rPr lang="en-US" dirty="0">
-                <a:latin typeface="Calibri" panose="020F0502020204030204" pitchFamily="34" charset="0"/>
-                <a:cs typeface="Calibri" panose="020F0502020204030204" pitchFamily="34" charset="0"/>
-              </a:rPr>
-              <a:t>4</a:t>
-            </a:r>
-          </a:p>
-          <a:p>
-            <a:pPr algn="l">
-              <a:buFont typeface="Arial" panose="020B0604020202020204" pitchFamily="34" charset="0"/>
-              <a:buChar char="•"/>
-            </a:pPr>
-            <a:r>
-              <a:rPr lang="en-US" dirty="0">
-                <a:latin typeface="Calibri" panose="020F0502020204030204" pitchFamily="34" charset="0"/>
-                <a:cs typeface="Calibri" panose="020F0502020204030204" pitchFamily="34" charset="0"/>
-              </a:rPr>
-              <a:t>https://</a:t>
-            </a:r>
-            <a:r>
-              <a:rPr lang="en-US" dirty="0" err="1">
-                <a:latin typeface="Calibri" panose="020F0502020204030204" pitchFamily="34" charset="0"/>
-                <a:cs typeface="Calibri" panose="020F0502020204030204" pitchFamily="34" charset="0"/>
-              </a:rPr>
-              <a:t>angular.dev</a:t>
-            </a:r>
-            <a:r>
-              <a:rPr lang="en-US" dirty="0">
-                <a:latin typeface="Calibri" panose="020F0502020204030204" pitchFamily="34" charset="0"/>
-                <a:cs typeface="Calibri" panose="020F0502020204030204" pitchFamily="34" charset="0"/>
-              </a:rPr>
-              <a:t>/overview</a:t>
-            </a:r>
-          </a:p>
         </p:txBody>
       </p:sp>
     </p:spTree>
     <p:extLst>
       <p:ext uri="{BB962C8B-B14F-4D97-AF65-F5344CB8AC3E}">
-        <p14:creationId xmlns:p14="http://schemas.microsoft.com/office/powerpoint/2010/main" val="1666678009"/>
+        <p14:creationId xmlns:p14="http://schemas.microsoft.com/office/powerpoint/2010/main" val="2590852739"/>
       </p:ext>
     </p:extLst>
   </p:cSld>
@@ -3876,7 +4466,7 @@
         <p:cNvPr id="1" name="">
           <a:extLst>
             <a:ext uri="{FF2B5EF4-FFF2-40B4-BE49-F238E27FC236}">
-              <a16:creationId xmlns:a16="http://schemas.microsoft.com/office/drawing/2014/main" id="{971A5A9E-4464-64B4-FA67-16239C268A84}"/>
+              <a16:creationId xmlns:a16="http://schemas.microsoft.com/office/drawing/2014/main" id="{8A95C4F9-2BA5-C5A1-155A-12C488DA4316}"/>
             </a:ext>
           </a:extLst>
         </p:cNvPr>
@@ -3896,7 +4486,7 @@
           <p:cNvPr id="2" name="Title 1">
             <a:extLst>
               <a:ext uri="{FF2B5EF4-FFF2-40B4-BE49-F238E27FC236}">
-                <a16:creationId xmlns:a16="http://schemas.microsoft.com/office/drawing/2014/main" id="{C661B73E-5610-1798-5B96-D13F088E64D6}"/>
+                <a16:creationId xmlns:a16="http://schemas.microsoft.com/office/drawing/2014/main" id="{75B74215-16D3-7BD5-966B-6DADF354C66F}"/>
               </a:ext>
             </a:extLst>
           </p:cNvPr>
@@ -3909,8 +4499,8 @@
         </p:nvSpPr>
         <p:spPr>
           <a:xfrm>
-            <a:off x="1451579" y="1096069"/>
-            <a:ext cx="9603275" cy="721351"/>
+            <a:off x="1451579" y="839244"/>
+            <a:ext cx="9603275" cy="1014510"/>
           </a:xfrm>
         </p:spPr>
         <p:txBody>
@@ -3921,7 +4511,7 @@
           <a:p>
             <a:pPr algn="ctr"/>
             <a:r>
-              <a:rPr lang="en-US" b="1" i="0" u="none" strike="noStrike" dirty="0">
+              <a:rPr lang="en-US" sz="3200" b="1" i="0" u="none" strike="noStrike" dirty="0">
                 <a:solidFill>
                   <a:srgbClr val="000000"/>
                 </a:solidFill>
@@ -3929,9 +4519,30 @@
                 <a:latin typeface="Calibri" panose="020F0502020204030204" pitchFamily="34" charset="0"/>
                 <a:cs typeface="Calibri" panose="020F0502020204030204" pitchFamily="34" charset="0"/>
               </a:rPr>
-              <a:t>Angular 18 &amp; 19</a:t>
-            </a:r>
-            <a:endParaRPr lang="en-US" b="0" i="0" u="none" strike="noStrike" dirty="0">
+              <a:t>Incremental Hydration </a:t>
+            </a:r>
+            <a:br>
+              <a:rPr lang="en-US" sz="3200" b="1" i="0" u="none" strike="noStrike" dirty="0">
+                <a:solidFill>
+                  <a:srgbClr val="000000"/>
+                </a:solidFill>
+                <a:effectLst/>
+                <a:latin typeface="Calibri" panose="020F0502020204030204" pitchFamily="34" charset="0"/>
+                <a:cs typeface="Calibri" panose="020F0502020204030204" pitchFamily="34" charset="0"/>
+              </a:rPr>
+            </a:br>
+            <a:r>
+              <a:rPr lang="en-US" sz="3200" b="1" i="0" u="none" strike="noStrike" dirty="0">
+                <a:solidFill>
+                  <a:srgbClr val="000000"/>
+                </a:solidFill>
+                <a:effectLst/>
+                <a:latin typeface="Calibri" panose="020F0502020204030204" pitchFamily="34" charset="0"/>
+                <a:cs typeface="Calibri" panose="020F0502020204030204" pitchFamily="34" charset="0"/>
+              </a:rPr>
+              <a:t>(Developer Preview)</a:t>
+            </a:r>
+            <a:endParaRPr lang="en-US" sz="3200" b="0" i="0" u="none" strike="noStrike" dirty="0">
               <a:solidFill>
                 <a:srgbClr val="000000"/>
               </a:solidFill>
@@ -3947,7 +4558,7 @@
           <p:cNvPr id="3" name="Content Placeholder 2">
             <a:extLst>
               <a:ext uri="{FF2B5EF4-FFF2-40B4-BE49-F238E27FC236}">
-                <a16:creationId xmlns:a16="http://schemas.microsoft.com/office/drawing/2014/main" id="{EDD13A85-C35B-D3FE-EB7C-3E657D8162E8}"/>
+                <a16:creationId xmlns:a16="http://schemas.microsoft.com/office/drawing/2014/main" id="{0B8C10C9-F894-67E1-4C95-9AD65E25BE91}"/>
               </a:ext>
             </a:extLst>
           </p:cNvPr>
@@ -3960,24 +4571,140 @@
         </p:nvSpPr>
         <p:spPr/>
         <p:txBody>
-          <a:bodyPr anchor="ctr">
+          <a:bodyPr>
             <a:normAutofit/>
           </a:bodyPr>
           <a:lstStyle/>
           <a:p>
-            <a:pPr marL="0" indent="0" algn="ctr">
+            <a:pPr marL="0" indent="0" algn="l">
               <a:buNone/>
             </a:pPr>
             <a:r>
-              <a:rPr lang="en-US" sz="2000" b="0" i="0" u="none" strike="noStrike" dirty="0">
-                <a:solidFill>
-                  <a:srgbClr val="000000"/>
-                </a:solidFill>
-                <a:effectLst/>
-                <a:latin typeface="Calibri" panose="020F0502020204030204" pitchFamily="34" charset="0"/>
-                <a:cs typeface="Calibri" panose="020F0502020204030204" pitchFamily="34" charset="0"/>
-              </a:rPr>
-              <a:t>Thank you for your attention!</a:t>
+              <a:rPr lang="en-US" sz="2400" b="1" dirty="0">
+                <a:latin typeface="Calibri" panose="020F0502020204030204" pitchFamily="34" charset="0"/>
+                <a:cs typeface="Calibri" panose="020F0502020204030204" pitchFamily="34" charset="0"/>
+              </a:rPr>
+              <a:t>Define</a:t>
+            </a:r>
+          </a:p>
+          <a:p>
+            <a:r>
+              <a:rPr lang="en-US" b="1" dirty="0">
+                <a:latin typeface="Calibri" panose="020F0502020204030204" pitchFamily="34" charset="0"/>
+                <a:cs typeface="Calibri" panose="020F0502020204030204" pitchFamily="34" charset="0"/>
+              </a:rPr>
+              <a:t>Hydration</a:t>
+            </a:r>
+            <a:r>
+              <a:rPr lang="en-US" dirty="0">
+                <a:latin typeface="Calibri" panose="020F0502020204030204" pitchFamily="34" charset="0"/>
+                <a:cs typeface="Calibri" panose="020F0502020204030204" pitchFamily="34" charset="0"/>
+              </a:rPr>
+              <a:t> </a:t>
+            </a:r>
+            <a:r>
+              <a:rPr lang="en-US" b="1" dirty="0">
+                <a:latin typeface="Calibri" panose="020F0502020204030204" pitchFamily="34" charset="0"/>
+                <a:cs typeface="Calibri" panose="020F0502020204030204" pitchFamily="34" charset="0"/>
+              </a:rPr>
+              <a:t>is the process of restoring a server-rendered application on the client</a:t>
+            </a:r>
+            <a:r>
+              <a:rPr lang="en-US" dirty="0">
+                <a:latin typeface="Calibri" panose="020F0502020204030204" pitchFamily="34" charset="0"/>
+                <a:cs typeface="Calibri" panose="020F0502020204030204" pitchFamily="34" charset="0"/>
+              </a:rPr>
+              <a:t>. This process involves </a:t>
+            </a:r>
+            <a:r>
+              <a:rPr lang="en-US" b="1" dirty="0">
+                <a:latin typeface="Calibri" panose="020F0502020204030204" pitchFamily="34" charset="0"/>
+                <a:cs typeface="Calibri" panose="020F0502020204030204" pitchFamily="34" charset="0"/>
+              </a:rPr>
+              <a:t>reusing</a:t>
+            </a:r>
+            <a:r>
+              <a:rPr lang="en-US" dirty="0">
+                <a:latin typeface="Calibri" panose="020F0502020204030204" pitchFamily="34" charset="0"/>
+                <a:cs typeface="Calibri" panose="020F0502020204030204" pitchFamily="34" charset="0"/>
+              </a:rPr>
+              <a:t> the DOM structures rendered from the server, </a:t>
+            </a:r>
+            <a:r>
+              <a:rPr lang="en-US" b="1" dirty="0">
+                <a:latin typeface="Calibri" panose="020F0502020204030204" pitchFamily="34" charset="0"/>
+                <a:cs typeface="Calibri" panose="020F0502020204030204" pitchFamily="34" charset="0"/>
+              </a:rPr>
+              <a:t>maintaining the application's state, transferring pre-fetched application data</a:t>
+            </a:r>
+            <a:r>
+              <a:rPr lang="en-US" dirty="0">
+                <a:latin typeface="Calibri" panose="020F0502020204030204" pitchFamily="34" charset="0"/>
+                <a:cs typeface="Calibri" panose="020F0502020204030204" pitchFamily="34" charset="0"/>
+              </a:rPr>
+              <a:t> from the server, and other procedures.</a:t>
+            </a:r>
+          </a:p>
+          <a:p>
+            <a:pPr>
+              <a:buFont typeface="Arial" panose="020B0604020202020204" pitchFamily="34" charset="0"/>
+              <a:buChar char="•"/>
+            </a:pPr>
+            <a:r>
+              <a:rPr lang="en-US" b="1" dirty="0">
+                <a:latin typeface="Calibri" panose="020F0502020204030204" pitchFamily="34" charset="0"/>
+                <a:cs typeface="Calibri" panose="020F0502020204030204" pitchFamily="34" charset="0"/>
+              </a:rPr>
+              <a:t>Incremental hydration</a:t>
+            </a:r>
+            <a:r>
+              <a:rPr lang="en-US" dirty="0">
+                <a:latin typeface="Calibri" panose="020F0502020204030204" pitchFamily="34" charset="0"/>
+                <a:cs typeface="Calibri" panose="020F0502020204030204" pitchFamily="34" charset="0"/>
+              </a:rPr>
+              <a:t> allows developers to </a:t>
+            </a:r>
+            <a:r>
+              <a:rPr lang="en-US" b="1" dirty="0">
+                <a:latin typeface="Calibri" panose="020F0502020204030204" pitchFamily="34" charset="0"/>
+                <a:cs typeface="Calibri" panose="020F0502020204030204" pitchFamily="34" charset="0"/>
+              </a:rPr>
+              <a:t>specify which parts of the server-rendered </a:t>
+            </a:r>
+            <a:r>
+              <a:rPr lang="en-US" dirty="0">
+                <a:latin typeface="Calibri" panose="020F0502020204030204" pitchFamily="34" charset="0"/>
+                <a:cs typeface="Calibri" panose="020F0502020204030204" pitchFamily="34" charset="0"/>
+              </a:rPr>
+              <a:t>template </a:t>
+            </a:r>
+            <a:r>
+              <a:rPr lang="en-US" b="1" dirty="0">
+                <a:latin typeface="Calibri" panose="020F0502020204030204" pitchFamily="34" charset="0"/>
+                <a:cs typeface="Calibri" panose="020F0502020204030204" pitchFamily="34" charset="0"/>
+              </a:rPr>
+              <a:t>to load </a:t>
+            </a:r>
+            <a:r>
+              <a:rPr lang="en-US" dirty="0">
+                <a:latin typeface="Calibri" panose="020F0502020204030204" pitchFamily="34" charset="0"/>
+                <a:cs typeface="Calibri" panose="020F0502020204030204" pitchFamily="34" charset="0"/>
+              </a:rPr>
+              <a:t>and </a:t>
+            </a:r>
+            <a:r>
+              <a:rPr lang="en-US" b="1" dirty="0">
+                <a:latin typeface="Calibri" panose="020F0502020204030204" pitchFamily="34" charset="0"/>
+                <a:cs typeface="Calibri" panose="020F0502020204030204" pitchFamily="34" charset="0"/>
+              </a:rPr>
+              <a:t>hydrate lazily</a:t>
+            </a:r>
+            <a:r>
+              <a:rPr lang="en-US" dirty="0">
+                <a:latin typeface="Calibri" panose="020F0502020204030204" pitchFamily="34" charset="0"/>
+                <a:cs typeface="Calibri" panose="020F0502020204030204" pitchFamily="34" charset="0"/>
+              </a:rPr>
+              <a:t>, which improves performance for complex applications</a:t>
             </a:r>
           </a:p>
         </p:txBody>
@@ -3985,7 +4712,7 @@
     </p:spTree>
     <p:extLst>
       <p:ext uri="{BB962C8B-B14F-4D97-AF65-F5344CB8AC3E}">
-        <p14:creationId xmlns:p14="http://schemas.microsoft.com/office/powerpoint/2010/main" val="609541774"/>
+        <p14:creationId xmlns:p14="http://schemas.microsoft.com/office/powerpoint/2010/main" val="3696879582"/>
       </p:ext>
     </p:extLst>
   </p:cSld>
@@ -3995,355 +4722,7 @@
 </p:sld>
 </file>
 
-<file path=ppt/slides/slide2.xml><?xml version="1.0" encoding="utf-8"?>
-<p:sld xmlns:a="http://schemas.openxmlformats.org/drawingml/2006/main" xmlns:r="http://schemas.openxmlformats.org/officeDocument/2006/relationships" xmlns:p="http://schemas.openxmlformats.org/presentationml/2006/main">
-  <p:cSld>
-    <p:spTree>
-      <p:nvGrpSpPr>
-        <p:cNvPr id="1" name=""/>
-        <p:cNvGrpSpPr/>
-        <p:nvPr/>
-      </p:nvGrpSpPr>
-      <p:grpSpPr>
-        <a:xfrm>
-          <a:off x="0" y="0"/>
-          <a:ext cx="0" cy="0"/>
-          <a:chOff x="0" y="0"/>
-          <a:chExt cx="0" cy="0"/>
-        </a:xfrm>
-      </p:grpSpPr>
-      <p:sp>
-        <p:nvSpPr>
-          <p:cNvPr id="2" name="Title 1">
-            <a:extLst>
-              <a:ext uri="{FF2B5EF4-FFF2-40B4-BE49-F238E27FC236}">
-                <a16:creationId xmlns:a16="http://schemas.microsoft.com/office/drawing/2014/main" id="{0D6122DA-451B-06D4-CA33-2C048EAB9C32}"/>
-              </a:ext>
-            </a:extLst>
-          </p:cNvPr>
-          <p:cNvSpPr>
-            <a:spLocks noGrp="1"/>
-          </p:cNvSpPr>
-          <p:nvPr>
-            <p:ph type="title"/>
-          </p:nvPr>
-        </p:nvSpPr>
-        <p:spPr>
-          <a:xfrm>
-            <a:off x="1451579" y="1208762"/>
-            <a:ext cx="9603275" cy="583704"/>
-          </a:xfrm>
-        </p:spPr>
-        <p:txBody>
-          <a:bodyPr>
-            <a:normAutofit/>
-          </a:bodyPr>
-          <a:lstStyle/>
-          <a:p>
-            <a:pPr algn="ctr"/>
-            <a:r>
-              <a:rPr lang="en-VN" b="1" dirty="0">
-                <a:latin typeface="Calibri" panose="020F0502020204030204" pitchFamily="34" charset="0"/>
-                <a:cs typeface="Calibri" panose="020F0502020204030204" pitchFamily="34" charset="0"/>
-              </a:rPr>
-              <a:t>Overview:</a:t>
-            </a:r>
-          </a:p>
-        </p:txBody>
-      </p:sp>
-      <p:sp>
-        <p:nvSpPr>
-          <p:cNvPr id="3" name="Content Placeholder 2">
-            <a:extLst>
-              <a:ext uri="{FF2B5EF4-FFF2-40B4-BE49-F238E27FC236}">
-                <a16:creationId xmlns:a16="http://schemas.microsoft.com/office/drawing/2014/main" id="{31ED5CB6-A2DF-771D-1206-91462445BE62}"/>
-              </a:ext>
-            </a:extLst>
-          </p:cNvPr>
-          <p:cNvSpPr>
-            <a:spLocks noGrp="1"/>
-          </p:cNvSpPr>
-          <p:nvPr>
-            <p:ph idx="1"/>
-          </p:nvPr>
-        </p:nvSpPr>
-        <p:spPr/>
-        <p:txBody>
-          <a:bodyPr>
-            <a:normAutofit/>
-          </a:bodyPr>
-          <a:lstStyle/>
-          <a:p>
-            <a:pPr marL="457200" indent="-457200">
-              <a:buFont typeface="+mj-lt"/>
-              <a:buAutoNum type="arabicPeriod"/>
-            </a:pPr>
-            <a:r>
-              <a:rPr lang="en-US" sz="2800" b="0" i="0" u="none" strike="noStrike" dirty="0">
-                <a:solidFill>
-                  <a:srgbClr val="000000"/>
-                </a:solidFill>
-                <a:effectLst/>
-                <a:latin typeface="Calibri" panose="020F0502020204030204" pitchFamily="34" charset="0"/>
-                <a:cs typeface="Calibri" panose="020F0502020204030204" pitchFamily="34" charset="0"/>
-              </a:rPr>
-              <a:t>What’s New in Angular 18?</a:t>
-            </a:r>
-            <a:endParaRPr lang="en-VN" sz="2800" dirty="0">
-              <a:latin typeface="Calibri" panose="020F0502020204030204" pitchFamily="34" charset="0"/>
-              <a:cs typeface="Calibri" panose="020F0502020204030204" pitchFamily="34" charset="0"/>
-            </a:endParaRPr>
-          </a:p>
-          <a:p>
-            <a:pPr algn="l">
-              <a:buFont typeface="+mj-lt"/>
-              <a:buAutoNum type="arabicPeriod"/>
-            </a:pPr>
-            <a:r>
-              <a:rPr lang="en-US" sz="2800" b="0" i="0" u="none" strike="noStrike" dirty="0">
-                <a:solidFill>
-                  <a:srgbClr val="000000"/>
-                </a:solidFill>
-                <a:effectLst/>
-                <a:latin typeface="Calibri" panose="020F0502020204030204" pitchFamily="34" charset="0"/>
-                <a:cs typeface="Calibri" panose="020F0502020204030204" pitchFamily="34" charset="0"/>
-              </a:rPr>
-              <a:t>  What’s New in Angular 19?</a:t>
-            </a:r>
-          </a:p>
-          <a:p>
-            <a:pPr algn="l">
-              <a:buFont typeface="+mj-lt"/>
-              <a:buAutoNum type="arabicPeriod"/>
-            </a:pPr>
-            <a:r>
-              <a:rPr lang="en-US" sz="2800" b="0" i="0" u="none" strike="noStrike" dirty="0">
-                <a:solidFill>
-                  <a:srgbClr val="000000"/>
-                </a:solidFill>
-                <a:effectLst/>
-                <a:latin typeface="Calibri" panose="020F0502020204030204" pitchFamily="34" charset="0"/>
-                <a:cs typeface="Calibri" panose="020F0502020204030204" pitchFamily="34" charset="0"/>
-              </a:rPr>
-              <a:t>  Why These Updates Matter?</a:t>
-            </a:r>
-          </a:p>
-          <a:p>
-            <a:pPr algn="l">
-              <a:buFont typeface="+mj-lt"/>
-              <a:buAutoNum type="arabicPeriod"/>
-            </a:pPr>
-            <a:r>
-              <a:rPr lang="en-US" sz="2800" b="0" i="0" u="none" strike="noStrike" dirty="0">
-                <a:solidFill>
-                  <a:srgbClr val="000000"/>
-                </a:solidFill>
-                <a:effectLst/>
-                <a:latin typeface="Calibri" panose="020F0502020204030204" pitchFamily="34" charset="0"/>
-                <a:cs typeface="Calibri" panose="020F0502020204030204" pitchFamily="34" charset="0"/>
-              </a:rPr>
-              <a:t>  How These Features Work?</a:t>
-            </a:r>
-          </a:p>
-        </p:txBody>
-      </p:sp>
-    </p:spTree>
-    <p:extLst>
-      <p:ext uri="{BB962C8B-B14F-4D97-AF65-F5344CB8AC3E}">
-        <p14:creationId xmlns:p14="http://schemas.microsoft.com/office/powerpoint/2010/main" val="4171276522"/>
-      </p:ext>
-    </p:extLst>
-  </p:cSld>
-  <p:clrMapOvr>
-    <a:masterClrMapping/>
-  </p:clrMapOvr>
-</p:sld>
-</file>
-
-<file path=ppt/slides/slide3.xml><?xml version="1.0" encoding="utf-8"?>
-<p:sld xmlns:a="http://schemas.openxmlformats.org/drawingml/2006/main" xmlns:r="http://schemas.openxmlformats.org/officeDocument/2006/relationships" xmlns:p="http://schemas.openxmlformats.org/presentationml/2006/main">
-  <p:cSld>
-    <p:spTree>
-      <p:nvGrpSpPr>
-        <p:cNvPr id="1" name=""/>
-        <p:cNvGrpSpPr/>
-        <p:nvPr/>
-      </p:nvGrpSpPr>
-      <p:grpSpPr>
-        <a:xfrm>
-          <a:off x="0" y="0"/>
-          <a:ext cx="0" cy="0"/>
-          <a:chOff x="0" y="0"/>
-          <a:chExt cx="0" cy="0"/>
-        </a:xfrm>
-      </p:grpSpPr>
-      <p:sp>
-        <p:nvSpPr>
-          <p:cNvPr id="2" name="Title 1">
-            <a:extLst>
-              <a:ext uri="{FF2B5EF4-FFF2-40B4-BE49-F238E27FC236}">
-                <a16:creationId xmlns:a16="http://schemas.microsoft.com/office/drawing/2014/main" id="{72E14B04-A7F0-7A10-8F37-D00AC0AFB68C}"/>
-              </a:ext>
-            </a:extLst>
-          </p:cNvPr>
-          <p:cNvSpPr>
-            <a:spLocks noGrp="1"/>
-          </p:cNvSpPr>
-          <p:nvPr>
-            <p:ph type="title"/>
-          </p:nvPr>
-        </p:nvSpPr>
-        <p:spPr>
-          <a:xfrm>
-            <a:off x="1451579" y="739036"/>
-            <a:ext cx="9603275" cy="1041319"/>
-          </a:xfrm>
-        </p:spPr>
-        <p:txBody>
-          <a:bodyPr>
-            <a:noAutofit/>
-          </a:bodyPr>
-          <a:lstStyle/>
-          <a:p>
-            <a:pPr algn="ctr"/>
-            <a:r>
-              <a:rPr lang="en-US" b="1" i="0" u="none" strike="noStrike" dirty="0">
-                <a:solidFill>
-                  <a:srgbClr val="000000"/>
-                </a:solidFill>
-                <a:effectLst/>
-                <a:latin typeface="Calibri" panose="020F0502020204030204" pitchFamily="34" charset="0"/>
-                <a:cs typeface="Calibri" panose="020F0502020204030204" pitchFamily="34" charset="0"/>
-              </a:rPr>
-              <a:t>What’s New in </a:t>
-            </a:r>
-            <a:br>
-              <a:rPr lang="en-US" b="1" i="0" u="none" strike="noStrike" dirty="0">
-                <a:solidFill>
-                  <a:srgbClr val="000000"/>
-                </a:solidFill>
-                <a:effectLst/>
-                <a:latin typeface="Calibri" panose="020F0502020204030204" pitchFamily="34" charset="0"/>
-                <a:cs typeface="Calibri" panose="020F0502020204030204" pitchFamily="34" charset="0"/>
-              </a:rPr>
-            </a:br>
-            <a:r>
-              <a:rPr lang="en-US" b="1" i="0" u="none" strike="noStrike" dirty="0">
-                <a:solidFill>
-                  <a:srgbClr val="000000"/>
-                </a:solidFill>
-                <a:effectLst/>
-                <a:latin typeface="Calibri" panose="020F0502020204030204" pitchFamily="34" charset="0"/>
-                <a:cs typeface="Calibri" panose="020F0502020204030204" pitchFamily="34" charset="0"/>
-              </a:rPr>
-              <a:t>Angular 18</a:t>
-            </a:r>
-            <a:endParaRPr lang="en-VN" b="1" cap="none" dirty="0">
-              <a:latin typeface="Calibri" panose="020F0502020204030204" pitchFamily="34" charset="0"/>
-              <a:cs typeface="Calibri" panose="020F0502020204030204" pitchFamily="34" charset="0"/>
-            </a:endParaRPr>
-          </a:p>
-        </p:txBody>
-      </p:sp>
-      <p:sp>
-        <p:nvSpPr>
-          <p:cNvPr id="3" name="Content Placeholder 2">
-            <a:extLst>
-              <a:ext uri="{FF2B5EF4-FFF2-40B4-BE49-F238E27FC236}">
-                <a16:creationId xmlns:a16="http://schemas.microsoft.com/office/drawing/2014/main" id="{D1E9E962-B00D-6AC5-7322-C3D4944A2870}"/>
-              </a:ext>
-            </a:extLst>
-          </p:cNvPr>
-          <p:cNvSpPr>
-            <a:spLocks noGrp="1"/>
-          </p:cNvSpPr>
-          <p:nvPr>
-            <p:ph idx="1"/>
-          </p:nvPr>
-        </p:nvSpPr>
-        <p:spPr/>
-        <p:txBody>
-          <a:bodyPr>
-            <a:normAutofit/>
-          </a:bodyPr>
-          <a:lstStyle/>
-          <a:p>
-            <a:pPr>
-              <a:buFont typeface="Wingdings" pitchFamily="2" charset="2"/>
-              <a:buChar char="Ø"/>
-            </a:pPr>
-            <a:r>
-              <a:rPr lang="en-US" sz="3200" i="0" u="none" strike="noStrike" dirty="0">
-                <a:solidFill>
-                  <a:srgbClr val="000000"/>
-                </a:solidFill>
-                <a:effectLst/>
-                <a:latin typeface="Calibri" panose="020F0502020204030204" pitchFamily="34" charset="0"/>
-                <a:cs typeface="Calibri" panose="020F0502020204030204" pitchFamily="34" charset="0"/>
-              </a:rPr>
-              <a:t> Zoneless Change Detection (Experimental)</a:t>
-            </a:r>
-          </a:p>
-          <a:p>
-            <a:pPr>
-              <a:buFont typeface="Wingdings" pitchFamily="2" charset="2"/>
-              <a:buChar char="Ø"/>
-            </a:pPr>
-            <a:r>
-              <a:rPr lang="en-US" sz="3200">
-                <a:solidFill>
-                  <a:srgbClr val="000000"/>
-                </a:solidFill>
-                <a:latin typeface="Calibri" panose="020F0502020204030204" pitchFamily="34" charset="0"/>
-                <a:cs typeface="Calibri" panose="020F0502020204030204" pitchFamily="34" charset="0"/>
-              </a:rPr>
-              <a:t>Deferable </a:t>
-            </a:r>
-            <a:r>
-              <a:rPr lang="en-US" sz="3200" dirty="0">
-                <a:solidFill>
-                  <a:srgbClr val="000000"/>
-                </a:solidFill>
-                <a:latin typeface="Calibri" panose="020F0502020204030204" pitchFamily="34" charset="0"/>
-                <a:cs typeface="Calibri" panose="020F0502020204030204" pitchFamily="34" charset="0"/>
-              </a:rPr>
-              <a:t>Views and Built-in Control Flow</a:t>
-            </a:r>
-            <a:endParaRPr lang="en-US" sz="3200" i="0" u="none" strike="noStrike" dirty="0">
-              <a:solidFill>
-                <a:srgbClr val="000000"/>
-              </a:solidFill>
-              <a:effectLst/>
-              <a:latin typeface="Calibri" panose="020F0502020204030204" pitchFamily="34" charset="0"/>
-              <a:cs typeface="Calibri" panose="020F0502020204030204" pitchFamily="34" charset="0"/>
-            </a:endParaRPr>
-          </a:p>
-          <a:p>
-            <a:pPr>
-              <a:buFont typeface="Wingdings" pitchFamily="2" charset="2"/>
-              <a:buChar char="ü"/>
-            </a:pPr>
-            <a:endParaRPr lang="en-VN" sz="3200" dirty="0">
-              <a:latin typeface="Calibri" panose="020F0502020204030204" pitchFamily="34" charset="0"/>
-              <a:cs typeface="Calibri" panose="020F0502020204030204" pitchFamily="34" charset="0"/>
-            </a:endParaRPr>
-          </a:p>
-        </p:txBody>
-      </p:sp>
-    </p:spTree>
-    <p:extLst>
-      <p:ext uri="{BB962C8B-B14F-4D97-AF65-F5344CB8AC3E}">
-        <p14:creationId xmlns:p14="http://schemas.microsoft.com/office/powerpoint/2010/main" val="3563023069"/>
-      </p:ext>
-    </p:extLst>
-  </p:cSld>
-  <p:clrMapOvr>
-    <a:masterClrMapping/>
-  </p:clrMapOvr>
-</p:sld>
-</file>
-
-<file path=ppt/slides/slide4.xml><?xml version="1.0" encoding="utf-8"?>
+<file path=ppt/slides/slide12.xml><?xml version="1.0" encoding="utf-8"?>
 <p:sld xmlns:a="http://schemas.openxmlformats.org/drawingml/2006/main" xmlns:r="http://schemas.openxmlformats.org/officeDocument/2006/relationships" xmlns:p="http://schemas.openxmlformats.org/presentationml/2006/main">
   <p:cSld>
     <p:spTree>
@@ -4351,7 +4730,7 @@
         <p:cNvPr id="1" name="">
           <a:extLst>
             <a:ext uri="{FF2B5EF4-FFF2-40B4-BE49-F238E27FC236}">
-              <a16:creationId xmlns:a16="http://schemas.microsoft.com/office/drawing/2014/main" id="{5E496153-ABF6-5CCF-863B-B7B1AB194FBA}"/>
+              <a16:creationId xmlns:a16="http://schemas.microsoft.com/office/drawing/2014/main" id="{67F9260A-3CC4-E9D5-BF35-C4F9AD215739}"/>
             </a:ext>
           </a:extLst>
         </p:cNvPr>
@@ -4366,246 +4745,39 @@
           <a:chExt cx="0" cy="0"/>
         </a:xfrm>
       </p:grpSpPr>
-      <p:sp>
-        <p:nvSpPr>
-          <p:cNvPr id="2" name="Title 1">
+      <p:pic>
+        <p:nvPicPr>
+          <p:cNvPr id="5" name="Content Placeholder 4" descr="A screenshot of a computer screen&#10;&#10;AI-generated content may be incorrect.">
             <a:extLst>
               <a:ext uri="{FF2B5EF4-FFF2-40B4-BE49-F238E27FC236}">
-                <a16:creationId xmlns:a16="http://schemas.microsoft.com/office/drawing/2014/main" id="{E50CE126-7F89-EBB7-4754-92A4C4237CE0}"/>
+                <a16:creationId xmlns:a16="http://schemas.microsoft.com/office/drawing/2014/main" id="{9779B5ED-F393-24AD-98A4-7C596C2E17A0}"/>
               </a:ext>
             </a:extLst>
           </p:cNvPr>
-          <p:cNvSpPr>
-            <a:spLocks noGrp="1"/>
-          </p:cNvSpPr>
-          <p:nvPr>
-            <p:ph type="title"/>
-          </p:nvPr>
-        </p:nvSpPr>
+          <p:cNvPicPr>
+            <a:picLocks noGrp="1" noChangeAspect="1"/>
+          </p:cNvPicPr>
+          <p:nvPr>
+            <p:ph idx="1"/>
+          </p:nvPr>
+        </p:nvPicPr>
+        <p:blipFill>
+          <a:blip r:embed="rId3"/>
+          <a:stretch>
+            <a:fillRect/>
+          </a:stretch>
+        </p:blipFill>
         <p:spPr>
           <a:xfrm>
-            <a:off x="1451579" y="839244"/>
-            <a:ext cx="9603275" cy="1014510"/>
+            <a:off x="1063559" y="116732"/>
+            <a:ext cx="9948152" cy="5735516"/>
           </a:xfrm>
         </p:spPr>
-        <p:txBody>
-          <a:bodyPr>
-            <a:normAutofit/>
-          </a:bodyPr>
-          <a:lstStyle/>
-          <a:p>
-            <a:pPr algn="ctr"/>
-            <a:r>
-              <a:rPr lang="en-US" b="1" i="0" u="none" strike="noStrike" dirty="0">
-                <a:solidFill>
-                  <a:srgbClr val="000000"/>
-                </a:solidFill>
-                <a:effectLst/>
-                <a:latin typeface="Calibri" panose="020F0502020204030204" pitchFamily="34" charset="0"/>
-                <a:cs typeface="Calibri" panose="020F0502020204030204" pitchFamily="34" charset="0"/>
-              </a:rPr>
-              <a:t>What’s New in </a:t>
-            </a:r>
-            <a:br>
-              <a:rPr lang="en-US" b="1" i="0" u="none" strike="noStrike" dirty="0">
-                <a:solidFill>
-                  <a:srgbClr val="000000"/>
-                </a:solidFill>
-                <a:effectLst/>
-                <a:latin typeface="Calibri" panose="020F0502020204030204" pitchFamily="34" charset="0"/>
-                <a:cs typeface="Calibri" panose="020F0502020204030204" pitchFamily="34" charset="0"/>
-              </a:rPr>
-            </a:br>
-            <a:r>
-              <a:rPr lang="en-US" b="1" i="0" u="none" strike="noStrike" dirty="0">
-                <a:solidFill>
-                  <a:srgbClr val="000000"/>
-                </a:solidFill>
-                <a:effectLst/>
-                <a:latin typeface="Calibri" panose="020F0502020204030204" pitchFamily="34" charset="0"/>
-                <a:cs typeface="Calibri" panose="020F0502020204030204" pitchFamily="34" charset="0"/>
-              </a:rPr>
-              <a:t>Angular 19</a:t>
-            </a:r>
-            <a:endParaRPr lang="en-VN" sz="4800" b="1" cap="none" dirty="0">
-              <a:latin typeface="Calibri" panose="020F0502020204030204" pitchFamily="34" charset="0"/>
-              <a:cs typeface="Calibri" panose="020F0502020204030204" pitchFamily="34" charset="0"/>
-            </a:endParaRPr>
-          </a:p>
-        </p:txBody>
-      </p:sp>
-      <p:sp>
-        <p:nvSpPr>
-          <p:cNvPr id="3" name="Content Placeholder 2">
-            <a:extLst>
-              <a:ext uri="{FF2B5EF4-FFF2-40B4-BE49-F238E27FC236}">
-                <a16:creationId xmlns:a16="http://schemas.microsoft.com/office/drawing/2014/main" id="{4423958E-86F4-9BD7-25DF-1347538602E9}"/>
-              </a:ext>
-            </a:extLst>
-          </p:cNvPr>
-          <p:cNvSpPr>
-            <a:spLocks noGrp="1"/>
-          </p:cNvSpPr>
-          <p:nvPr>
-            <p:ph idx="1"/>
-          </p:nvPr>
-        </p:nvSpPr>
-        <p:spPr/>
-        <p:txBody>
-          <a:bodyPr>
-            <a:normAutofit/>
-          </a:bodyPr>
-          <a:lstStyle/>
-          <a:p>
-            <a:pPr algn="l">
-              <a:buFont typeface="Wingdings" pitchFamily="2" charset="2"/>
-              <a:buChar char="v"/>
-            </a:pPr>
-            <a:r>
-              <a:rPr lang="en-US" sz="2800" b="1" i="0" u="none" strike="noStrike" dirty="0">
-                <a:solidFill>
-                  <a:srgbClr val="000000"/>
-                </a:solidFill>
-                <a:effectLst/>
-                <a:latin typeface="Calibri" panose="020F0502020204030204" pitchFamily="34" charset="0"/>
-                <a:cs typeface="Calibri" panose="020F0502020204030204" pitchFamily="34" charset="0"/>
-              </a:rPr>
-              <a:t> </a:t>
-            </a:r>
-            <a:r>
-              <a:rPr lang="en-US" sz="2400" b="1" i="0" u="none" strike="noStrike" dirty="0">
-                <a:solidFill>
-                  <a:srgbClr val="000000"/>
-                </a:solidFill>
-                <a:effectLst/>
-                <a:latin typeface="Calibri" panose="020F0502020204030204" pitchFamily="34" charset="0"/>
-                <a:cs typeface="Calibri" panose="020F0502020204030204" pitchFamily="34" charset="0"/>
-              </a:rPr>
-              <a:t>Standalone Components by default</a:t>
-            </a:r>
-          </a:p>
-          <a:p>
-            <a:pPr algn="l">
-              <a:buFont typeface="Wingdings" pitchFamily="2" charset="2"/>
-              <a:buChar char="v"/>
-            </a:pPr>
-            <a:r>
-              <a:rPr lang="en-US" sz="2400" b="1" dirty="0">
-                <a:solidFill>
-                  <a:srgbClr val="000000"/>
-                </a:solidFill>
-                <a:latin typeface="Calibri" panose="020F0502020204030204" pitchFamily="34" charset="0"/>
-                <a:cs typeface="Calibri" panose="020F0502020204030204" pitchFamily="34" charset="0"/>
-              </a:rPr>
-              <a:t> Stabilization of Core Reactivity Primitives</a:t>
-            </a:r>
-          </a:p>
-          <a:p>
-            <a:pPr algn="l">
-              <a:buFont typeface="Wingdings" pitchFamily="2" charset="2"/>
-              <a:buChar char="v"/>
-            </a:pPr>
-            <a:r>
-              <a:rPr lang="en-US" sz="2400" b="1" i="0" u="none" strike="noStrike" dirty="0">
-                <a:solidFill>
-                  <a:srgbClr val="000000"/>
-                </a:solidFill>
-                <a:effectLst/>
-                <a:latin typeface="Calibri" panose="020F0502020204030204" pitchFamily="34" charset="0"/>
-                <a:cs typeface="Calibri" panose="020F0502020204030204" pitchFamily="34" charset="0"/>
-              </a:rPr>
-              <a:t> Event Replay Enabled by default (Related Hydration)</a:t>
-            </a:r>
-            <a:endParaRPr lang="en-US" sz="2400" b="0" i="0" u="none" strike="noStrike" dirty="0">
-              <a:solidFill>
-                <a:srgbClr val="000000"/>
-              </a:solidFill>
-              <a:effectLst/>
-              <a:latin typeface="Calibri" panose="020F0502020204030204" pitchFamily="34" charset="0"/>
-              <a:cs typeface="Calibri" panose="020F0502020204030204" pitchFamily="34" charset="0"/>
-            </a:endParaRPr>
-          </a:p>
-          <a:p>
-            <a:pPr algn="l">
-              <a:buFont typeface="Wingdings" pitchFamily="2" charset="2"/>
-              <a:buChar char="v"/>
-            </a:pPr>
-            <a:r>
-              <a:rPr lang="en-US" sz="2400" b="1" i="0" u="none" strike="noStrike" dirty="0">
-                <a:solidFill>
-                  <a:srgbClr val="000000"/>
-                </a:solidFill>
-                <a:effectLst/>
-                <a:latin typeface="Calibri" panose="020F0502020204030204" pitchFamily="34" charset="0"/>
-                <a:cs typeface="Calibri" panose="020F0502020204030204" pitchFamily="34" charset="0"/>
-              </a:rPr>
-              <a:t> Incremental Hydration (Developer Preview)</a:t>
-            </a:r>
-            <a:endParaRPr lang="en-US" sz="2400" b="0" i="0" u="none" strike="noStrike" dirty="0">
-              <a:solidFill>
-                <a:srgbClr val="000000"/>
-              </a:solidFill>
-              <a:effectLst/>
-              <a:latin typeface="Calibri" panose="020F0502020204030204" pitchFamily="34" charset="0"/>
-              <a:cs typeface="Calibri" panose="020F0502020204030204" pitchFamily="34" charset="0"/>
-            </a:endParaRPr>
-          </a:p>
-          <a:p>
-            <a:pPr algn="l">
-              <a:buFont typeface="Wingdings" pitchFamily="2" charset="2"/>
-              <a:buChar char="v"/>
-            </a:pPr>
-            <a:r>
-              <a:rPr lang="en-US" sz="2400" b="1" i="0" u="none" strike="noStrike" dirty="0">
-                <a:solidFill>
-                  <a:srgbClr val="000000"/>
-                </a:solidFill>
-                <a:effectLst/>
-                <a:latin typeface="Calibri" panose="020F0502020204030204" pitchFamily="34" charset="0"/>
-                <a:cs typeface="Calibri" panose="020F0502020204030204" pitchFamily="34" charset="0"/>
-              </a:rPr>
-              <a:t> Route-Level Render Mode (Developer Preview)</a:t>
-            </a:r>
-            <a:endParaRPr lang="en-US" sz="2400" b="0" i="0" u="none" strike="noStrike" dirty="0">
-              <a:solidFill>
-                <a:srgbClr val="000000"/>
-              </a:solidFill>
-              <a:effectLst/>
-              <a:latin typeface="Calibri" panose="020F0502020204030204" pitchFamily="34" charset="0"/>
-              <a:cs typeface="Calibri" panose="020F0502020204030204" pitchFamily="34" charset="0"/>
-            </a:endParaRPr>
-          </a:p>
-          <a:p>
-            <a:pPr algn="l">
-              <a:buFont typeface="Wingdings" pitchFamily="2" charset="2"/>
-              <a:buChar char="v"/>
-            </a:pPr>
-            <a:r>
-              <a:rPr lang="en-US" sz="2400" b="1" i="0" u="none" strike="noStrike" dirty="0">
-                <a:solidFill>
-                  <a:srgbClr val="000000"/>
-                </a:solidFill>
-                <a:effectLst/>
-                <a:latin typeface="Calibri" panose="020F0502020204030204" pitchFamily="34" charset="0"/>
-                <a:cs typeface="Calibri" panose="020F0502020204030204" pitchFamily="34" charset="0"/>
-              </a:rPr>
-              <a:t> Hot Module Replacement (HMR) Support</a:t>
-            </a:r>
-            <a:endParaRPr lang="en-US" sz="2400" b="0" i="0" u="none" strike="noStrike" dirty="0">
-              <a:solidFill>
-                <a:srgbClr val="000000"/>
-              </a:solidFill>
-              <a:effectLst/>
-              <a:latin typeface="Calibri" panose="020F0502020204030204" pitchFamily="34" charset="0"/>
-              <a:cs typeface="Calibri" panose="020F0502020204030204" pitchFamily="34" charset="0"/>
-            </a:endParaRPr>
-          </a:p>
-        </p:txBody>
-      </p:sp>
+      </p:pic>
     </p:spTree>
     <p:extLst>
       <p:ext uri="{BB962C8B-B14F-4D97-AF65-F5344CB8AC3E}">
-        <p14:creationId xmlns:p14="http://schemas.microsoft.com/office/powerpoint/2010/main" val="869726869"/>
+        <p14:creationId xmlns:p14="http://schemas.microsoft.com/office/powerpoint/2010/main" val="3694448514"/>
       </p:ext>
     </p:extLst>
   </p:cSld>
@@ -4615,7 +4787,7 @@
 </p:sld>
 </file>
 
-<file path=ppt/slides/slide5.xml><?xml version="1.0" encoding="utf-8"?>
+<file path=ppt/slides/slide13.xml><?xml version="1.0" encoding="utf-8"?>
 <p:sld xmlns:a="http://schemas.openxmlformats.org/drawingml/2006/main" xmlns:r="http://schemas.openxmlformats.org/officeDocument/2006/relationships" xmlns:p="http://schemas.openxmlformats.org/presentationml/2006/main">
   <p:cSld>
     <p:spTree>
@@ -4656,13 +4828,13 @@
         </p:nvSpPr>
         <p:spPr>
           <a:xfrm>
-            <a:off x="1451579" y="1096069"/>
-            <a:ext cx="9603275" cy="721351"/>
+            <a:off x="1451579" y="972767"/>
+            <a:ext cx="9603275" cy="844654"/>
           </a:xfrm>
         </p:spPr>
         <p:txBody>
           <a:bodyPr>
-            <a:normAutofit/>
+            <a:normAutofit fontScale="90000"/>
           </a:bodyPr>
           <a:lstStyle/>
           <a:p>
@@ -4675,7 +4847,26 @@
                 <a:latin typeface="Calibri" panose="020F0502020204030204" pitchFamily="34" charset="0"/>
                 <a:cs typeface="Calibri" panose="020F0502020204030204" pitchFamily="34" charset="0"/>
               </a:rPr>
-              <a:t>Angular CLI smarter</a:t>
+              <a:t>Angular CLI</a:t>
+            </a:r>
+            <a:br>
+              <a:rPr lang="en-US" b="1" dirty="0">
+                <a:solidFill>
+                  <a:srgbClr val="000000"/>
+                </a:solidFill>
+                <a:latin typeface="Calibri" panose="020F0502020204030204" pitchFamily="34" charset="0"/>
+                <a:cs typeface="Calibri" panose="020F0502020204030204" pitchFamily="34" charset="0"/>
+              </a:rPr>
+            </a:br>
+            <a:r>
+              <a:rPr lang="en-US" b="1" dirty="0">
+                <a:solidFill>
+                  <a:srgbClr val="000000"/>
+                </a:solidFill>
+                <a:latin typeface="Calibri" panose="020F0502020204030204" pitchFamily="34" charset="0"/>
+                <a:cs typeface="Calibri" panose="020F0502020204030204" pitchFamily="34" charset="0"/>
+              </a:rPr>
+              <a:t>smarter</a:t>
             </a:r>
             <a:endParaRPr lang="en-US" b="0" i="0" u="none" strike="noStrike" dirty="0">
               <a:solidFill>
@@ -4712,7 +4903,7 @@
         </p:blipFill>
         <p:spPr>
           <a:xfrm>
-            <a:off x="3742616" y="1912144"/>
+            <a:off x="4157716" y="2080757"/>
             <a:ext cx="4191000" cy="1828800"/>
           </a:xfrm>
         </p:spPr>
@@ -4731,7 +4922,7 @@
         </p:nvSpPr>
         <p:spPr>
           <a:xfrm>
-            <a:off x="4481209" y="3968885"/>
+            <a:off x="5024450" y="3988227"/>
             <a:ext cx="2457532" cy="369332"/>
           </a:xfrm>
           <a:prstGeom prst="rect">
@@ -4765,7 +4956,7 @@
 </p:sld>
 </file>
 
-<file path=ppt/slides/slide6.xml><?xml version="1.0" encoding="utf-8"?>
+<file path=ppt/slides/slide14.xml><?xml version="1.0" encoding="utf-8"?>
 <p:sld xmlns:a="http://schemas.openxmlformats.org/drawingml/2006/main" xmlns:r="http://schemas.openxmlformats.org/officeDocument/2006/relationships" xmlns:p="http://schemas.openxmlformats.org/presentationml/2006/main">
   <p:cSld>
     <p:spTree>
@@ -5042,7 +5233,7 @@
 </p:sld>
 </file>
 
-<file path=ppt/slides/slide7.xml><?xml version="1.0" encoding="utf-8"?>
+<file path=ppt/slides/slide15.xml><?xml version="1.0" encoding="utf-8"?>
 <p:sld xmlns:a="http://schemas.openxmlformats.org/drawingml/2006/main" xmlns:r="http://schemas.openxmlformats.org/officeDocument/2006/relationships" xmlns:p="http://schemas.openxmlformats.org/presentationml/2006/main">
   <p:cSld>
     <p:spTree>
@@ -5281,7 +5472,7 @@
 </p:sld>
 </file>
 
-<file path=ppt/slides/slide8.xml><?xml version="1.0" encoding="utf-8"?>
+<file path=ppt/slides/slide16.xml><?xml version="1.0" encoding="utf-8"?>
 <p:sld xmlns:a="http://schemas.openxmlformats.org/drawingml/2006/main" xmlns:r="http://schemas.openxmlformats.org/officeDocument/2006/relationships" xmlns:p="http://schemas.openxmlformats.org/presentationml/2006/main">
   <p:cSld>
     <p:spTree>
@@ -5532,7 +5723,7 @@
 </p:sld>
 </file>
 
-<file path=ppt/slides/slide9.xml><?xml version="1.0" encoding="utf-8"?>
+<file path=ppt/slides/slide17.xml><?xml version="1.0" encoding="utf-8"?>
 <p:sld xmlns:a="http://schemas.openxmlformats.org/drawingml/2006/main" xmlns:r="http://schemas.openxmlformats.org/officeDocument/2006/relationships" xmlns:p="http://schemas.openxmlformats.org/presentationml/2006/main">
   <p:cSld>
     <p:spTree>
@@ -5648,6 +5839,2321 @@
     <p:extLst>
       <p:ext uri="{BB962C8B-B14F-4D97-AF65-F5344CB8AC3E}">
         <p14:creationId xmlns:p14="http://schemas.microsoft.com/office/powerpoint/2010/main" val="306067240"/>
+      </p:ext>
+    </p:extLst>
+  </p:cSld>
+  <p:clrMapOvr>
+    <a:masterClrMapping/>
+  </p:clrMapOvr>
+</p:sld>
+</file>
+
+<file path=ppt/slides/slide18.xml><?xml version="1.0" encoding="utf-8"?>
+<p:sld xmlns:a="http://schemas.openxmlformats.org/drawingml/2006/main" xmlns:r="http://schemas.openxmlformats.org/officeDocument/2006/relationships" xmlns:p="http://schemas.openxmlformats.org/presentationml/2006/main">
+  <p:cSld>
+    <p:spTree>
+      <p:nvGrpSpPr>
+        <p:cNvPr id="1" name="">
+          <a:extLst>
+            <a:ext uri="{FF2B5EF4-FFF2-40B4-BE49-F238E27FC236}">
+              <a16:creationId xmlns:a16="http://schemas.microsoft.com/office/drawing/2014/main" id="{2ECF9B82-9092-53D2-22A8-178930CB4388}"/>
+            </a:ext>
+          </a:extLst>
+        </p:cNvPr>
+        <p:cNvGrpSpPr/>
+        <p:nvPr/>
+      </p:nvGrpSpPr>
+      <p:grpSpPr>
+        <a:xfrm>
+          <a:off x="0" y="0"/>
+          <a:ext cx="0" cy="0"/>
+          <a:chOff x="0" y="0"/>
+          <a:chExt cx="0" cy="0"/>
+        </a:xfrm>
+      </p:grpSpPr>
+      <p:sp>
+        <p:nvSpPr>
+          <p:cNvPr id="2" name="Title 1">
+            <a:extLst>
+              <a:ext uri="{FF2B5EF4-FFF2-40B4-BE49-F238E27FC236}">
+                <a16:creationId xmlns:a16="http://schemas.microsoft.com/office/drawing/2014/main" id="{1834C7CA-DCA9-F8DB-304C-F3E5D5BBD283}"/>
+              </a:ext>
+            </a:extLst>
+          </p:cNvPr>
+          <p:cNvSpPr>
+            <a:spLocks noGrp="1"/>
+          </p:cNvSpPr>
+          <p:nvPr>
+            <p:ph type="title"/>
+          </p:nvPr>
+        </p:nvSpPr>
+        <p:spPr>
+          <a:xfrm>
+            <a:off x="1451579" y="1096069"/>
+            <a:ext cx="9603275" cy="721351"/>
+          </a:xfrm>
+        </p:spPr>
+        <p:txBody>
+          <a:bodyPr>
+            <a:normAutofit/>
+          </a:bodyPr>
+          <a:lstStyle/>
+          <a:p>
+            <a:pPr algn="ctr"/>
+            <a:r>
+              <a:rPr lang="en-US" b="1" i="0" u="none" strike="noStrike" dirty="0">
+                <a:solidFill>
+                  <a:srgbClr val="000000"/>
+                </a:solidFill>
+                <a:effectLst/>
+                <a:latin typeface="Calibri" panose="020F0502020204030204" pitchFamily="34" charset="0"/>
+                <a:cs typeface="Calibri" panose="020F0502020204030204" pitchFamily="34" charset="0"/>
+              </a:rPr>
+              <a:t>Ref</a:t>
+            </a:r>
+            <a:endParaRPr lang="en-US" b="0" i="0" u="none" strike="noStrike" dirty="0">
+              <a:solidFill>
+                <a:srgbClr val="000000"/>
+              </a:solidFill>
+              <a:effectLst/>
+              <a:latin typeface="Calibri" panose="020F0502020204030204" pitchFamily="34" charset="0"/>
+              <a:cs typeface="Calibri" panose="020F0502020204030204" pitchFamily="34" charset="0"/>
+            </a:endParaRPr>
+          </a:p>
+        </p:txBody>
+      </p:sp>
+      <p:sp>
+        <p:nvSpPr>
+          <p:cNvPr id="3" name="Content Placeholder 2">
+            <a:extLst>
+              <a:ext uri="{FF2B5EF4-FFF2-40B4-BE49-F238E27FC236}">
+                <a16:creationId xmlns:a16="http://schemas.microsoft.com/office/drawing/2014/main" id="{8B413D6F-0F6A-A21E-2870-29F22A11001E}"/>
+              </a:ext>
+            </a:extLst>
+          </p:cNvPr>
+          <p:cNvSpPr>
+            <a:spLocks noGrp="1"/>
+          </p:cNvSpPr>
+          <p:nvPr>
+            <p:ph idx="1"/>
+          </p:nvPr>
+        </p:nvSpPr>
+        <p:spPr/>
+        <p:txBody>
+          <a:bodyPr>
+            <a:normAutofit/>
+          </a:bodyPr>
+          <a:lstStyle/>
+          <a:p>
+            <a:pPr algn="l">
+              <a:buFont typeface="Arial" panose="020B0604020202020204" pitchFamily="34" charset="0"/>
+              <a:buChar char="•"/>
+            </a:pPr>
+            <a:r>
+              <a:rPr lang="en-US" dirty="0">
+                <a:latin typeface="Calibri" panose="020F0502020204030204" pitchFamily="34" charset="0"/>
+                <a:cs typeface="Calibri" panose="020F0502020204030204" pitchFamily="34" charset="0"/>
+                <a:hlinkClick r:id="rId2">
+                  <a:extLst>
+                    <a:ext uri="{A12FA001-AC4F-418D-AE19-62706E023703}">
+                      <ahyp:hlinkClr xmlns:ahyp="http://schemas.microsoft.com/office/drawing/2018/hyperlinkcolor" val="tx"/>
+                    </a:ext>
+                  </a:extLst>
+                </a:hlinkClick>
+              </a:rPr>
+              <a:t>https://blog.angular.dev/angular-v18-is-now-available-e79d5ac0affe</a:t>
+            </a:r>
+            <a:endParaRPr lang="en-US" dirty="0">
+              <a:latin typeface="Calibri" panose="020F0502020204030204" pitchFamily="34" charset="0"/>
+              <a:cs typeface="Calibri" panose="020F0502020204030204" pitchFamily="34" charset="0"/>
+            </a:endParaRPr>
+          </a:p>
+          <a:p>
+            <a:pPr algn="l">
+              <a:buFont typeface="Arial" panose="020B0604020202020204" pitchFamily="34" charset="0"/>
+              <a:buChar char="•"/>
+            </a:pPr>
+            <a:r>
+              <a:rPr lang="en-US" dirty="0">
+                <a:latin typeface="Calibri" panose="020F0502020204030204" pitchFamily="34" charset="0"/>
+                <a:cs typeface="Calibri" panose="020F0502020204030204" pitchFamily="34" charset="0"/>
+                <a:hlinkClick r:id="rId3">
+                  <a:extLst>
+                    <a:ext uri="{A12FA001-AC4F-418D-AE19-62706E023703}">
+                      <ahyp:hlinkClr xmlns:ahyp="http://schemas.microsoft.com/office/drawing/2018/hyperlinkcolor" val="tx"/>
+                    </a:ext>
+                  </a:extLst>
+                </a:hlinkClick>
+              </a:rPr>
+              <a:t>https://blog.angular.dev/meet-angular-v19-7b29dfd05b8</a:t>
+            </a:r>
+            <a:r>
+              <a:rPr lang="en-US" dirty="0">
+                <a:latin typeface="Calibri" panose="020F0502020204030204" pitchFamily="34" charset="0"/>
+                <a:cs typeface="Calibri" panose="020F0502020204030204" pitchFamily="34" charset="0"/>
+              </a:rPr>
+              <a:t>4</a:t>
+            </a:r>
+          </a:p>
+          <a:p>
+            <a:pPr algn="l">
+              <a:buFont typeface="Arial" panose="020B0604020202020204" pitchFamily="34" charset="0"/>
+              <a:buChar char="•"/>
+            </a:pPr>
+            <a:r>
+              <a:rPr lang="en-US" dirty="0">
+                <a:latin typeface="Calibri" panose="020F0502020204030204" pitchFamily="34" charset="0"/>
+                <a:cs typeface="Calibri" panose="020F0502020204030204" pitchFamily="34" charset="0"/>
+                <a:hlinkClick r:id="rId4"/>
+              </a:rPr>
+              <a:t>https://angular.dev/overview</a:t>
+            </a:r>
+            <a:endParaRPr lang="en-US" dirty="0">
+              <a:latin typeface="Calibri" panose="020F0502020204030204" pitchFamily="34" charset="0"/>
+              <a:cs typeface="Calibri" panose="020F0502020204030204" pitchFamily="34" charset="0"/>
+            </a:endParaRPr>
+          </a:p>
+          <a:p>
+            <a:pPr algn="l">
+              <a:buFont typeface="Arial" panose="020B0604020202020204" pitchFamily="34" charset="0"/>
+              <a:buChar char="•"/>
+            </a:pPr>
+            <a:r>
+              <a:rPr lang="en-US" dirty="0" err="1">
+                <a:latin typeface="Calibri" panose="020F0502020204030204" pitchFamily="34" charset="0"/>
+                <a:cs typeface="Calibri" panose="020F0502020204030204" pitchFamily="34" charset="0"/>
+              </a:rPr>
+              <a:t>Youtube</a:t>
+            </a:r>
+            <a:r>
+              <a:rPr lang="en-US" dirty="0">
+                <a:latin typeface="Calibri" panose="020F0502020204030204" pitchFamily="34" charset="0"/>
+                <a:cs typeface="Calibri" panose="020F0502020204030204" pitchFamily="34" charset="0"/>
+              </a:rPr>
+              <a:t> angular channel.</a:t>
+            </a:r>
+          </a:p>
+          <a:p>
+            <a:pPr algn="l">
+              <a:buFont typeface="Arial" panose="020B0604020202020204" pitchFamily="34" charset="0"/>
+              <a:buChar char="•"/>
+            </a:pPr>
+            <a:r>
+              <a:rPr lang="en-US" dirty="0">
+                <a:latin typeface="Calibri" panose="020F0502020204030204" pitchFamily="34" charset="0"/>
+                <a:cs typeface="Calibri" panose="020F0502020204030204" pitchFamily="34" charset="0"/>
+              </a:rPr>
+              <a:t>https://</a:t>
+            </a:r>
+            <a:r>
+              <a:rPr lang="en-US" dirty="0" err="1">
+                <a:latin typeface="Calibri" panose="020F0502020204030204" pitchFamily="34" charset="0"/>
+                <a:cs typeface="Calibri" panose="020F0502020204030204" pitchFamily="34" charset="0"/>
+              </a:rPr>
+              <a:t>github.com</a:t>
+            </a:r>
+            <a:r>
+              <a:rPr lang="en-US" dirty="0">
+                <a:latin typeface="Calibri" panose="020F0502020204030204" pitchFamily="34" charset="0"/>
+                <a:cs typeface="Calibri" panose="020F0502020204030204" pitchFamily="34" charset="0"/>
+              </a:rPr>
+              <a:t>/</a:t>
+            </a:r>
+            <a:r>
+              <a:rPr lang="en-US" dirty="0" err="1">
+                <a:latin typeface="Calibri" panose="020F0502020204030204" pitchFamily="34" charset="0"/>
+                <a:cs typeface="Calibri" panose="020F0502020204030204" pitchFamily="34" charset="0"/>
+              </a:rPr>
+              <a:t>TriBuiQuang</a:t>
+            </a:r>
+            <a:r>
+              <a:rPr lang="en-US" dirty="0">
+                <a:latin typeface="Calibri" panose="020F0502020204030204" pitchFamily="34" charset="0"/>
+                <a:cs typeface="Calibri" panose="020F0502020204030204" pitchFamily="34" charset="0"/>
+              </a:rPr>
+              <a:t>/demo_angular_19</a:t>
+            </a:r>
+          </a:p>
+          <a:p>
+            <a:pPr marL="0" indent="0" algn="l">
+              <a:buNone/>
+            </a:pPr>
+            <a:endParaRPr lang="en-US" dirty="0">
+              <a:latin typeface="Calibri" panose="020F0502020204030204" pitchFamily="34" charset="0"/>
+              <a:cs typeface="Calibri" panose="020F0502020204030204" pitchFamily="34" charset="0"/>
+            </a:endParaRPr>
+          </a:p>
+        </p:txBody>
+      </p:sp>
+    </p:spTree>
+    <p:extLst>
+      <p:ext uri="{BB962C8B-B14F-4D97-AF65-F5344CB8AC3E}">
+        <p14:creationId xmlns:p14="http://schemas.microsoft.com/office/powerpoint/2010/main" val="1666678009"/>
+      </p:ext>
+    </p:extLst>
+  </p:cSld>
+  <p:clrMapOvr>
+    <a:masterClrMapping/>
+  </p:clrMapOvr>
+</p:sld>
+</file>
+
+<file path=ppt/slides/slide19.xml><?xml version="1.0" encoding="utf-8"?>
+<p:sld xmlns:a="http://schemas.openxmlformats.org/drawingml/2006/main" xmlns:r="http://schemas.openxmlformats.org/officeDocument/2006/relationships" xmlns:p="http://schemas.openxmlformats.org/presentationml/2006/main">
+  <p:cSld>
+    <p:spTree>
+      <p:nvGrpSpPr>
+        <p:cNvPr id="1" name="">
+          <a:extLst>
+            <a:ext uri="{FF2B5EF4-FFF2-40B4-BE49-F238E27FC236}">
+              <a16:creationId xmlns:a16="http://schemas.microsoft.com/office/drawing/2014/main" id="{971A5A9E-4464-64B4-FA67-16239C268A84}"/>
+            </a:ext>
+          </a:extLst>
+        </p:cNvPr>
+        <p:cNvGrpSpPr/>
+        <p:nvPr/>
+      </p:nvGrpSpPr>
+      <p:grpSpPr>
+        <a:xfrm>
+          <a:off x="0" y="0"/>
+          <a:ext cx="0" cy="0"/>
+          <a:chOff x="0" y="0"/>
+          <a:chExt cx="0" cy="0"/>
+        </a:xfrm>
+      </p:grpSpPr>
+      <p:sp>
+        <p:nvSpPr>
+          <p:cNvPr id="2" name="Title 1">
+            <a:extLst>
+              <a:ext uri="{FF2B5EF4-FFF2-40B4-BE49-F238E27FC236}">
+                <a16:creationId xmlns:a16="http://schemas.microsoft.com/office/drawing/2014/main" id="{C661B73E-5610-1798-5B96-D13F088E64D6}"/>
+              </a:ext>
+            </a:extLst>
+          </p:cNvPr>
+          <p:cNvSpPr>
+            <a:spLocks noGrp="1"/>
+          </p:cNvSpPr>
+          <p:nvPr>
+            <p:ph type="title"/>
+          </p:nvPr>
+        </p:nvSpPr>
+        <p:spPr>
+          <a:xfrm>
+            <a:off x="1451579" y="1096069"/>
+            <a:ext cx="9603275" cy="721351"/>
+          </a:xfrm>
+        </p:spPr>
+        <p:txBody>
+          <a:bodyPr>
+            <a:normAutofit/>
+          </a:bodyPr>
+          <a:lstStyle/>
+          <a:p>
+            <a:pPr algn="ctr"/>
+            <a:r>
+              <a:rPr lang="en-US" b="1" i="0" u="none" strike="noStrike" dirty="0">
+                <a:solidFill>
+                  <a:srgbClr val="000000"/>
+                </a:solidFill>
+                <a:effectLst/>
+                <a:latin typeface="Calibri" panose="020F0502020204030204" pitchFamily="34" charset="0"/>
+                <a:cs typeface="Calibri" panose="020F0502020204030204" pitchFamily="34" charset="0"/>
+              </a:rPr>
+              <a:t>Angular 18 &amp; 19</a:t>
+            </a:r>
+            <a:endParaRPr lang="en-US" b="0" i="0" u="none" strike="noStrike" dirty="0">
+              <a:solidFill>
+                <a:srgbClr val="000000"/>
+              </a:solidFill>
+              <a:effectLst/>
+              <a:latin typeface="Calibri" panose="020F0502020204030204" pitchFamily="34" charset="0"/>
+              <a:cs typeface="Calibri" panose="020F0502020204030204" pitchFamily="34" charset="0"/>
+            </a:endParaRPr>
+          </a:p>
+        </p:txBody>
+      </p:sp>
+      <p:sp>
+        <p:nvSpPr>
+          <p:cNvPr id="3" name="Content Placeholder 2">
+            <a:extLst>
+              <a:ext uri="{FF2B5EF4-FFF2-40B4-BE49-F238E27FC236}">
+                <a16:creationId xmlns:a16="http://schemas.microsoft.com/office/drawing/2014/main" id="{EDD13A85-C35B-D3FE-EB7C-3E657D8162E8}"/>
+              </a:ext>
+            </a:extLst>
+          </p:cNvPr>
+          <p:cNvSpPr>
+            <a:spLocks noGrp="1"/>
+          </p:cNvSpPr>
+          <p:nvPr>
+            <p:ph idx="1"/>
+          </p:nvPr>
+        </p:nvSpPr>
+        <p:spPr/>
+        <p:txBody>
+          <a:bodyPr anchor="ctr">
+            <a:normAutofit/>
+          </a:bodyPr>
+          <a:lstStyle/>
+          <a:p>
+            <a:pPr marL="0" indent="0" algn="ctr">
+              <a:buNone/>
+            </a:pPr>
+            <a:r>
+              <a:rPr lang="en-US" sz="2000" b="0" i="0" u="none" strike="noStrike" dirty="0">
+                <a:solidFill>
+                  <a:srgbClr val="000000"/>
+                </a:solidFill>
+                <a:effectLst/>
+                <a:latin typeface="Calibri" panose="020F0502020204030204" pitchFamily="34" charset="0"/>
+                <a:cs typeface="Calibri" panose="020F0502020204030204" pitchFamily="34" charset="0"/>
+              </a:rPr>
+              <a:t>Thank you for your attention!</a:t>
+            </a:r>
+          </a:p>
+        </p:txBody>
+      </p:sp>
+    </p:spTree>
+    <p:extLst>
+      <p:ext uri="{BB962C8B-B14F-4D97-AF65-F5344CB8AC3E}">
+        <p14:creationId xmlns:p14="http://schemas.microsoft.com/office/powerpoint/2010/main" val="609541774"/>
+      </p:ext>
+    </p:extLst>
+  </p:cSld>
+  <p:clrMapOvr>
+    <a:masterClrMapping/>
+  </p:clrMapOvr>
+</p:sld>
+</file>
+
+<file path=ppt/slides/slide2.xml><?xml version="1.0" encoding="utf-8"?>
+<p:sld xmlns:a="http://schemas.openxmlformats.org/drawingml/2006/main" xmlns:r="http://schemas.openxmlformats.org/officeDocument/2006/relationships" xmlns:p="http://schemas.openxmlformats.org/presentationml/2006/main">
+  <p:cSld>
+    <p:spTree>
+      <p:nvGrpSpPr>
+        <p:cNvPr id="1" name=""/>
+        <p:cNvGrpSpPr/>
+        <p:nvPr/>
+      </p:nvGrpSpPr>
+      <p:grpSpPr>
+        <a:xfrm>
+          <a:off x="0" y="0"/>
+          <a:ext cx="0" cy="0"/>
+          <a:chOff x="0" y="0"/>
+          <a:chExt cx="0" cy="0"/>
+        </a:xfrm>
+      </p:grpSpPr>
+      <p:sp>
+        <p:nvSpPr>
+          <p:cNvPr id="2" name="Title 1">
+            <a:extLst>
+              <a:ext uri="{FF2B5EF4-FFF2-40B4-BE49-F238E27FC236}">
+                <a16:creationId xmlns:a16="http://schemas.microsoft.com/office/drawing/2014/main" id="{0D6122DA-451B-06D4-CA33-2C048EAB9C32}"/>
+              </a:ext>
+            </a:extLst>
+          </p:cNvPr>
+          <p:cNvSpPr>
+            <a:spLocks noGrp="1"/>
+          </p:cNvSpPr>
+          <p:nvPr>
+            <p:ph type="title"/>
+          </p:nvPr>
+        </p:nvSpPr>
+        <p:spPr>
+          <a:xfrm>
+            <a:off x="1451579" y="1208762"/>
+            <a:ext cx="9603275" cy="583704"/>
+          </a:xfrm>
+        </p:spPr>
+        <p:txBody>
+          <a:bodyPr>
+            <a:normAutofit/>
+          </a:bodyPr>
+          <a:lstStyle/>
+          <a:p>
+            <a:pPr algn="ctr"/>
+            <a:r>
+              <a:rPr lang="en-VN" b="1" dirty="0">
+                <a:latin typeface="Calibri" panose="020F0502020204030204" pitchFamily="34" charset="0"/>
+                <a:cs typeface="Calibri" panose="020F0502020204030204" pitchFamily="34" charset="0"/>
+              </a:rPr>
+              <a:t>Overview:</a:t>
+            </a:r>
+          </a:p>
+        </p:txBody>
+      </p:sp>
+      <p:sp>
+        <p:nvSpPr>
+          <p:cNvPr id="3" name="Content Placeholder 2">
+            <a:extLst>
+              <a:ext uri="{FF2B5EF4-FFF2-40B4-BE49-F238E27FC236}">
+                <a16:creationId xmlns:a16="http://schemas.microsoft.com/office/drawing/2014/main" id="{31ED5CB6-A2DF-771D-1206-91462445BE62}"/>
+              </a:ext>
+            </a:extLst>
+          </p:cNvPr>
+          <p:cNvSpPr>
+            <a:spLocks noGrp="1"/>
+          </p:cNvSpPr>
+          <p:nvPr>
+            <p:ph idx="1"/>
+          </p:nvPr>
+        </p:nvSpPr>
+        <p:spPr/>
+        <p:txBody>
+          <a:bodyPr>
+            <a:normAutofit/>
+          </a:bodyPr>
+          <a:lstStyle/>
+          <a:p>
+            <a:pPr marL="457200" indent="-457200">
+              <a:buFont typeface="+mj-lt"/>
+              <a:buAutoNum type="arabicPeriod"/>
+            </a:pPr>
+            <a:r>
+              <a:rPr lang="en-US" sz="2800" b="0" i="0" u="none" strike="noStrike" dirty="0">
+                <a:solidFill>
+                  <a:srgbClr val="000000"/>
+                </a:solidFill>
+                <a:effectLst/>
+                <a:latin typeface="Calibri" panose="020F0502020204030204" pitchFamily="34" charset="0"/>
+                <a:cs typeface="Calibri" panose="020F0502020204030204" pitchFamily="34" charset="0"/>
+              </a:rPr>
+              <a:t>What’s New in Angular 18?</a:t>
+            </a:r>
+            <a:endParaRPr lang="en-VN" sz="2800" dirty="0">
+              <a:latin typeface="Calibri" panose="020F0502020204030204" pitchFamily="34" charset="0"/>
+              <a:cs typeface="Calibri" panose="020F0502020204030204" pitchFamily="34" charset="0"/>
+            </a:endParaRPr>
+          </a:p>
+          <a:p>
+            <a:pPr algn="l">
+              <a:buFont typeface="+mj-lt"/>
+              <a:buAutoNum type="arabicPeriod"/>
+            </a:pPr>
+            <a:r>
+              <a:rPr lang="en-US" sz="2800" b="0" i="0" u="none" strike="noStrike" dirty="0">
+                <a:solidFill>
+                  <a:srgbClr val="000000"/>
+                </a:solidFill>
+                <a:effectLst/>
+                <a:latin typeface="Calibri" panose="020F0502020204030204" pitchFamily="34" charset="0"/>
+                <a:cs typeface="Calibri" panose="020F0502020204030204" pitchFamily="34" charset="0"/>
+              </a:rPr>
+              <a:t>  What’s New in Angular 19?</a:t>
+            </a:r>
+          </a:p>
+          <a:p>
+            <a:pPr algn="l">
+              <a:buFont typeface="+mj-lt"/>
+              <a:buAutoNum type="arabicPeriod"/>
+            </a:pPr>
+            <a:r>
+              <a:rPr lang="en-US" sz="2800" b="0" i="0" u="none" strike="noStrike" dirty="0">
+                <a:solidFill>
+                  <a:srgbClr val="000000"/>
+                </a:solidFill>
+                <a:effectLst/>
+                <a:latin typeface="Calibri" panose="020F0502020204030204" pitchFamily="34" charset="0"/>
+                <a:cs typeface="Calibri" panose="020F0502020204030204" pitchFamily="34" charset="0"/>
+              </a:rPr>
+              <a:t>  Why These Updates Matter?</a:t>
+            </a:r>
+          </a:p>
+          <a:p>
+            <a:pPr algn="l">
+              <a:buFont typeface="+mj-lt"/>
+              <a:buAutoNum type="arabicPeriod"/>
+            </a:pPr>
+            <a:r>
+              <a:rPr lang="en-US" sz="2800" b="0" i="0" u="none" strike="noStrike" dirty="0">
+                <a:solidFill>
+                  <a:srgbClr val="000000"/>
+                </a:solidFill>
+                <a:effectLst/>
+                <a:latin typeface="Calibri" panose="020F0502020204030204" pitchFamily="34" charset="0"/>
+                <a:cs typeface="Calibri" panose="020F0502020204030204" pitchFamily="34" charset="0"/>
+              </a:rPr>
+              <a:t>  How These Features Work?</a:t>
+            </a:r>
+          </a:p>
+        </p:txBody>
+      </p:sp>
+    </p:spTree>
+    <p:extLst>
+      <p:ext uri="{BB962C8B-B14F-4D97-AF65-F5344CB8AC3E}">
+        <p14:creationId xmlns:p14="http://schemas.microsoft.com/office/powerpoint/2010/main" val="4171276522"/>
+      </p:ext>
+    </p:extLst>
+  </p:cSld>
+  <p:clrMapOvr>
+    <a:masterClrMapping/>
+  </p:clrMapOvr>
+</p:sld>
+</file>
+
+<file path=ppt/slides/slide3.xml><?xml version="1.0" encoding="utf-8"?>
+<p:sld xmlns:a="http://schemas.openxmlformats.org/drawingml/2006/main" xmlns:r="http://schemas.openxmlformats.org/officeDocument/2006/relationships" xmlns:p="http://schemas.openxmlformats.org/presentationml/2006/main">
+  <p:cSld>
+    <p:spTree>
+      <p:nvGrpSpPr>
+        <p:cNvPr id="1" name=""/>
+        <p:cNvGrpSpPr/>
+        <p:nvPr/>
+      </p:nvGrpSpPr>
+      <p:grpSpPr>
+        <a:xfrm>
+          <a:off x="0" y="0"/>
+          <a:ext cx="0" cy="0"/>
+          <a:chOff x="0" y="0"/>
+          <a:chExt cx="0" cy="0"/>
+        </a:xfrm>
+      </p:grpSpPr>
+      <p:sp>
+        <p:nvSpPr>
+          <p:cNvPr id="2" name="Title 1">
+            <a:extLst>
+              <a:ext uri="{FF2B5EF4-FFF2-40B4-BE49-F238E27FC236}">
+                <a16:creationId xmlns:a16="http://schemas.microsoft.com/office/drawing/2014/main" id="{72E14B04-A7F0-7A10-8F37-D00AC0AFB68C}"/>
+              </a:ext>
+            </a:extLst>
+          </p:cNvPr>
+          <p:cNvSpPr>
+            <a:spLocks noGrp="1"/>
+          </p:cNvSpPr>
+          <p:nvPr>
+            <p:ph type="title"/>
+          </p:nvPr>
+        </p:nvSpPr>
+        <p:spPr>
+          <a:xfrm>
+            <a:off x="1451579" y="739036"/>
+            <a:ext cx="9603275" cy="1041319"/>
+          </a:xfrm>
+        </p:spPr>
+        <p:txBody>
+          <a:bodyPr>
+            <a:noAutofit/>
+          </a:bodyPr>
+          <a:lstStyle/>
+          <a:p>
+            <a:pPr algn="ctr"/>
+            <a:r>
+              <a:rPr lang="en-US" b="1" i="0" u="none" strike="noStrike" dirty="0">
+                <a:solidFill>
+                  <a:srgbClr val="000000"/>
+                </a:solidFill>
+                <a:effectLst/>
+                <a:latin typeface="Calibri" panose="020F0502020204030204" pitchFamily="34" charset="0"/>
+                <a:cs typeface="Calibri" panose="020F0502020204030204" pitchFamily="34" charset="0"/>
+              </a:rPr>
+              <a:t>What’s New in </a:t>
+            </a:r>
+            <a:br>
+              <a:rPr lang="en-US" b="1" i="0" u="none" strike="noStrike" dirty="0">
+                <a:solidFill>
+                  <a:srgbClr val="000000"/>
+                </a:solidFill>
+                <a:effectLst/>
+                <a:latin typeface="Calibri" panose="020F0502020204030204" pitchFamily="34" charset="0"/>
+                <a:cs typeface="Calibri" panose="020F0502020204030204" pitchFamily="34" charset="0"/>
+              </a:rPr>
+            </a:br>
+            <a:r>
+              <a:rPr lang="en-US" b="1" i="0" u="none" strike="noStrike" dirty="0">
+                <a:solidFill>
+                  <a:srgbClr val="000000"/>
+                </a:solidFill>
+                <a:effectLst/>
+                <a:latin typeface="Calibri" panose="020F0502020204030204" pitchFamily="34" charset="0"/>
+                <a:cs typeface="Calibri" panose="020F0502020204030204" pitchFamily="34" charset="0"/>
+              </a:rPr>
+              <a:t>Angular 18</a:t>
+            </a:r>
+            <a:endParaRPr lang="en-VN" b="1" cap="none" dirty="0">
+              <a:latin typeface="Calibri" panose="020F0502020204030204" pitchFamily="34" charset="0"/>
+              <a:cs typeface="Calibri" panose="020F0502020204030204" pitchFamily="34" charset="0"/>
+            </a:endParaRPr>
+          </a:p>
+        </p:txBody>
+      </p:sp>
+      <p:sp>
+        <p:nvSpPr>
+          <p:cNvPr id="3" name="Content Placeholder 2">
+            <a:extLst>
+              <a:ext uri="{FF2B5EF4-FFF2-40B4-BE49-F238E27FC236}">
+                <a16:creationId xmlns:a16="http://schemas.microsoft.com/office/drawing/2014/main" id="{D1E9E962-B00D-6AC5-7322-C3D4944A2870}"/>
+              </a:ext>
+            </a:extLst>
+          </p:cNvPr>
+          <p:cNvSpPr>
+            <a:spLocks noGrp="1"/>
+          </p:cNvSpPr>
+          <p:nvPr>
+            <p:ph idx="1"/>
+          </p:nvPr>
+        </p:nvSpPr>
+        <p:spPr/>
+        <p:txBody>
+          <a:bodyPr>
+            <a:normAutofit/>
+          </a:bodyPr>
+          <a:lstStyle/>
+          <a:p>
+            <a:pPr>
+              <a:buFont typeface="Wingdings" pitchFamily="2" charset="2"/>
+              <a:buChar char="Ø"/>
+            </a:pPr>
+            <a:r>
+              <a:rPr lang="en-US" sz="3200" i="0" u="none" strike="noStrike" dirty="0">
+                <a:solidFill>
+                  <a:srgbClr val="000000"/>
+                </a:solidFill>
+                <a:effectLst/>
+                <a:latin typeface="Calibri" panose="020F0502020204030204" pitchFamily="34" charset="0"/>
+                <a:cs typeface="Calibri" panose="020F0502020204030204" pitchFamily="34" charset="0"/>
+              </a:rPr>
+              <a:t> Zoneless Change Detection (Experimental)</a:t>
+            </a:r>
+          </a:p>
+          <a:p>
+            <a:pPr>
+              <a:buFont typeface="Wingdings" pitchFamily="2" charset="2"/>
+              <a:buChar char="Ø"/>
+            </a:pPr>
+            <a:r>
+              <a:rPr lang="en-US" sz="3200" dirty="0">
+                <a:solidFill>
+                  <a:srgbClr val="000000"/>
+                </a:solidFill>
+                <a:latin typeface="Calibri" panose="020F0502020204030204" pitchFamily="34" charset="0"/>
+                <a:cs typeface="Calibri" panose="020F0502020204030204" pitchFamily="34" charset="0"/>
+              </a:rPr>
+              <a:t>Deferable Views and Built-in Control Flow</a:t>
+            </a:r>
+            <a:endParaRPr lang="en-US" sz="3200" i="0" u="none" strike="noStrike" dirty="0">
+              <a:solidFill>
+                <a:srgbClr val="000000"/>
+              </a:solidFill>
+              <a:effectLst/>
+              <a:latin typeface="Calibri" panose="020F0502020204030204" pitchFamily="34" charset="0"/>
+              <a:cs typeface="Calibri" panose="020F0502020204030204" pitchFamily="34" charset="0"/>
+            </a:endParaRPr>
+          </a:p>
+          <a:p>
+            <a:pPr>
+              <a:buFont typeface="Wingdings" pitchFamily="2" charset="2"/>
+              <a:buChar char="ü"/>
+            </a:pPr>
+            <a:endParaRPr lang="en-VN" sz="3200" dirty="0">
+              <a:latin typeface="Calibri" panose="020F0502020204030204" pitchFamily="34" charset="0"/>
+              <a:cs typeface="Calibri" panose="020F0502020204030204" pitchFamily="34" charset="0"/>
+            </a:endParaRPr>
+          </a:p>
+        </p:txBody>
+      </p:sp>
+    </p:spTree>
+    <p:extLst>
+      <p:ext uri="{BB962C8B-B14F-4D97-AF65-F5344CB8AC3E}">
+        <p14:creationId xmlns:p14="http://schemas.microsoft.com/office/powerpoint/2010/main" val="3563023069"/>
+      </p:ext>
+    </p:extLst>
+  </p:cSld>
+  <p:clrMapOvr>
+    <a:masterClrMapping/>
+  </p:clrMapOvr>
+</p:sld>
+</file>
+
+<file path=ppt/slides/slide4.xml><?xml version="1.0" encoding="utf-8"?>
+<p:sld xmlns:a="http://schemas.openxmlformats.org/drawingml/2006/main" xmlns:r="http://schemas.openxmlformats.org/officeDocument/2006/relationships" xmlns:p="http://schemas.openxmlformats.org/presentationml/2006/main">
+  <p:cSld>
+    <p:spTree>
+      <p:nvGrpSpPr>
+        <p:cNvPr id="1" name="">
+          <a:extLst>
+            <a:ext uri="{FF2B5EF4-FFF2-40B4-BE49-F238E27FC236}">
+              <a16:creationId xmlns:a16="http://schemas.microsoft.com/office/drawing/2014/main" id="{28A60BC1-6360-71D0-F7B6-8AA85C97F3A0}"/>
+            </a:ext>
+          </a:extLst>
+        </p:cNvPr>
+        <p:cNvGrpSpPr/>
+        <p:nvPr/>
+      </p:nvGrpSpPr>
+      <p:grpSpPr>
+        <a:xfrm>
+          <a:off x="0" y="0"/>
+          <a:ext cx="0" cy="0"/>
+          <a:chOff x="0" y="0"/>
+          <a:chExt cx="0" cy="0"/>
+        </a:xfrm>
+      </p:grpSpPr>
+      <p:sp>
+        <p:nvSpPr>
+          <p:cNvPr id="2" name="Title 1">
+            <a:extLst>
+              <a:ext uri="{FF2B5EF4-FFF2-40B4-BE49-F238E27FC236}">
+                <a16:creationId xmlns:a16="http://schemas.microsoft.com/office/drawing/2014/main" id="{C8854330-0B11-0670-5484-C30D3E8CAA3D}"/>
+              </a:ext>
+            </a:extLst>
+          </p:cNvPr>
+          <p:cNvSpPr>
+            <a:spLocks noGrp="1"/>
+          </p:cNvSpPr>
+          <p:nvPr>
+            <p:ph type="title"/>
+          </p:nvPr>
+        </p:nvSpPr>
+        <p:spPr>
+          <a:xfrm>
+            <a:off x="1451579" y="739036"/>
+            <a:ext cx="9603275" cy="1041319"/>
+          </a:xfrm>
+        </p:spPr>
+        <p:txBody>
+          <a:bodyPr>
+            <a:noAutofit/>
+          </a:bodyPr>
+          <a:lstStyle/>
+          <a:p>
+            <a:pPr algn="ctr"/>
+            <a:r>
+              <a:rPr lang="en-US" sz="3200" b="1" i="0" u="none" strike="noStrike" dirty="0">
+                <a:solidFill>
+                  <a:srgbClr val="000000"/>
+                </a:solidFill>
+                <a:effectLst/>
+                <a:latin typeface="Calibri" panose="020F0502020204030204" pitchFamily="34" charset="0"/>
+                <a:cs typeface="Calibri" panose="020F0502020204030204" pitchFamily="34" charset="0"/>
+              </a:rPr>
+              <a:t>Zoneless Change Detection </a:t>
+            </a:r>
+            <a:br>
+              <a:rPr lang="en-US" sz="3200" b="1" i="0" u="none" strike="noStrike" dirty="0">
+                <a:solidFill>
+                  <a:srgbClr val="000000"/>
+                </a:solidFill>
+                <a:effectLst/>
+                <a:latin typeface="Calibri" panose="020F0502020204030204" pitchFamily="34" charset="0"/>
+                <a:cs typeface="Calibri" panose="020F0502020204030204" pitchFamily="34" charset="0"/>
+              </a:rPr>
+            </a:br>
+            <a:r>
+              <a:rPr lang="en-US" sz="3200" i="0" u="none" strike="noStrike" dirty="0">
+                <a:solidFill>
+                  <a:srgbClr val="000000"/>
+                </a:solidFill>
+                <a:effectLst/>
+                <a:latin typeface="Calibri" panose="020F0502020204030204" pitchFamily="34" charset="0"/>
+                <a:cs typeface="Calibri" panose="020F0502020204030204" pitchFamily="34" charset="0"/>
+              </a:rPr>
+              <a:t>(Experimental)</a:t>
+            </a:r>
+            <a:br>
+              <a:rPr lang="en-US" sz="3200" i="0" u="none" strike="noStrike" dirty="0">
+                <a:solidFill>
+                  <a:srgbClr val="000000"/>
+                </a:solidFill>
+                <a:effectLst/>
+                <a:latin typeface="Calibri" panose="020F0502020204030204" pitchFamily="34" charset="0"/>
+                <a:cs typeface="Calibri" panose="020F0502020204030204" pitchFamily="34" charset="0"/>
+              </a:rPr>
+            </a:br>
+            <a:endParaRPr lang="en-VN" b="1" cap="none" dirty="0">
+              <a:latin typeface="Calibri" panose="020F0502020204030204" pitchFamily="34" charset="0"/>
+              <a:cs typeface="Calibri" panose="020F0502020204030204" pitchFamily="34" charset="0"/>
+            </a:endParaRPr>
+          </a:p>
+        </p:txBody>
+      </p:sp>
+      <p:sp>
+        <p:nvSpPr>
+          <p:cNvPr id="3" name="Content Placeholder 2">
+            <a:extLst>
+              <a:ext uri="{FF2B5EF4-FFF2-40B4-BE49-F238E27FC236}">
+                <a16:creationId xmlns:a16="http://schemas.microsoft.com/office/drawing/2014/main" id="{224CC366-5B9A-A5C5-CF73-E592161A401A}"/>
+              </a:ext>
+            </a:extLst>
+          </p:cNvPr>
+          <p:cNvSpPr>
+            <a:spLocks noGrp="1"/>
+          </p:cNvSpPr>
+          <p:nvPr>
+            <p:ph idx="1"/>
+          </p:nvPr>
+        </p:nvSpPr>
+        <p:spPr/>
+        <p:txBody>
+          <a:bodyPr>
+            <a:normAutofit/>
+          </a:bodyPr>
+          <a:lstStyle/>
+          <a:p>
+            <a:pPr>
+              <a:buNone/>
+            </a:pPr>
+            <a:r>
+              <a:rPr lang="en-US" sz="2800" b="1" dirty="0">
+                <a:latin typeface="Calibri" panose="020F0502020204030204" pitchFamily="34" charset="0"/>
+                <a:cs typeface="Calibri" panose="020F0502020204030204" pitchFamily="34" charset="0"/>
+              </a:rPr>
+              <a:t>Traditional Angular and </a:t>
+            </a:r>
+            <a:r>
+              <a:rPr lang="en-US" sz="2800" b="1" dirty="0" err="1">
+                <a:latin typeface="Calibri" panose="020F0502020204030204" pitchFamily="34" charset="0"/>
+                <a:cs typeface="Calibri" panose="020F0502020204030204" pitchFamily="34" charset="0"/>
+              </a:rPr>
+              <a:t>Zone.js</a:t>
+            </a:r>
+            <a:r>
+              <a:rPr lang="en-US" sz="2800" b="1" dirty="0">
+                <a:latin typeface="Calibri" panose="020F0502020204030204" pitchFamily="34" charset="0"/>
+                <a:cs typeface="Calibri" panose="020F0502020204030204" pitchFamily="34" charset="0"/>
+              </a:rPr>
+              <a:t>:</a:t>
+            </a:r>
+            <a:endParaRPr lang="en-US" sz="2800" dirty="0">
+              <a:latin typeface="Calibri" panose="020F0502020204030204" pitchFamily="34" charset="0"/>
+              <a:cs typeface="Calibri" panose="020F0502020204030204" pitchFamily="34" charset="0"/>
+            </a:endParaRPr>
+          </a:p>
+          <a:p>
+            <a:pPr>
+              <a:buFont typeface="Arial" panose="020B0604020202020204" pitchFamily="34" charset="0"/>
+              <a:buChar char="•"/>
+            </a:pPr>
+            <a:r>
+              <a:rPr lang="en-US" sz="1900" dirty="0">
+                <a:latin typeface="Calibri" panose="020F0502020204030204" pitchFamily="34" charset="0"/>
+                <a:cs typeface="Calibri" panose="020F0502020204030204" pitchFamily="34" charset="0"/>
+              </a:rPr>
+              <a:t>Traditionally, Angular relies on a library called </a:t>
+            </a:r>
+            <a:r>
+              <a:rPr lang="en-US" sz="1900" b="1" dirty="0" err="1">
+                <a:latin typeface="Calibri" panose="020F0502020204030204" pitchFamily="34" charset="0"/>
+                <a:cs typeface="Calibri" panose="020F0502020204030204" pitchFamily="34" charset="0"/>
+              </a:rPr>
+              <a:t>Zone.js</a:t>
+            </a:r>
+            <a:r>
+              <a:rPr lang="en-US" sz="1900" dirty="0">
+                <a:latin typeface="Calibri" panose="020F0502020204030204" pitchFamily="34" charset="0"/>
+                <a:cs typeface="Calibri" panose="020F0502020204030204" pitchFamily="34" charset="0"/>
+              </a:rPr>
+              <a:t> to </a:t>
+            </a:r>
+            <a:r>
+              <a:rPr lang="en-US" sz="1900" b="1" dirty="0">
+                <a:latin typeface="Calibri" panose="020F0502020204030204" pitchFamily="34" charset="0"/>
+                <a:cs typeface="Calibri" panose="020F0502020204030204" pitchFamily="34" charset="0"/>
+              </a:rPr>
+              <a:t>track</a:t>
+            </a:r>
+            <a:r>
+              <a:rPr lang="en-US" sz="1900" dirty="0">
+                <a:latin typeface="Calibri" panose="020F0502020204030204" pitchFamily="34" charset="0"/>
+                <a:cs typeface="Calibri" panose="020F0502020204030204" pitchFamily="34" charset="0"/>
+              </a:rPr>
+              <a:t> </a:t>
+            </a:r>
+            <a:r>
+              <a:rPr lang="en-US" sz="1900" b="1" dirty="0">
+                <a:latin typeface="Calibri" panose="020F0502020204030204" pitchFamily="34" charset="0"/>
+                <a:cs typeface="Calibri" panose="020F0502020204030204" pitchFamily="34" charset="0"/>
+              </a:rPr>
+              <a:t>asynchronous operatio</a:t>
+            </a:r>
+            <a:r>
+              <a:rPr lang="en-US" sz="1900" dirty="0">
+                <a:latin typeface="Calibri" panose="020F0502020204030204" pitchFamily="34" charset="0"/>
+                <a:cs typeface="Calibri" panose="020F0502020204030204" pitchFamily="34" charset="0"/>
+              </a:rPr>
+              <a:t>ns (like timeouts, network requests, and user events).</a:t>
+            </a:r>
+          </a:p>
+          <a:p>
+            <a:pPr>
+              <a:buFont typeface="Arial" panose="020B0604020202020204" pitchFamily="34" charset="0"/>
+              <a:buChar char="•"/>
+            </a:pPr>
+            <a:r>
+              <a:rPr lang="en-US" sz="1900" dirty="0" err="1">
+                <a:latin typeface="Calibri" panose="020F0502020204030204" pitchFamily="34" charset="0"/>
+                <a:cs typeface="Calibri" panose="020F0502020204030204" pitchFamily="34" charset="0"/>
+              </a:rPr>
+              <a:t>Zone.js</a:t>
+            </a:r>
+            <a:r>
+              <a:rPr lang="en-US" sz="1900" dirty="0">
+                <a:latin typeface="Calibri" panose="020F0502020204030204" pitchFamily="34" charset="0"/>
+                <a:cs typeface="Calibri" panose="020F0502020204030204" pitchFamily="34" charset="0"/>
+              </a:rPr>
+              <a:t> "monkey-patches”(</a:t>
+            </a:r>
+            <a:r>
+              <a:rPr lang="en-US" sz="1400" dirty="0">
+                <a:latin typeface="Calibri" panose="020F0502020204030204" pitchFamily="34" charset="0"/>
+                <a:cs typeface="Calibri" panose="020F0502020204030204" pitchFamily="34" charset="0"/>
+              </a:rPr>
+              <a:t>modifying or extending existing code at runtime</a:t>
+            </a:r>
+            <a:r>
+              <a:rPr lang="en-US" sz="1900" dirty="0">
+                <a:latin typeface="Calibri" panose="020F0502020204030204" pitchFamily="34" charset="0"/>
+                <a:cs typeface="Calibri" panose="020F0502020204030204" pitchFamily="34" charset="0"/>
+              </a:rPr>
+              <a:t>) these operations, allowing Angular to </a:t>
+            </a:r>
+            <a:r>
+              <a:rPr lang="en-US" sz="1900" b="1" dirty="0">
+                <a:latin typeface="Calibri" panose="020F0502020204030204" pitchFamily="34" charset="0"/>
+                <a:cs typeface="Calibri" panose="020F0502020204030204" pitchFamily="34" charset="0"/>
+              </a:rPr>
+              <a:t>automatically trigger change detectio</a:t>
+            </a:r>
+            <a:r>
+              <a:rPr lang="en-US" sz="1900" dirty="0">
+                <a:latin typeface="Calibri" panose="020F0502020204030204" pitchFamily="34" charset="0"/>
+                <a:cs typeface="Calibri" panose="020F0502020204030204" pitchFamily="34" charset="0"/>
+              </a:rPr>
+              <a:t>n whenever they occur.</a:t>
+            </a:r>
+          </a:p>
+          <a:p>
+            <a:pPr>
+              <a:buFont typeface="Arial" panose="020B0604020202020204" pitchFamily="34" charset="0"/>
+              <a:buChar char="•"/>
+            </a:pPr>
+            <a:r>
+              <a:rPr lang="en-US" sz="1900" dirty="0">
+                <a:latin typeface="Calibri" panose="020F0502020204030204" pitchFamily="34" charset="0"/>
+                <a:cs typeface="Calibri" panose="020F0502020204030204" pitchFamily="34" charset="0"/>
+              </a:rPr>
+              <a:t>While this simplifies development, it can lead to </a:t>
+            </a:r>
+            <a:r>
+              <a:rPr lang="en-US" sz="1900" b="1" dirty="0">
+                <a:latin typeface="Calibri" panose="020F0502020204030204" pitchFamily="34" charset="0"/>
+                <a:cs typeface="Calibri" panose="020F0502020204030204" pitchFamily="34" charset="0"/>
+              </a:rPr>
+              <a:t>unnecessary change detection </a:t>
+            </a:r>
+            <a:r>
+              <a:rPr lang="en-US" sz="1900" dirty="0">
+                <a:latin typeface="Calibri" panose="020F0502020204030204" pitchFamily="34" charset="0"/>
+                <a:cs typeface="Calibri" panose="020F0502020204030204" pitchFamily="34" charset="0"/>
+              </a:rPr>
+              <a:t>cycles and </a:t>
+            </a:r>
+            <a:r>
+              <a:rPr lang="en-US" sz="1900" b="1" dirty="0">
+                <a:latin typeface="Calibri" panose="020F0502020204030204" pitchFamily="34" charset="0"/>
+                <a:cs typeface="Calibri" panose="020F0502020204030204" pitchFamily="34" charset="0"/>
+              </a:rPr>
+              <a:t>performance overhead</a:t>
+            </a:r>
+            <a:r>
+              <a:rPr lang="en-US" sz="1900" dirty="0">
+                <a:latin typeface="Calibri" panose="020F0502020204030204" pitchFamily="34" charset="0"/>
+                <a:cs typeface="Calibri" panose="020F0502020204030204" pitchFamily="34" charset="0"/>
+              </a:rPr>
+              <a:t>.</a:t>
+            </a:r>
+          </a:p>
+          <a:p>
+            <a:pPr marL="0" indent="0">
+              <a:buNone/>
+            </a:pPr>
+            <a:endParaRPr lang="en-VN" sz="3200" dirty="0">
+              <a:latin typeface="Calibri" panose="020F0502020204030204" pitchFamily="34" charset="0"/>
+              <a:cs typeface="Calibri" panose="020F0502020204030204" pitchFamily="34" charset="0"/>
+            </a:endParaRPr>
+          </a:p>
+        </p:txBody>
+      </p:sp>
+    </p:spTree>
+    <p:extLst>
+      <p:ext uri="{BB962C8B-B14F-4D97-AF65-F5344CB8AC3E}">
+        <p14:creationId xmlns:p14="http://schemas.microsoft.com/office/powerpoint/2010/main" val="469604727"/>
+      </p:ext>
+    </p:extLst>
+  </p:cSld>
+  <p:clrMapOvr>
+    <a:masterClrMapping/>
+  </p:clrMapOvr>
+</p:sld>
+</file>
+
+<file path=ppt/slides/slide5.xml><?xml version="1.0" encoding="utf-8"?>
+<p:sld xmlns:a="http://schemas.openxmlformats.org/drawingml/2006/main" xmlns:r="http://schemas.openxmlformats.org/officeDocument/2006/relationships" xmlns:p="http://schemas.openxmlformats.org/presentationml/2006/main">
+  <p:cSld>
+    <p:spTree>
+      <p:nvGrpSpPr>
+        <p:cNvPr id="1" name="">
+          <a:extLst>
+            <a:ext uri="{FF2B5EF4-FFF2-40B4-BE49-F238E27FC236}">
+              <a16:creationId xmlns:a16="http://schemas.microsoft.com/office/drawing/2014/main" id="{55EE2901-54EC-28F7-B03D-2B817464A2EE}"/>
+            </a:ext>
+          </a:extLst>
+        </p:cNvPr>
+        <p:cNvGrpSpPr/>
+        <p:nvPr/>
+      </p:nvGrpSpPr>
+      <p:grpSpPr>
+        <a:xfrm>
+          <a:off x="0" y="0"/>
+          <a:ext cx="0" cy="0"/>
+          <a:chOff x="0" y="0"/>
+          <a:chExt cx="0" cy="0"/>
+        </a:xfrm>
+      </p:grpSpPr>
+      <p:sp>
+        <p:nvSpPr>
+          <p:cNvPr id="2" name="Title 1">
+            <a:extLst>
+              <a:ext uri="{FF2B5EF4-FFF2-40B4-BE49-F238E27FC236}">
+                <a16:creationId xmlns:a16="http://schemas.microsoft.com/office/drawing/2014/main" id="{A8F4D9E9-C0F4-4231-3D12-8CDC4A324102}"/>
+              </a:ext>
+            </a:extLst>
+          </p:cNvPr>
+          <p:cNvSpPr>
+            <a:spLocks noGrp="1"/>
+          </p:cNvSpPr>
+          <p:nvPr>
+            <p:ph type="title"/>
+          </p:nvPr>
+        </p:nvSpPr>
+        <p:spPr>
+          <a:xfrm>
+            <a:off x="1451579" y="739036"/>
+            <a:ext cx="9603275" cy="1041319"/>
+          </a:xfrm>
+        </p:spPr>
+        <p:txBody>
+          <a:bodyPr>
+            <a:noAutofit/>
+          </a:bodyPr>
+          <a:lstStyle/>
+          <a:p>
+            <a:pPr algn="ctr"/>
+            <a:r>
+              <a:rPr lang="en-US" sz="3200" b="1" i="0" u="none" strike="noStrike" dirty="0">
+                <a:solidFill>
+                  <a:srgbClr val="000000"/>
+                </a:solidFill>
+                <a:effectLst/>
+                <a:latin typeface="Calibri" panose="020F0502020204030204" pitchFamily="34" charset="0"/>
+                <a:cs typeface="Calibri" panose="020F0502020204030204" pitchFamily="34" charset="0"/>
+              </a:rPr>
+              <a:t>Zoneless Change Detection </a:t>
+            </a:r>
+            <a:br>
+              <a:rPr lang="en-US" sz="3200" b="1" i="0" u="none" strike="noStrike" dirty="0">
+                <a:solidFill>
+                  <a:srgbClr val="000000"/>
+                </a:solidFill>
+                <a:effectLst/>
+                <a:latin typeface="Calibri" panose="020F0502020204030204" pitchFamily="34" charset="0"/>
+                <a:cs typeface="Calibri" panose="020F0502020204030204" pitchFamily="34" charset="0"/>
+              </a:rPr>
+            </a:br>
+            <a:r>
+              <a:rPr lang="en-US" sz="3200" i="0" u="none" strike="noStrike" dirty="0">
+                <a:solidFill>
+                  <a:srgbClr val="000000"/>
+                </a:solidFill>
+                <a:effectLst/>
+                <a:latin typeface="Calibri" panose="020F0502020204030204" pitchFamily="34" charset="0"/>
+                <a:cs typeface="Calibri" panose="020F0502020204030204" pitchFamily="34" charset="0"/>
+              </a:rPr>
+              <a:t>(Experimental)</a:t>
+            </a:r>
+            <a:br>
+              <a:rPr lang="en-US" sz="3200" i="0" u="none" strike="noStrike" dirty="0">
+                <a:solidFill>
+                  <a:srgbClr val="000000"/>
+                </a:solidFill>
+                <a:effectLst/>
+                <a:latin typeface="Calibri" panose="020F0502020204030204" pitchFamily="34" charset="0"/>
+                <a:cs typeface="Calibri" panose="020F0502020204030204" pitchFamily="34" charset="0"/>
+              </a:rPr>
+            </a:br>
+            <a:endParaRPr lang="en-VN" b="1" cap="none" dirty="0">
+              <a:latin typeface="Calibri" panose="020F0502020204030204" pitchFamily="34" charset="0"/>
+              <a:cs typeface="Calibri" panose="020F0502020204030204" pitchFamily="34" charset="0"/>
+            </a:endParaRPr>
+          </a:p>
+        </p:txBody>
+      </p:sp>
+      <p:sp>
+        <p:nvSpPr>
+          <p:cNvPr id="3" name="Content Placeholder 2">
+            <a:extLst>
+              <a:ext uri="{FF2B5EF4-FFF2-40B4-BE49-F238E27FC236}">
+                <a16:creationId xmlns:a16="http://schemas.microsoft.com/office/drawing/2014/main" id="{17AF1BCF-3E2D-5E1B-674E-6DEB6B1FCC76}"/>
+              </a:ext>
+            </a:extLst>
+          </p:cNvPr>
+          <p:cNvSpPr>
+            <a:spLocks noGrp="1"/>
+          </p:cNvSpPr>
+          <p:nvPr>
+            <p:ph idx="1"/>
+          </p:nvPr>
+        </p:nvSpPr>
+        <p:spPr/>
+        <p:txBody>
+          <a:bodyPr>
+            <a:normAutofit lnSpcReduction="10000"/>
+          </a:bodyPr>
+          <a:lstStyle/>
+          <a:p>
+            <a:pPr>
+              <a:buNone/>
+            </a:pPr>
+            <a:r>
+              <a:rPr lang="en-US" sz="2800" b="1" dirty="0">
+                <a:latin typeface="Calibri" panose="020F0502020204030204" pitchFamily="34" charset="0"/>
+                <a:cs typeface="Calibri" panose="020F0502020204030204" pitchFamily="34" charset="0"/>
+              </a:rPr>
+              <a:t>Zoneless Change Detection:</a:t>
+            </a:r>
+            <a:endParaRPr lang="en-US" sz="2800" dirty="0">
+              <a:latin typeface="Calibri" panose="020F0502020204030204" pitchFamily="34" charset="0"/>
+              <a:cs typeface="Calibri" panose="020F0502020204030204" pitchFamily="34" charset="0"/>
+            </a:endParaRPr>
+          </a:p>
+          <a:p>
+            <a:pPr>
+              <a:buFont typeface="Arial" panose="020B0604020202020204" pitchFamily="34" charset="0"/>
+              <a:buChar char="•"/>
+            </a:pPr>
+            <a:r>
+              <a:rPr lang="en-US" dirty="0">
+                <a:latin typeface="Calibri" panose="020F0502020204030204" pitchFamily="34" charset="0"/>
+                <a:cs typeface="Calibri" panose="020F0502020204030204" pitchFamily="34" charset="0"/>
+              </a:rPr>
+              <a:t>Angular 18 introduces an experimental feature that allows developers to </a:t>
+            </a:r>
+            <a:r>
+              <a:rPr lang="en-US" b="1" dirty="0">
+                <a:latin typeface="Calibri" panose="020F0502020204030204" pitchFamily="34" charset="0"/>
+                <a:cs typeface="Calibri" panose="020F0502020204030204" pitchFamily="34" charset="0"/>
+              </a:rPr>
+              <a:t>bypass </a:t>
+            </a:r>
+            <a:r>
+              <a:rPr lang="en-US" b="1" dirty="0" err="1">
+                <a:latin typeface="Calibri" panose="020F0502020204030204" pitchFamily="34" charset="0"/>
+                <a:cs typeface="Calibri" panose="020F0502020204030204" pitchFamily="34" charset="0"/>
+              </a:rPr>
+              <a:t>Zone.js</a:t>
+            </a:r>
+            <a:r>
+              <a:rPr lang="en-US" b="1" dirty="0">
+                <a:latin typeface="Calibri" panose="020F0502020204030204" pitchFamily="34" charset="0"/>
+                <a:cs typeface="Calibri" panose="020F0502020204030204" pitchFamily="34" charset="0"/>
+              </a:rPr>
+              <a:t> </a:t>
+            </a:r>
+            <a:r>
+              <a:rPr lang="en-US" dirty="0">
+                <a:latin typeface="Calibri" panose="020F0502020204030204" pitchFamily="34" charset="0"/>
+                <a:cs typeface="Calibri" panose="020F0502020204030204" pitchFamily="34" charset="0"/>
+              </a:rPr>
+              <a:t>and </a:t>
+            </a:r>
+            <a:r>
+              <a:rPr lang="en-US" b="1" dirty="0">
+                <a:latin typeface="Calibri" panose="020F0502020204030204" pitchFamily="34" charset="0"/>
+                <a:cs typeface="Calibri" panose="020F0502020204030204" pitchFamily="34" charset="0"/>
+              </a:rPr>
+              <a:t>take more manual control </a:t>
+            </a:r>
+            <a:r>
+              <a:rPr lang="en-US" dirty="0">
+                <a:latin typeface="Calibri" panose="020F0502020204030204" pitchFamily="34" charset="0"/>
+                <a:cs typeface="Calibri" panose="020F0502020204030204" pitchFamily="34" charset="0"/>
+              </a:rPr>
+              <a:t>over change detection.</a:t>
+            </a:r>
+          </a:p>
+          <a:p>
+            <a:pPr>
+              <a:buFont typeface="Arial" panose="020B0604020202020204" pitchFamily="34" charset="0"/>
+              <a:buChar char="•"/>
+            </a:pPr>
+            <a:r>
+              <a:rPr lang="en-US" dirty="0">
+                <a:latin typeface="Calibri" panose="020F0502020204030204" pitchFamily="34" charset="0"/>
+                <a:cs typeface="Calibri" panose="020F0502020204030204" pitchFamily="34" charset="0"/>
+              </a:rPr>
+              <a:t>This approach </a:t>
+            </a:r>
+            <a:r>
+              <a:rPr lang="en-US" b="1" dirty="0">
+                <a:latin typeface="Calibri" panose="020F0502020204030204" pitchFamily="34" charset="0"/>
+                <a:cs typeface="Calibri" panose="020F0502020204030204" pitchFamily="34" charset="0"/>
+              </a:rPr>
+              <a:t>aims to improve performance</a:t>
+            </a:r>
+            <a:r>
+              <a:rPr lang="en-US" dirty="0">
+                <a:latin typeface="Calibri" panose="020F0502020204030204" pitchFamily="34" charset="0"/>
+                <a:cs typeface="Calibri" panose="020F0502020204030204" pitchFamily="34" charset="0"/>
+              </a:rPr>
+              <a:t> by reducing unnecessary change detection cycles.</a:t>
+            </a:r>
+          </a:p>
+          <a:p>
+            <a:pPr>
+              <a:buFont typeface="Arial" panose="020B0604020202020204" pitchFamily="34" charset="0"/>
+              <a:buChar char="•"/>
+            </a:pPr>
+            <a:r>
+              <a:rPr lang="en-US" dirty="0">
+                <a:latin typeface="Calibri" panose="020F0502020204030204" pitchFamily="34" charset="0"/>
+                <a:cs typeface="Calibri" panose="020F0502020204030204" pitchFamily="34" charset="0"/>
+              </a:rPr>
+              <a:t>It gives developers more precise control over when the UI updates.</a:t>
+            </a:r>
+          </a:p>
+          <a:p>
+            <a:pPr>
+              <a:buFont typeface="Arial" panose="020B0604020202020204" pitchFamily="34" charset="0"/>
+              <a:buChar char="•"/>
+            </a:pPr>
+            <a:r>
+              <a:rPr lang="en-US" dirty="0">
+                <a:latin typeface="Calibri" panose="020F0502020204030204" pitchFamily="34" charset="0"/>
+                <a:cs typeface="Calibri" panose="020F0502020204030204" pitchFamily="34" charset="0"/>
+              </a:rPr>
+              <a:t>Essentially, instead of </a:t>
+            </a:r>
+            <a:r>
+              <a:rPr lang="en-US" dirty="0" err="1">
+                <a:latin typeface="Calibri" panose="020F0502020204030204" pitchFamily="34" charset="0"/>
+                <a:cs typeface="Calibri" panose="020F0502020204030204" pitchFamily="34" charset="0"/>
+              </a:rPr>
+              <a:t>Zone.js</a:t>
+            </a:r>
+            <a:r>
+              <a:rPr lang="en-US" dirty="0">
+                <a:latin typeface="Calibri" panose="020F0502020204030204" pitchFamily="34" charset="0"/>
+                <a:cs typeface="Calibri" panose="020F0502020204030204" pitchFamily="34" charset="0"/>
+              </a:rPr>
+              <a:t> </a:t>
+            </a:r>
+            <a:r>
+              <a:rPr lang="en-US" b="1" dirty="0">
+                <a:latin typeface="Calibri" panose="020F0502020204030204" pitchFamily="34" charset="0"/>
+                <a:cs typeface="Calibri" panose="020F0502020204030204" pitchFamily="34" charset="0"/>
+              </a:rPr>
+              <a:t>automatically triggering </a:t>
+            </a:r>
+            <a:r>
+              <a:rPr lang="en-US" dirty="0">
+                <a:latin typeface="Calibri" panose="020F0502020204030204" pitchFamily="34" charset="0"/>
+                <a:cs typeface="Calibri" panose="020F0502020204030204" pitchFamily="34" charset="0"/>
+              </a:rPr>
+              <a:t>change detection, the developer </a:t>
+            </a:r>
+            <a:r>
+              <a:rPr lang="en-US" b="1" dirty="0">
+                <a:latin typeface="Calibri" panose="020F0502020204030204" pitchFamily="34" charset="0"/>
+                <a:cs typeface="Calibri" panose="020F0502020204030204" pitchFamily="34" charset="0"/>
+              </a:rPr>
+              <a:t>must</a:t>
+            </a:r>
+            <a:r>
+              <a:rPr lang="en-US" dirty="0">
+                <a:latin typeface="Calibri" panose="020F0502020204030204" pitchFamily="34" charset="0"/>
+                <a:cs typeface="Calibri" panose="020F0502020204030204" pitchFamily="34" charset="0"/>
+              </a:rPr>
+              <a:t> explicitly </a:t>
+            </a:r>
+            <a:r>
+              <a:rPr lang="en-US" b="1" dirty="0">
+                <a:latin typeface="Calibri" panose="020F0502020204030204" pitchFamily="34" charset="0"/>
+                <a:cs typeface="Calibri" panose="020F0502020204030204" pitchFamily="34" charset="0"/>
+              </a:rPr>
+              <a:t>tell Angular</a:t>
+            </a:r>
+            <a:r>
+              <a:rPr lang="en-US" dirty="0">
+                <a:latin typeface="Calibri" panose="020F0502020204030204" pitchFamily="34" charset="0"/>
+                <a:cs typeface="Calibri" panose="020F0502020204030204" pitchFamily="34" charset="0"/>
+              </a:rPr>
+              <a:t> </a:t>
+            </a:r>
+            <a:r>
+              <a:rPr lang="en-US" b="1" dirty="0">
+                <a:latin typeface="Calibri" panose="020F0502020204030204" pitchFamily="34" charset="0"/>
+                <a:cs typeface="Calibri" panose="020F0502020204030204" pitchFamily="34" charset="0"/>
+              </a:rPr>
+              <a:t>when changes </a:t>
+            </a:r>
+            <a:r>
+              <a:rPr lang="en-US" dirty="0">
+                <a:latin typeface="Calibri" panose="020F0502020204030204" pitchFamily="34" charset="0"/>
+                <a:cs typeface="Calibri" panose="020F0502020204030204" pitchFamily="34" charset="0"/>
+              </a:rPr>
+              <a:t>have occurred.</a:t>
+            </a:r>
+          </a:p>
+        </p:txBody>
+      </p:sp>
+    </p:spTree>
+    <p:extLst>
+      <p:ext uri="{BB962C8B-B14F-4D97-AF65-F5344CB8AC3E}">
+        <p14:creationId xmlns:p14="http://schemas.microsoft.com/office/powerpoint/2010/main" val="1705802223"/>
+      </p:ext>
+    </p:extLst>
+  </p:cSld>
+  <p:clrMapOvr>
+    <a:masterClrMapping/>
+  </p:clrMapOvr>
+</p:sld>
+</file>
+
+<file path=ppt/slides/slide6.xml><?xml version="1.0" encoding="utf-8"?>
+<p:sld xmlns:a="http://schemas.openxmlformats.org/drawingml/2006/main" xmlns:r="http://schemas.openxmlformats.org/officeDocument/2006/relationships" xmlns:p="http://schemas.openxmlformats.org/presentationml/2006/main">
+  <p:cSld>
+    <p:spTree>
+      <p:nvGrpSpPr>
+        <p:cNvPr id="1" name="">
+          <a:extLst>
+            <a:ext uri="{FF2B5EF4-FFF2-40B4-BE49-F238E27FC236}">
+              <a16:creationId xmlns:a16="http://schemas.microsoft.com/office/drawing/2014/main" id="{186FF015-CC7F-174A-33A3-CE33C0DC6A54}"/>
+            </a:ext>
+          </a:extLst>
+        </p:cNvPr>
+        <p:cNvGrpSpPr/>
+        <p:nvPr/>
+      </p:nvGrpSpPr>
+      <p:grpSpPr>
+        <a:xfrm>
+          <a:off x="0" y="0"/>
+          <a:ext cx="0" cy="0"/>
+          <a:chOff x="0" y="0"/>
+          <a:chExt cx="0" cy="0"/>
+        </a:xfrm>
+      </p:grpSpPr>
+      <p:sp>
+        <p:nvSpPr>
+          <p:cNvPr id="2" name="Title 1">
+            <a:extLst>
+              <a:ext uri="{FF2B5EF4-FFF2-40B4-BE49-F238E27FC236}">
+                <a16:creationId xmlns:a16="http://schemas.microsoft.com/office/drawing/2014/main" id="{27F8F731-B761-E638-38D8-4001F424F32F}"/>
+              </a:ext>
+            </a:extLst>
+          </p:cNvPr>
+          <p:cNvSpPr>
+            <a:spLocks noGrp="1"/>
+          </p:cNvSpPr>
+          <p:nvPr>
+            <p:ph type="title"/>
+          </p:nvPr>
+        </p:nvSpPr>
+        <p:spPr>
+          <a:xfrm>
+            <a:off x="1451579" y="739036"/>
+            <a:ext cx="9603275" cy="1041319"/>
+          </a:xfrm>
+        </p:spPr>
+        <p:txBody>
+          <a:bodyPr>
+            <a:noAutofit/>
+          </a:bodyPr>
+          <a:lstStyle/>
+          <a:p>
+            <a:pPr algn="ctr"/>
+            <a:r>
+              <a:rPr lang="en-US" sz="3200" b="1" dirty="0">
+                <a:solidFill>
+                  <a:srgbClr val="000000"/>
+                </a:solidFill>
+                <a:latin typeface="Calibri" panose="020F0502020204030204" pitchFamily="34" charset="0"/>
+                <a:cs typeface="Calibri" panose="020F0502020204030204" pitchFamily="34" charset="0"/>
+              </a:rPr>
+              <a:t>Deferable Views,</a:t>
+            </a:r>
+            <a:br>
+              <a:rPr lang="en-US" sz="3200" b="1" dirty="0">
+                <a:solidFill>
+                  <a:srgbClr val="000000"/>
+                </a:solidFill>
+                <a:latin typeface="Calibri" panose="020F0502020204030204" pitchFamily="34" charset="0"/>
+                <a:cs typeface="Calibri" panose="020F0502020204030204" pitchFamily="34" charset="0"/>
+              </a:rPr>
+            </a:br>
+            <a:r>
+              <a:rPr lang="en-US" sz="3200" b="1" dirty="0">
+                <a:solidFill>
+                  <a:srgbClr val="000000"/>
+                </a:solidFill>
+                <a:latin typeface="Calibri" panose="020F0502020204030204" pitchFamily="34" charset="0"/>
+                <a:cs typeface="Calibri" panose="020F0502020204030204" pitchFamily="34" charset="0"/>
+              </a:rPr>
+              <a:t>Built-in Control Flow</a:t>
+            </a:r>
+            <a:endParaRPr lang="en-VN" b="1" cap="none" dirty="0">
+              <a:latin typeface="Calibri" panose="020F0502020204030204" pitchFamily="34" charset="0"/>
+              <a:cs typeface="Calibri" panose="020F0502020204030204" pitchFamily="34" charset="0"/>
+            </a:endParaRPr>
+          </a:p>
+        </p:txBody>
+      </p:sp>
+      <p:sp>
+        <p:nvSpPr>
+          <p:cNvPr id="3" name="Content Placeholder 2">
+            <a:extLst>
+              <a:ext uri="{FF2B5EF4-FFF2-40B4-BE49-F238E27FC236}">
+                <a16:creationId xmlns:a16="http://schemas.microsoft.com/office/drawing/2014/main" id="{F4CD6A4B-0EE8-3550-0E63-1DDB3DEFCFCD}"/>
+              </a:ext>
+            </a:extLst>
+          </p:cNvPr>
+          <p:cNvSpPr>
+            <a:spLocks noGrp="1"/>
+          </p:cNvSpPr>
+          <p:nvPr>
+            <p:ph idx="1"/>
+          </p:nvPr>
+        </p:nvSpPr>
+        <p:spPr/>
+        <p:txBody>
+          <a:bodyPr>
+            <a:normAutofit/>
+          </a:bodyPr>
+          <a:lstStyle/>
+          <a:p>
+            <a:pPr>
+              <a:buFont typeface="Wingdings" pitchFamily="2" charset="2"/>
+              <a:buChar char="Ø"/>
+            </a:pPr>
+            <a:r>
+              <a:rPr lang="en-US" b="1" dirty="0">
+                <a:latin typeface="Calibri" panose="020F0502020204030204" pitchFamily="34" charset="0"/>
+                <a:cs typeface="Calibri" panose="020F0502020204030204" pitchFamily="34" charset="0"/>
+              </a:rPr>
+              <a:t>Angular 17 introduced</a:t>
+            </a:r>
+            <a:r>
+              <a:rPr lang="en-US" dirty="0">
+                <a:latin typeface="Calibri" panose="020F0502020204030204" pitchFamily="34" charset="0"/>
+                <a:cs typeface="Calibri" panose="020F0502020204030204" pitchFamily="34" charset="0"/>
+              </a:rPr>
+              <a:t> deferrable views and the new built-in control flow syntax. </a:t>
+            </a:r>
+          </a:p>
+          <a:p>
+            <a:pPr>
+              <a:buFont typeface="Wingdings" pitchFamily="2" charset="2"/>
+              <a:buChar char="Ø"/>
+            </a:pPr>
+            <a:r>
+              <a:rPr lang="en-US" b="1" dirty="0">
+                <a:latin typeface="Calibri" panose="020F0502020204030204" pitchFamily="34" charset="0"/>
+                <a:cs typeface="Calibri" panose="020F0502020204030204" pitchFamily="34" charset="0"/>
+              </a:rPr>
+              <a:t>Angular 18</a:t>
+            </a:r>
+            <a:r>
+              <a:rPr lang="en-US" dirty="0">
+                <a:latin typeface="Calibri" panose="020F0502020204030204" pitchFamily="34" charset="0"/>
+                <a:cs typeface="Calibri" panose="020F0502020204030204" pitchFamily="34" charset="0"/>
+              </a:rPr>
+              <a:t> graduates deferrable views and the new built-in control flow syntax to stable status. </a:t>
+            </a:r>
+          </a:p>
+          <a:p>
+            <a:pPr>
+              <a:buFont typeface="Wingdings" pitchFamily="2" charset="2"/>
+              <a:buChar char="Ø"/>
+            </a:pPr>
+            <a:r>
+              <a:rPr lang="en-US" dirty="0">
+                <a:latin typeface="Calibri" panose="020F0502020204030204" pitchFamily="34" charset="0"/>
+                <a:cs typeface="Calibri" panose="020F0502020204030204" pitchFamily="34" charset="0"/>
+              </a:rPr>
+              <a:t>Essentially, deferrable views help optimize our </a:t>
+            </a:r>
+            <a:r>
+              <a:rPr lang="en-US" b="1" dirty="0">
+                <a:latin typeface="Calibri" panose="020F0502020204030204" pitchFamily="34" charset="0"/>
+                <a:cs typeface="Calibri" panose="020F0502020204030204" pitchFamily="34" charset="0"/>
+              </a:rPr>
+              <a:t>initial bundle size </a:t>
+            </a:r>
+            <a:r>
+              <a:rPr lang="en-US" dirty="0">
+                <a:latin typeface="Calibri" panose="020F0502020204030204" pitchFamily="34" charset="0"/>
+                <a:cs typeface="Calibri" panose="020F0502020204030204" pitchFamily="34" charset="0"/>
+              </a:rPr>
+              <a:t>and improve the </a:t>
+            </a:r>
+            <a:r>
+              <a:rPr lang="en-US" b="1" dirty="0">
+                <a:latin typeface="Calibri" panose="020F0502020204030204" pitchFamily="34" charset="0"/>
+                <a:cs typeface="Calibri" panose="020F0502020204030204" pitchFamily="34" charset="0"/>
+              </a:rPr>
+              <a:t>initial load</a:t>
+            </a:r>
+            <a:r>
+              <a:rPr lang="en-US" dirty="0">
+                <a:latin typeface="Calibri" panose="020F0502020204030204" pitchFamily="34" charset="0"/>
+                <a:cs typeface="Calibri" panose="020F0502020204030204" pitchFamily="34" charset="0"/>
+              </a:rPr>
+              <a:t> of the application by </a:t>
+            </a:r>
+            <a:r>
+              <a:rPr lang="en-US" b="1" dirty="0">
+                <a:latin typeface="Calibri" panose="020F0502020204030204" pitchFamily="34" charset="0"/>
+                <a:cs typeface="Calibri" panose="020F0502020204030204" pitchFamily="34" charset="0"/>
+              </a:rPr>
+              <a:t>allowing</a:t>
+            </a:r>
+            <a:r>
+              <a:rPr lang="en-US" dirty="0">
+                <a:latin typeface="Calibri" panose="020F0502020204030204" pitchFamily="34" charset="0"/>
+                <a:cs typeface="Calibri" panose="020F0502020204030204" pitchFamily="34" charset="0"/>
+              </a:rPr>
+              <a:t> you to </a:t>
+            </a:r>
+            <a:r>
+              <a:rPr lang="en-US" b="1" dirty="0">
+                <a:latin typeface="Calibri" panose="020F0502020204030204" pitchFamily="34" charset="0"/>
+                <a:cs typeface="Calibri" panose="020F0502020204030204" pitchFamily="34" charset="0"/>
+              </a:rPr>
+              <a:t>lazy load your templates until they are needed</a:t>
+            </a:r>
+            <a:r>
+              <a:rPr lang="en-US" dirty="0">
+                <a:latin typeface="Calibri" panose="020F0502020204030204" pitchFamily="34" charset="0"/>
+                <a:cs typeface="Calibri" panose="020F0502020204030204" pitchFamily="34" charset="0"/>
+              </a:rPr>
+              <a:t> later.</a:t>
+            </a:r>
+          </a:p>
+          <a:p>
+            <a:pPr>
+              <a:buFont typeface="Wingdings" pitchFamily="2" charset="2"/>
+              <a:buChar char="Ø"/>
+            </a:pPr>
+            <a:r>
+              <a:rPr lang="en-US" dirty="0">
+                <a:latin typeface="Calibri" panose="020F0502020204030204" pitchFamily="34" charset="0"/>
+                <a:cs typeface="Calibri" panose="020F0502020204030204" pitchFamily="34" charset="0"/>
+              </a:rPr>
+              <a:t>The syntax: @defer, @for, @if, @switch, </a:t>
+            </a:r>
+            <a:r>
+              <a:rPr lang="en-US" b="1" dirty="0">
+                <a:latin typeface="Calibri" panose="020F0502020204030204" pitchFamily="34" charset="0"/>
+                <a:cs typeface="Calibri" panose="020F0502020204030204" pitchFamily="34" charset="0"/>
+              </a:rPr>
+              <a:t>@let</a:t>
+            </a:r>
+            <a:r>
+              <a:rPr lang="en-US" dirty="0">
+                <a:latin typeface="Calibri" panose="020F0502020204030204" pitchFamily="34" charset="0"/>
+                <a:cs typeface="Calibri" panose="020F0502020204030204" pitchFamily="34" charset="0"/>
+              </a:rPr>
+              <a:t>(*new)</a:t>
+            </a:r>
+            <a:endParaRPr lang="en-VN" dirty="0">
+              <a:latin typeface="Calibri" panose="020F0502020204030204" pitchFamily="34" charset="0"/>
+              <a:cs typeface="Calibri" panose="020F0502020204030204" pitchFamily="34" charset="0"/>
+            </a:endParaRPr>
+          </a:p>
+        </p:txBody>
+      </p:sp>
+    </p:spTree>
+    <p:extLst>
+      <p:ext uri="{BB962C8B-B14F-4D97-AF65-F5344CB8AC3E}">
+        <p14:creationId xmlns:p14="http://schemas.microsoft.com/office/powerpoint/2010/main" val="2637042530"/>
+      </p:ext>
+    </p:extLst>
+  </p:cSld>
+  <p:clrMapOvr>
+    <a:masterClrMapping/>
+  </p:clrMapOvr>
+</p:sld>
+</file>
+
+<file path=ppt/slides/slide7.xml><?xml version="1.0" encoding="utf-8"?>
+<p:sld xmlns:a="http://schemas.openxmlformats.org/drawingml/2006/main" xmlns:r="http://schemas.openxmlformats.org/officeDocument/2006/relationships" xmlns:p="http://schemas.openxmlformats.org/presentationml/2006/main">
+  <p:cSld>
+    <p:spTree>
+      <p:nvGrpSpPr>
+        <p:cNvPr id="1" name="">
+          <a:extLst>
+            <a:ext uri="{FF2B5EF4-FFF2-40B4-BE49-F238E27FC236}">
+              <a16:creationId xmlns:a16="http://schemas.microsoft.com/office/drawing/2014/main" id="{5E496153-ABF6-5CCF-863B-B7B1AB194FBA}"/>
+            </a:ext>
+          </a:extLst>
+        </p:cNvPr>
+        <p:cNvGrpSpPr/>
+        <p:nvPr/>
+      </p:nvGrpSpPr>
+      <p:grpSpPr>
+        <a:xfrm>
+          <a:off x="0" y="0"/>
+          <a:ext cx="0" cy="0"/>
+          <a:chOff x="0" y="0"/>
+          <a:chExt cx="0" cy="0"/>
+        </a:xfrm>
+      </p:grpSpPr>
+      <p:sp>
+        <p:nvSpPr>
+          <p:cNvPr id="2" name="Title 1">
+            <a:extLst>
+              <a:ext uri="{FF2B5EF4-FFF2-40B4-BE49-F238E27FC236}">
+                <a16:creationId xmlns:a16="http://schemas.microsoft.com/office/drawing/2014/main" id="{E50CE126-7F89-EBB7-4754-92A4C4237CE0}"/>
+              </a:ext>
+            </a:extLst>
+          </p:cNvPr>
+          <p:cNvSpPr>
+            <a:spLocks noGrp="1"/>
+          </p:cNvSpPr>
+          <p:nvPr>
+            <p:ph type="title"/>
+          </p:nvPr>
+        </p:nvSpPr>
+        <p:spPr>
+          <a:xfrm>
+            <a:off x="1451579" y="839244"/>
+            <a:ext cx="9603275" cy="1014510"/>
+          </a:xfrm>
+        </p:spPr>
+        <p:txBody>
+          <a:bodyPr>
+            <a:normAutofit/>
+          </a:bodyPr>
+          <a:lstStyle/>
+          <a:p>
+            <a:pPr algn="ctr"/>
+            <a:r>
+              <a:rPr lang="en-US" b="1" i="0" u="none" strike="noStrike" dirty="0">
+                <a:solidFill>
+                  <a:srgbClr val="000000"/>
+                </a:solidFill>
+                <a:effectLst/>
+                <a:latin typeface="Calibri" panose="020F0502020204030204" pitchFamily="34" charset="0"/>
+                <a:cs typeface="Calibri" panose="020F0502020204030204" pitchFamily="34" charset="0"/>
+              </a:rPr>
+              <a:t>What’s New in </a:t>
+            </a:r>
+            <a:br>
+              <a:rPr lang="en-US" b="1" i="0" u="none" strike="noStrike" dirty="0">
+                <a:solidFill>
+                  <a:srgbClr val="000000"/>
+                </a:solidFill>
+                <a:effectLst/>
+                <a:latin typeface="Calibri" panose="020F0502020204030204" pitchFamily="34" charset="0"/>
+                <a:cs typeface="Calibri" panose="020F0502020204030204" pitchFamily="34" charset="0"/>
+              </a:rPr>
+            </a:br>
+            <a:r>
+              <a:rPr lang="en-US" b="1" i="0" u="none" strike="noStrike" dirty="0">
+                <a:solidFill>
+                  <a:srgbClr val="000000"/>
+                </a:solidFill>
+                <a:effectLst/>
+                <a:latin typeface="Calibri" panose="020F0502020204030204" pitchFamily="34" charset="0"/>
+                <a:cs typeface="Calibri" panose="020F0502020204030204" pitchFamily="34" charset="0"/>
+              </a:rPr>
+              <a:t>Angular 19</a:t>
+            </a:r>
+            <a:endParaRPr lang="en-VN" sz="4800" b="1" cap="none" dirty="0">
+              <a:latin typeface="Calibri" panose="020F0502020204030204" pitchFamily="34" charset="0"/>
+              <a:cs typeface="Calibri" panose="020F0502020204030204" pitchFamily="34" charset="0"/>
+            </a:endParaRPr>
+          </a:p>
+        </p:txBody>
+      </p:sp>
+      <p:sp>
+        <p:nvSpPr>
+          <p:cNvPr id="3" name="Content Placeholder 2">
+            <a:extLst>
+              <a:ext uri="{FF2B5EF4-FFF2-40B4-BE49-F238E27FC236}">
+                <a16:creationId xmlns:a16="http://schemas.microsoft.com/office/drawing/2014/main" id="{4423958E-86F4-9BD7-25DF-1347538602E9}"/>
+              </a:ext>
+            </a:extLst>
+          </p:cNvPr>
+          <p:cNvSpPr>
+            <a:spLocks noGrp="1"/>
+          </p:cNvSpPr>
+          <p:nvPr>
+            <p:ph idx="1"/>
+          </p:nvPr>
+        </p:nvSpPr>
+        <p:spPr/>
+        <p:txBody>
+          <a:bodyPr>
+            <a:normAutofit/>
+          </a:bodyPr>
+          <a:lstStyle/>
+          <a:p>
+            <a:pPr algn="l">
+              <a:buFont typeface="Wingdings" pitchFamily="2" charset="2"/>
+              <a:buChar char="v"/>
+            </a:pPr>
+            <a:r>
+              <a:rPr lang="en-US" sz="2800" b="1" i="0" u="none" strike="noStrike" dirty="0">
+                <a:solidFill>
+                  <a:srgbClr val="000000"/>
+                </a:solidFill>
+                <a:effectLst/>
+                <a:latin typeface="Calibri" panose="020F0502020204030204" pitchFamily="34" charset="0"/>
+                <a:cs typeface="Calibri" panose="020F0502020204030204" pitchFamily="34" charset="0"/>
+              </a:rPr>
+              <a:t> </a:t>
+            </a:r>
+            <a:r>
+              <a:rPr lang="en-US" sz="2400" b="1" i="0" u="none" strike="noStrike" dirty="0">
+                <a:solidFill>
+                  <a:srgbClr val="000000"/>
+                </a:solidFill>
+                <a:effectLst/>
+                <a:latin typeface="Calibri" panose="020F0502020204030204" pitchFamily="34" charset="0"/>
+                <a:cs typeface="Calibri" panose="020F0502020204030204" pitchFamily="34" charset="0"/>
+              </a:rPr>
+              <a:t>Standalone Components by default</a:t>
+            </a:r>
+          </a:p>
+          <a:p>
+            <a:pPr algn="l">
+              <a:buFont typeface="Wingdings" pitchFamily="2" charset="2"/>
+              <a:buChar char="v"/>
+            </a:pPr>
+            <a:r>
+              <a:rPr lang="en-US" sz="2400" b="1" dirty="0">
+                <a:solidFill>
+                  <a:srgbClr val="000000"/>
+                </a:solidFill>
+                <a:latin typeface="Calibri" panose="020F0502020204030204" pitchFamily="34" charset="0"/>
+                <a:cs typeface="Calibri" panose="020F0502020204030204" pitchFamily="34" charset="0"/>
+              </a:rPr>
+              <a:t> Stabilization of Core Reactivity Primitives</a:t>
+            </a:r>
+          </a:p>
+          <a:p>
+            <a:pPr algn="l">
+              <a:buFont typeface="Wingdings" pitchFamily="2" charset="2"/>
+              <a:buChar char="v"/>
+            </a:pPr>
+            <a:r>
+              <a:rPr lang="en-US" sz="2400" b="1" i="0" u="none" strike="noStrike" dirty="0">
+                <a:solidFill>
+                  <a:srgbClr val="000000"/>
+                </a:solidFill>
+                <a:effectLst/>
+                <a:latin typeface="Calibri" panose="020F0502020204030204" pitchFamily="34" charset="0"/>
+                <a:cs typeface="Calibri" panose="020F0502020204030204" pitchFamily="34" charset="0"/>
+              </a:rPr>
+              <a:t> Event Replay Enabled by default (Related Hydration)</a:t>
+            </a:r>
+            <a:endParaRPr lang="en-US" sz="2400" b="0" i="0" u="none" strike="noStrike" dirty="0">
+              <a:solidFill>
+                <a:srgbClr val="000000"/>
+              </a:solidFill>
+              <a:effectLst/>
+              <a:latin typeface="Calibri" panose="020F0502020204030204" pitchFamily="34" charset="0"/>
+              <a:cs typeface="Calibri" panose="020F0502020204030204" pitchFamily="34" charset="0"/>
+            </a:endParaRPr>
+          </a:p>
+          <a:p>
+            <a:pPr algn="l">
+              <a:buFont typeface="Wingdings" pitchFamily="2" charset="2"/>
+              <a:buChar char="v"/>
+            </a:pPr>
+            <a:r>
+              <a:rPr lang="en-US" sz="2400" b="1" i="0" u="none" strike="noStrike" dirty="0">
+                <a:solidFill>
+                  <a:srgbClr val="000000"/>
+                </a:solidFill>
+                <a:effectLst/>
+                <a:latin typeface="Calibri" panose="020F0502020204030204" pitchFamily="34" charset="0"/>
+                <a:cs typeface="Calibri" panose="020F0502020204030204" pitchFamily="34" charset="0"/>
+              </a:rPr>
+              <a:t> Incremental Hydration (Developer Preview)</a:t>
+            </a:r>
+            <a:endParaRPr lang="en-US" sz="2400" b="0" i="0" u="none" strike="noStrike" dirty="0">
+              <a:solidFill>
+                <a:srgbClr val="000000"/>
+              </a:solidFill>
+              <a:effectLst/>
+              <a:latin typeface="Calibri" panose="020F0502020204030204" pitchFamily="34" charset="0"/>
+              <a:cs typeface="Calibri" panose="020F0502020204030204" pitchFamily="34" charset="0"/>
+            </a:endParaRPr>
+          </a:p>
+          <a:p>
+            <a:pPr algn="l">
+              <a:buFont typeface="Wingdings" pitchFamily="2" charset="2"/>
+              <a:buChar char="v"/>
+            </a:pPr>
+            <a:r>
+              <a:rPr lang="en-US" sz="2400" b="1" i="0" u="none" strike="noStrike" dirty="0">
+                <a:solidFill>
+                  <a:srgbClr val="000000"/>
+                </a:solidFill>
+                <a:effectLst/>
+                <a:latin typeface="Calibri" panose="020F0502020204030204" pitchFamily="34" charset="0"/>
+                <a:cs typeface="Calibri" panose="020F0502020204030204" pitchFamily="34" charset="0"/>
+              </a:rPr>
+              <a:t> Route-Level Render Mode (Developer Preview)</a:t>
+            </a:r>
+            <a:endParaRPr lang="en-US" sz="2400" b="0" i="0" u="none" strike="noStrike" dirty="0">
+              <a:solidFill>
+                <a:srgbClr val="000000"/>
+              </a:solidFill>
+              <a:effectLst/>
+              <a:latin typeface="Calibri" panose="020F0502020204030204" pitchFamily="34" charset="0"/>
+              <a:cs typeface="Calibri" panose="020F0502020204030204" pitchFamily="34" charset="0"/>
+            </a:endParaRPr>
+          </a:p>
+          <a:p>
+            <a:pPr algn="l">
+              <a:buFont typeface="Wingdings" pitchFamily="2" charset="2"/>
+              <a:buChar char="v"/>
+            </a:pPr>
+            <a:r>
+              <a:rPr lang="en-US" sz="2400" b="1" i="0" u="none" strike="noStrike" dirty="0">
+                <a:solidFill>
+                  <a:srgbClr val="000000"/>
+                </a:solidFill>
+                <a:effectLst/>
+                <a:latin typeface="Calibri" panose="020F0502020204030204" pitchFamily="34" charset="0"/>
+                <a:cs typeface="Calibri" panose="020F0502020204030204" pitchFamily="34" charset="0"/>
+              </a:rPr>
+              <a:t> Hot Module Replacement (HMR) Support</a:t>
+            </a:r>
+            <a:endParaRPr lang="en-US" sz="2400" b="0" i="0" u="none" strike="noStrike" dirty="0">
+              <a:solidFill>
+                <a:srgbClr val="000000"/>
+              </a:solidFill>
+              <a:effectLst/>
+              <a:latin typeface="Calibri" panose="020F0502020204030204" pitchFamily="34" charset="0"/>
+              <a:cs typeface="Calibri" panose="020F0502020204030204" pitchFamily="34" charset="0"/>
+            </a:endParaRPr>
+          </a:p>
+        </p:txBody>
+      </p:sp>
+    </p:spTree>
+    <p:extLst>
+      <p:ext uri="{BB962C8B-B14F-4D97-AF65-F5344CB8AC3E}">
+        <p14:creationId xmlns:p14="http://schemas.microsoft.com/office/powerpoint/2010/main" val="869726869"/>
+      </p:ext>
+    </p:extLst>
+  </p:cSld>
+  <p:clrMapOvr>
+    <a:masterClrMapping/>
+  </p:clrMapOvr>
+</p:sld>
+</file>
+
+<file path=ppt/slides/slide8.xml><?xml version="1.0" encoding="utf-8"?>
+<p:sld xmlns:a="http://schemas.openxmlformats.org/drawingml/2006/main" xmlns:r="http://schemas.openxmlformats.org/officeDocument/2006/relationships" xmlns:p="http://schemas.openxmlformats.org/presentationml/2006/main">
+  <p:cSld>
+    <p:spTree>
+      <p:nvGrpSpPr>
+        <p:cNvPr id="1" name="">
+          <a:extLst>
+            <a:ext uri="{FF2B5EF4-FFF2-40B4-BE49-F238E27FC236}">
+              <a16:creationId xmlns:a16="http://schemas.microsoft.com/office/drawing/2014/main" id="{0A211ACB-897D-283C-0C84-6CE1FC3B51D9}"/>
+            </a:ext>
+          </a:extLst>
+        </p:cNvPr>
+        <p:cNvGrpSpPr/>
+        <p:nvPr/>
+      </p:nvGrpSpPr>
+      <p:grpSpPr>
+        <a:xfrm>
+          <a:off x="0" y="0"/>
+          <a:ext cx="0" cy="0"/>
+          <a:chOff x="0" y="0"/>
+          <a:chExt cx="0" cy="0"/>
+        </a:xfrm>
+      </p:grpSpPr>
+      <p:sp>
+        <p:nvSpPr>
+          <p:cNvPr id="2" name="Title 1">
+            <a:extLst>
+              <a:ext uri="{FF2B5EF4-FFF2-40B4-BE49-F238E27FC236}">
+                <a16:creationId xmlns:a16="http://schemas.microsoft.com/office/drawing/2014/main" id="{BD7FCD77-D5D2-BA87-8B0E-A6706D989D18}"/>
+              </a:ext>
+            </a:extLst>
+          </p:cNvPr>
+          <p:cNvSpPr>
+            <a:spLocks noGrp="1"/>
+          </p:cNvSpPr>
+          <p:nvPr>
+            <p:ph type="title"/>
+          </p:nvPr>
+        </p:nvSpPr>
+        <p:spPr>
+          <a:xfrm>
+            <a:off x="1451579" y="839244"/>
+            <a:ext cx="9603275" cy="1014510"/>
+          </a:xfrm>
+        </p:spPr>
+        <p:txBody>
+          <a:bodyPr>
+            <a:normAutofit/>
+          </a:bodyPr>
+          <a:lstStyle/>
+          <a:p>
+            <a:pPr algn="ctr"/>
+            <a:r>
+              <a:rPr lang="en-US" sz="3200" b="1" dirty="0">
+                <a:solidFill>
+                  <a:srgbClr val="000000"/>
+                </a:solidFill>
+                <a:latin typeface="Calibri" panose="020F0502020204030204" pitchFamily="34" charset="0"/>
+                <a:cs typeface="Calibri" panose="020F0502020204030204" pitchFamily="34" charset="0"/>
+              </a:rPr>
+              <a:t>Stabilization of Core </a:t>
+            </a:r>
+            <a:br>
+              <a:rPr lang="en-US" sz="3200" b="1" dirty="0">
+                <a:solidFill>
+                  <a:srgbClr val="000000"/>
+                </a:solidFill>
+                <a:latin typeface="Calibri" panose="020F0502020204030204" pitchFamily="34" charset="0"/>
+                <a:cs typeface="Calibri" panose="020F0502020204030204" pitchFamily="34" charset="0"/>
+              </a:rPr>
+            </a:br>
+            <a:r>
+              <a:rPr lang="en-US" sz="3200" b="1" dirty="0">
+                <a:solidFill>
+                  <a:srgbClr val="000000"/>
+                </a:solidFill>
+                <a:latin typeface="Calibri" panose="020F0502020204030204" pitchFamily="34" charset="0"/>
+                <a:cs typeface="Calibri" panose="020F0502020204030204" pitchFamily="34" charset="0"/>
+              </a:rPr>
+              <a:t>Reactivity Primitives</a:t>
+            </a:r>
+            <a:endParaRPr lang="en-VN" sz="4800" b="1" cap="none" dirty="0">
+              <a:latin typeface="Calibri" panose="020F0502020204030204" pitchFamily="34" charset="0"/>
+              <a:cs typeface="Calibri" panose="020F0502020204030204" pitchFamily="34" charset="0"/>
+            </a:endParaRPr>
+          </a:p>
+        </p:txBody>
+      </p:sp>
+      <p:sp>
+        <p:nvSpPr>
+          <p:cNvPr id="3" name="Content Placeholder 2">
+            <a:extLst>
+              <a:ext uri="{FF2B5EF4-FFF2-40B4-BE49-F238E27FC236}">
+                <a16:creationId xmlns:a16="http://schemas.microsoft.com/office/drawing/2014/main" id="{2BFE5666-9599-0DB6-B748-1336D4543E4D}"/>
+              </a:ext>
+            </a:extLst>
+          </p:cNvPr>
+          <p:cNvSpPr>
+            <a:spLocks noGrp="1"/>
+          </p:cNvSpPr>
+          <p:nvPr>
+            <p:ph idx="1"/>
+          </p:nvPr>
+        </p:nvSpPr>
+        <p:spPr/>
+        <p:txBody>
+          <a:bodyPr>
+            <a:normAutofit/>
+          </a:bodyPr>
+          <a:lstStyle/>
+          <a:p>
+            <a:pPr algn="l">
+              <a:buFont typeface="Wingdings" pitchFamily="2" charset="2"/>
+              <a:buChar char="v"/>
+            </a:pPr>
+            <a:r>
+              <a:rPr lang="en-US" b="1" i="0" u="none" strike="noStrike" dirty="0">
+                <a:solidFill>
+                  <a:srgbClr val="000000"/>
+                </a:solidFill>
+                <a:effectLst/>
+                <a:latin typeface="Calibri" panose="020F0502020204030204" pitchFamily="34" charset="0"/>
+                <a:cs typeface="Calibri" panose="020F0502020204030204" pitchFamily="34" charset="0"/>
+              </a:rPr>
+              <a:t> </a:t>
+            </a:r>
+            <a:r>
+              <a:rPr lang="en-US" dirty="0">
+                <a:latin typeface="Calibri" panose="020F0502020204030204" pitchFamily="34" charset="0"/>
+                <a:cs typeface="Calibri" panose="020F0502020204030204" pitchFamily="34" charset="0"/>
+              </a:rPr>
+              <a:t>The </a:t>
+            </a:r>
+            <a:r>
+              <a:rPr lang="en-US" b="1" dirty="0">
+                <a:latin typeface="Calibri" panose="020F0502020204030204" pitchFamily="34" charset="0"/>
+                <a:cs typeface="Calibri" panose="020F0502020204030204" pitchFamily="34" charset="0"/>
+              </a:rPr>
+              <a:t>stabilization</a:t>
+            </a:r>
+            <a:r>
+              <a:rPr lang="en-US" dirty="0">
+                <a:latin typeface="Calibri" panose="020F0502020204030204" pitchFamily="34" charset="0"/>
+                <a:cs typeface="Calibri" panose="020F0502020204030204" pitchFamily="34" charset="0"/>
+              </a:rPr>
+              <a:t> of core reactivity primitives, such as </a:t>
+            </a:r>
+            <a:r>
+              <a:rPr lang="en-US" b="1" dirty="0">
+                <a:latin typeface="Calibri" panose="020F0502020204030204" pitchFamily="34" charset="0"/>
+                <a:cs typeface="Calibri" panose="020F0502020204030204" pitchFamily="34" charset="0"/>
+              </a:rPr>
+              <a:t>signal-based inputs, outputs, and queries</a:t>
+            </a:r>
+            <a:r>
+              <a:rPr lang="en-US" dirty="0">
+                <a:latin typeface="Calibri" panose="020F0502020204030204" pitchFamily="34" charset="0"/>
+                <a:cs typeface="Calibri" panose="020F0502020204030204" pitchFamily="34" charset="0"/>
+              </a:rPr>
+              <a:t>, which were introduced in previous versions, provides a </a:t>
+            </a:r>
+            <a:r>
+              <a:rPr lang="en-US" b="1" dirty="0">
+                <a:latin typeface="Calibri" panose="020F0502020204030204" pitchFamily="34" charset="0"/>
+                <a:cs typeface="Calibri" panose="020F0502020204030204" pitchFamily="34" charset="0"/>
+              </a:rPr>
+              <a:t>more efficient and predictable reactivity model</a:t>
+            </a:r>
+            <a:r>
+              <a:rPr lang="en-US" dirty="0">
+                <a:latin typeface="Calibri" panose="020F0502020204030204" pitchFamily="34" charset="0"/>
+                <a:cs typeface="Calibri" panose="020F0502020204030204" pitchFamily="34" charset="0"/>
+              </a:rPr>
+              <a:t>.</a:t>
+            </a:r>
+          </a:p>
+          <a:p>
+            <a:pPr algn="l">
+              <a:buFont typeface="Wingdings" pitchFamily="2" charset="2"/>
+              <a:buChar char="v"/>
+            </a:pPr>
+            <a:r>
+              <a:rPr lang="en-US" dirty="0">
+                <a:latin typeface="Calibri" panose="020F0502020204030204" pitchFamily="34" charset="0"/>
+                <a:cs typeface="Calibri" panose="020F0502020204030204" pitchFamily="34" charset="0"/>
+              </a:rPr>
+              <a:t> A </a:t>
+            </a:r>
+            <a:r>
+              <a:rPr lang="en-US" b="1" dirty="0">
+                <a:latin typeface="Calibri" panose="020F0502020204030204" pitchFamily="34" charset="0"/>
+                <a:cs typeface="Calibri" panose="020F0502020204030204" pitchFamily="34" charset="0"/>
+              </a:rPr>
+              <a:t>core theme of Angular </a:t>
+            </a:r>
+            <a:r>
+              <a:rPr lang="en-US" dirty="0">
+                <a:latin typeface="Calibri" panose="020F0502020204030204" pitchFamily="34" charset="0"/>
+                <a:cs typeface="Calibri" panose="020F0502020204030204" pitchFamily="34" charset="0"/>
+              </a:rPr>
+              <a:t>over the past two years has been the development of the reactivity system. </a:t>
+            </a:r>
+          </a:p>
+          <a:p>
+            <a:pPr algn="l">
+              <a:buFont typeface="Wingdings" pitchFamily="2" charset="2"/>
+              <a:buChar char="v"/>
+            </a:pPr>
+            <a:r>
+              <a:rPr lang="en-US" dirty="0">
+                <a:latin typeface="Calibri" panose="020F0502020204030204" pitchFamily="34" charset="0"/>
+                <a:cs typeface="Calibri" panose="020F0502020204030204" pitchFamily="34" charset="0"/>
+              </a:rPr>
+              <a:t> In version 19, it shares some additional </a:t>
+            </a:r>
+            <a:r>
+              <a:rPr lang="en-US" b="1" dirty="0">
+                <a:latin typeface="Calibri" panose="020F0502020204030204" pitchFamily="34" charset="0"/>
+                <a:cs typeface="Calibri" panose="020F0502020204030204" pitchFamily="34" charset="0"/>
+              </a:rPr>
+              <a:t>new APIs</a:t>
+            </a:r>
+            <a:r>
+              <a:rPr lang="en-US" dirty="0">
+                <a:latin typeface="Calibri" panose="020F0502020204030204" pitchFamily="34" charset="0"/>
+                <a:cs typeface="Calibri" panose="020F0502020204030204" pitchFamily="34" charset="0"/>
+              </a:rPr>
+              <a:t>, namely </a:t>
+            </a:r>
+            <a:r>
+              <a:rPr lang="en-US" b="1" u="sng" dirty="0" err="1">
+                <a:latin typeface="Calibri" panose="020F0502020204030204" pitchFamily="34" charset="0"/>
+                <a:cs typeface="Calibri" panose="020F0502020204030204" pitchFamily="34" charset="0"/>
+              </a:rPr>
+              <a:t>linkedSignal</a:t>
+            </a:r>
+            <a:r>
+              <a:rPr lang="en-US" dirty="0">
+                <a:latin typeface="Calibri" panose="020F0502020204030204" pitchFamily="34" charset="0"/>
+                <a:cs typeface="Calibri" panose="020F0502020204030204" pitchFamily="34" charset="0"/>
+              </a:rPr>
+              <a:t> and </a:t>
+            </a:r>
+            <a:r>
+              <a:rPr lang="en-US" b="1" u="sng" dirty="0">
+                <a:latin typeface="Calibri" panose="020F0502020204030204" pitchFamily="34" charset="0"/>
+                <a:cs typeface="Calibri" panose="020F0502020204030204" pitchFamily="34" charset="0"/>
+              </a:rPr>
+              <a:t>resource</a:t>
+            </a:r>
+            <a:r>
+              <a:rPr lang="en-US" dirty="0">
+                <a:latin typeface="Calibri" panose="020F0502020204030204" pitchFamily="34" charset="0"/>
+                <a:cs typeface="Calibri" panose="020F0502020204030204" pitchFamily="34" charset="0"/>
+              </a:rPr>
+              <a:t>. </a:t>
+            </a:r>
+          </a:p>
+        </p:txBody>
+      </p:sp>
+    </p:spTree>
+    <p:extLst>
+      <p:ext uri="{BB962C8B-B14F-4D97-AF65-F5344CB8AC3E}">
+        <p14:creationId xmlns:p14="http://schemas.microsoft.com/office/powerpoint/2010/main" val="732208542"/>
+      </p:ext>
+    </p:extLst>
+  </p:cSld>
+  <p:clrMapOvr>
+    <a:masterClrMapping/>
+  </p:clrMapOvr>
+</p:sld>
+</file>
+
+<file path=ppt/slides/slide9.xml><?xml version="1.0" encoding="utf-8"?>
+<p:sld xmlns:a="http://schemas.openxmlformats.org/drawingml/2006/main" xmlns:r="http://schemas.openxmlformats.org/officeDocument/2006/relationships" xmlns:p="http://schemas.openxmlformats.org/presentationml/2006/main">
+  <p:cSld>
+    <p:spTree>
+      <p:nvGrpSpPr>
+        <p:cNvPr id="1" name="">
+          <a:extLst>
+            <a:ext uri="{FF2B5EF4-FFF2-40B4-BE49-F238E27FC236}">
+              <a16:creationId xmlns:a16="http://schemas.microsoft.com/office/drawing/2014/main" id="{64EE7A3F-5E2A-A5A6-0E30-525ED0D7D506}"/>
+            </a:ext>
+          </a:extLst>
+        </p:cNvPr>
+        <p:cNvGrpSpPr/>
+        <p:nvPr/>
+      </p:nvGrpSpPr>
+      <p:grpSpPr>
+        <a:xfrm>
+          <a:off x="0" y="0"/>
+          <a:ext cx="0" cy="0"/>
+          <a:chOff x="0" y="0"/>
+          <a:chExt cx="0" cy="0"/>
+        </a:xfrm>
+      </p:grpSpPr>
+      <p:sp>
+        <p:nvSpPr>
+          <p:cNvPr id="2" name="Title 1">
+            <a:extLst>
+              <a:ext uri="{FF2B5EF4-FFF2-40B4-BE49-F238E27FC236}">
+                <a16:creationId xmlns:a16="http://schemas.microsoft.com/office/drawing/2014/main" id="{E9BACADA-5E82-6677-A1C3-FBE0961F3FBE}"/>
+              </a:ext>
+            </a:extLst>
+          </p:cNvPr>
+          <p:cNvSpPr>
+            <a:spLocks noGrp="1"/>
+          </p:cNvSpPr>
+          <p:nvPr>
+            <p:ph type="title"/>
+          </p:nvPr>
+        </p:nvSpPr>
+        <p:spPr>
+          <a:xfrm>
+            <a:off x="1451579" y="839244"/>
+            <a:ext cx="9603275" cy="1014510"/>
+          </a:xfrm>
+        </p:spPr>
+        <p:txBody>
+          <a:bodyPr>
+            <a:normAutofit/>
+          </a:bodyPr>
+          <a:lstStyle/>
+          <a:p>
+            <a:pPr algn="ctr"/>
+            <a:r>
+              <a:rPr lang="en-US" sz="3200" b="1" i="0" u="none" strike="noStrike" dirty="0">
+                <a:solidFill>
+                  <a:srgbClr val="000000"/>
+                </a:solidFill>
+                <a:effectLst/>
+                <a:latin typeface="Calibri" panose="020F0502020204030204" pitchFamily="34" charset="0"/>
+                <a:cs typeface="Calibri" panose="020F0502020204030204" pitchFamily="34" charset="0"/>
+              </a:rPr>
+              <a:t>Incremental Hydration </a:t>
+            </a:r>
+            <a:br>
+              <a:rPr lang="en-US" sz="3200" b="1" i="0" u="none" strike="noStrike" dirty="0">
+                <a:solidFill>
+                  <a:srgbClr val="000000"/>
+                </a:solidFill>
+                <a:effectLst/>
+                <a:latin typeface="Calibri" panose="020F0502020204030204" pitchFamily="34" charset="0"/>
+                <a:cs typeface="Calibri" panose="020F0502020204030204" pitchFamily="34" charset="0"/>
+              </a:rPr>
+            </a:br>
+            <a:r>
+              <a:rPr lang="en-US" sz="3200" b="1" i="0" u="none" strike="noStrike" dirty="0">
+                <a:solidFill>
+                  <a:srgbClr val="000000"/>
+                </a:solidFill>
+                <a:effectLst/>
+                <a:latin typeface="Calibri" panose="020F0502020204030204" pitchFamily="34" charset="0"/>
+                <a:cs typeface="Calibri" panose="020F0502020204030204" pitchFamily="34" charset="0"/>
+              </a:rPr>
+              <a:t>(Developer Preview)</a:t>
+            </a:r>
+            <a:endParaRPr lang="en-US" sz="3200" b="0" i="0" u="none" strike="noStrike" dirty="0">
+              <a:solidFill>
+                <a:srgbClr val="000000"/>
+              </a:solidFill>
+              <a:effectLst/>
+              <a:latin typeface="Calibri" panose="020F0502020204030204" pitchFamily="34" charset="0"/>
+              <a:cs typeface="Calibri" panose="020F0502020204030204" pitchFamily="34" charset="0"/>
+            </a:endParaRPr>
+          </a:p>
+        </p:txBody>
+      </p:sp>
+      <p:pic>
+        <p:nvPicPr>
+          <p:cNvPr id="5" name="Content Placeholder 4" descr="A diagram of a diagram&#10;&#10;AI-generated content may be incorrect.">
+            <a:extLst>
+              <a:ext uri="{FF2B5EF4-FFF2-40B4-BE49-F238E27FC236}">
+                <a16:creationId xmlns:a16="http://schemas.microsoft.com/office/drawing/2014/main" id="{A4942130-F11C-F446-5F2F-A6D38726A240}"/>
+              </a:ext>
+            </a:extLst>
+          </p:cNvPr>
+          <p:cNvPicPr>
+            <a:picLocks noGrp="1" noChangeAspect="1"/>
+          </p:cNvPicPr>
+          <p:nvPr>
+            <p:ph idx="1"/>
+          </p:nvPr>
+        </p:nvPicPr>
+        <p:blipFill>
+          <a:blip r:embed="rId2"/>
+          <a:stretch>
+            <a:fillRect/>
+          </a:stretch>
+        </p:blipFill>
+        <p:spPr>
+          <a:xfrm>
+            <a:off x="1402737" y="1853754"/>
+            <a:ext cx="9603274" cy="3820376"/>
+          </a:xfrm>
+        </p:spPr>
+      </p:pic>
+    </p:spTree>
+    <p:extLst>
+      <p:ext uri="{BB962C8B-B14F-4D97-AF65-F5344CB8AC3E}">
+        <p14:creationId xmlns:p14="http://schemas.microsoft.com/office/powerpoint/2010/main" val="4204289877"/>
       </p:ext>
     </p:extLst>
   </p:cSld>
@@ -5908,4 +8414,319 @@
     </a:ext>
   </a:extLst>
 </a:theme>
+</file>
+
+<file path=ppt/theme/theme2.xml><?xml version="1.0" encoding="utf-8"?>
+<a:theme xmlns:a="http://schemas.openxmlformats.org/drawingml/2006/main" name="Office Theme">
+  <a:themeElements>
+    <a:clrScheme name="Office">
+      <a:dk1>
+        <a:sysClr val="windowText" lastClr="000000"/>
+      </a:dk1>
+      <a:lt1>
+        <a:sysClr val="window" lastClr="FFFFFF"/>
+      </a:lt1>
+      <a:dk2>
+        <a:srgbClr val="0E2841"/>
+      </a:dk2>
+      <a:lt2>
+        <a:srgbClr val="E8E8E8"/>
+      </a:lt2>
+      <a:accent1>
+        <a:srgbClr val="156082"/>
+      </a:accent1>
+      <a:accent2>
+        <a:srgbClr val="E97132"/>
+      </a:accent2>
+      <a:accent3>
+        <a:srgbClr val="196B24"/>
+      </a:accent3>
+      <a:accent4>
+        <a:srgbClr val="0F9ED5"/>
+      </a:accent4>
+      <a:accent5>
+        <a:srgbClr val="A02B93"/>
+      </a:accent5>
+      <a:accent6>
+        <a:srgbClr val="4EA72E"/>
+      </a:accent6>
+      <a:hlink>
+        <a:srgbClr val="467886"/>
+      </a:hlink>
+      <a:folHlink>
+        <a:srgbClr val="96607D"/>
+      </a:folHlink>
+    </a:clrScheme>
+    <a:fontScheme name="Office">
+      <a:majorFont>
+        <a:latin typeface="Aptos Display" panose="02110004020202020204"/>
+        <a:ea typeface=""/>
+        <a:cs typeface=""/>
+        <a:font script="Jpan" typeface="游ゴシック Light"/>
+        <a:font script="Hang" typeface="맑은 고딕"/>
+        <a:font script="Hans" typeface="等线 Light"/>
+        <a:font script="Hant" typeface="新細明體"/>
+        <a:font script="Arab" typeface="Times New Roman"/>
+        <a:font script="Hebr" typeface="Times New Roman"/>
+        <a:font script="Thai" typeface="Angsana New"/>
+        <a:font script="Ethi" typeface="Nyala"/>
+        <a:font script="Beng" typeface="Vrinda"/>
+        <a:font script="Gujr" typeface="Shruti"/>
+        <a:font script="Khmr" typeface="MoolBoran"/>
+        <a:font script="Knda" typeface="Tunga"/>
+        <a:font script="Guru" typeface="Raavi"/>
+        <a:font script="Cans" typeface="Euphemia"/>
+        <a:font script="Cher" typeface="Plantagenet Cherokee"/>
+        <a:font script="Yiii" typeface="Microsoft Yi Baiti"/>
+        <a:font script="Tibt" typeface="Microsoft Himalaya"/>
+        <a:font script="Thaa" typeface="MV Boli"/>
+        <a:font script="Deva" typeface="Mangal"/>
+        <a:font script="Telu" typeface="Gautami"/>
+        <a:font script="Taml" typeface="Latha"/>
+        <a:font script="Syrc" typeface="Estrangelo Edessa"/>
+        <a:font script="Orya" typeface="Kalinga"/>
+        <a:font script="Mlym" typeface="Kartika"/>
+        <a:font script="Laoo" typeface="DokChampa"/>
+        <a:font script="Sinh" typeface="Iskoola Pota"/>
+        <a:font script="Mong" typeface="Mongolian Baiti"/>
+        <a:font script="Viet" typeface="Times New Roman"/>
+        <a:font script="Uigh" typeface="Microsoft Uighur"/>
+        <a:font script="Geor" typeface="Sylfaen"/>
+        <a:font script="Armn" typeface="Arial"/>
+        <a:font script="Bugi" typeface="Leelawadee UI"/>
+        <a:font script="Bopo" typeface="Microsoft JhengHei"/>
+        <a:font script="Java" typeface="Javanese Text"/>
+        <a:font script="Lisu" typeface="Segoe UI"/>
+        <a:font script="Mymr" typeface="Myanmar Text"/>
+        <a:font script="Nkoo" typeface="Ebrima"/>
+        <a:font script="Olck" typeface="Nirmala UI"/>
+        <a:font script="Osma" typeface="Ebrima"/>
+        <a:font script="Phag" typeface="Phagspa"/>
+        <a:font script="Syrn" typeface="Estrangelo Edessa"/>
+        <a:font script="Syrj" typeface="Estrangelo Edessa"/>
+        <a:font script="Syre" typeface="Estrangelo Edessa"/>
+        <a:font script="Sora" typeface="Nirmala UI"/>
+        <a:font script="Tale" typeface="Microsoft Tai Le"/>
+        <a:font script="Talu" typeface="Microsoft New Tai Lue"/>
+        <a:font script="Tfng" typeface="Ebrima"/>
+      </a:majorFont>
+      <a:minorFont>
+        <a:latin typeface="Aptos" panose="02110004020202020204"/>
+        <a:ea typeface=""/>
+        <a:cs typeface=""/>
+        <a:font script="Jpan" typeface="游ゴシック"/>
+        <a:font script="Hang" typeface="맑은 고딕"/>
+        <a:font script="Hans" typeface="等线"/>
+        <a:font script="Hant" typeface="新細明體"/>
+        <a:font script="Arab" typeface="Arial"/>
+        <a:font script="Hebr" typeface="Arial"/>
+        <a:font script="Thai" typeface="Cordia New"/>
+        <a:font script="Ethi" typeface="Nyala"/>
+        <a:font script="Beng" typeface="Vrinda"/>
+        <a:font script="Gujr" typeface="Shruti"/>
+        <a:font script="Khmr" typeface="DaunPenh"/>
+        <a:font script="Knda" typeface="Tunga"/>
+        <a:font script="Guru" typeface="Raavi"/>
+        <a:font script="Cans" typeface="Euphemia"/>
+        <a:font script="Cher" typeface="Plantagenet Cherokee"/>
+        <a:font script="Yiii" typeface="Microsoft Yi Baiti"/>
+        <a:font script="Tibt" typeface="Microsoft Himalaya"/>
+        <a:font script="Thaa" typeface="MV Boli"/>
+        <a:font script="Deva" typeface="Mangal"/>
+        <a:font script="Telu" typeface="Gautami"/>
+        <a:font script="Taml" typeface="Latha"/>
+        <a:font script="Syrc" typeface="Estrangelo Edessa"/>
+        <a:font script="Orya" typeface="Kalinga"/>
+        <a:font script="Mlym" typeface="Kartika"/>
+        <a:font script="Laoo" typeface="DokChampa"/>
+        <a:font script="Sinh" typeface="Iskoola Pota"/>
+        <a:font script="Mong" typeface="Mongolian Baiti"/>
+        <a:font script="Viet" typeface="Arial"/>
+        <a:font script="Uigh" typeface="Microsoft Uighur"/>
+        <a:font script="Geor" typeface="Sylfaen"/>
+        <a:font script="Armn" typeface="Arial"/>
+        <a:font script="Bugi" typeface="Leelawadee UI"/>
+        <a:font script="Bopo" typeface="Microsoft JhengHei"/>
+        <a:font script="Java" typeface="Javanese Text"/>
+        <a:font script="Lisu" typeface="Segoe UI"/>
+        <a:font script="Mymr" typeface="Myanmar Text"/>
+        <a:font script="Nkoo" typeface="Ebrima"/>
+        <a:font script="Olck" typeface="Nirmala UI"/>
+        <a:font script="Osma" typeface="Ebrima"/>
+        <a:font script="Phag" typeface="Phagspa"/>
+        <a:font script="Syrn" typeface="Estrangelo Edessa"/>
+        <a:font script="Syrj" typeface="Estrangelo Edessa"/>
+        <a:font script="Syre" typeface="Estrangelo Edessa"/>
+        <a:font script="Sora" typeface="Nirmala UI"/>
+        <a:font script="Tale" typeface="Microsoft Tai Le"/>
+        <a:font script="Talu" typeface="Microsoft New Tai Lue"/>
+        <a:font script="Tfng" typeface="Ebrima"/>
+      </a:minorFont>
+    </a:fontScheme>
+    <a:fmtScheme name="Office">
+      <a:fillStyleLst>
+        <a:solidFill>
+          <a:schemeClr val="phClr"/>
+        </a:solidFill>
+        <a:gradFill rotWithShape="1">
+          <a:gsLst>
+            <a:gs pos="0">
+              <a:schemeClr val="phClr">
+                <a:lumMod val="110000"/>
+                <a:satMod val="105000"/>
+                <a:tint val="67000"/>
+              </a:schemeClr>
+            </a:gs>
+            <a:gs pos="50000">
+              <a:schemeClr val="phClr">
+                <a:lumMod val="105000"/>
+                <a:satMod val="103000"/>
+                <a:tint val="73000"/>
+              </a:schemeClr>
+            </a:gs>
+            <a:gs pos="100000">
+              <a:schemeClr val="phClr">
+                <a:lumMod val="105000"/>
+                <a:satMod val="109000"/>
+                <a:tint val="81000"/>
+              </a:schemeClr>
+            </a:gs>
+          </a:gsLst>
+          <a:lin ang="5400000" scaled="0"/>
+        </a:gradFill>
+        <a:gradFill rotWithShape="1">
+          <a:gsLst>
+            <a:gs pos="0">
+              <a:schemeClr val="phClr">
+                <a:satMod val="103000"/>
+                <a:lumMod val="102000"/>
+                <a:tint val="94000"/>
+              </a:schemeClr>
+            </a:gs>
+            <a:gs pos="50000">
+              <a:schemeClr val="phClr">
+                <a:satMod val="110000"/>
+                <a:lumMod val="100000"/>
+                <a:shade val="100000"/>
+              </a:schemeClr>
+            </a:gs>
+            <a:gs pos="100000">
+              <a:schemeClr val="phClr">
+                <a:lumMod val="99000"/>
+                <a:satMod val="120000"/>
+                <a:shade val="78000"/>
+              </a:schemeClr>
+            </a:gs>
+          </a:gsLst>
+          <a:lin ang="5400000" scaled="0"/>
+        </a:gradFill>
+      </a:fillStyleLst>
+      <a:lnStyleLst>
+        <a:ln w="12700" cap="flat" cmpd="sng" algn="ctr">
+          <a:solidFill>
+            <a:schemeClr val="phClr"/>
+          </a:solidFill>
+          <a:prstDash val="solid"/>
+          <a:miter lim="800000"/>
+        </a:ln>
+        <a:ln w="19050" cap="flat" cmpd="sng" algn="ctr">
+          <a:solidFill>
+            <a:schemeClr val="phClr"/>
+          </a:solidFill>
+          <a:prstDash val="solid"/>
+          <a:miter lim="800000"/>
+        </a:ln>
+        <a:ln w="25400" cap="flat" cmpd="sng" algn="ctr">
+          <a:solidFill>
+            <a:schemeClr val="phClr"/>
+          </a:solidFill>
+          <a:prstDash val="solid"/>
+          <a:miter lim="800000"/>
+        </a:ln>
+      </a:lnStyleLst>
+      <a:effectStyleLst>
+        <a:effectStyle>
+          <a:effectLst/>
+        </a:effectStyle>
+        <a:effectStyle>
+          <a:effectLst/>
+        </a:effectStyle>
+        <a:effectStyle>
+          <a:effectLst>
+            <a:outerShdw blurRad="57150" dist="19050" dir="5400000" algn="ctr" rotWithShape="0">
+              <a:srgbClr val="000000">
+                <a:alpha val="63000"/>
+              </a:srgbClr>
+            </a:outerShdw>
+          </a:effectLst>
+        </a:effectStyle>
+      </a:effectStyleLst>
+      <a:bgFillStyleLst>
+        <a:solidFill>
+          <a:schemeClr val="phClr"/>
+        </a:solidFill>
+        <a:solidFill>
+          <a:schemeClr val="phClr">
+            <a:tint val="95000"/>
+            <a:satMod val="170000"/>
+          </a:schemeClr>
+        </a:solidFill>
+        <a:gradFill rotWithShape="1">
+          <a:gsLst>
+            <a:gs pos="0">
+              <a:schemeClr val="phClr">
+                <a:tint val="93000"/>
+                <a:satMod val="150000"/>
+                <a:shade val="98000"/>
+                <a:lumMod val="102000"/>
+              </a:schemeClr>
+            </a:gs>
+            <a:gs pos="50000">
+              <a:schemeClr val="phClr">
+                <a:tint val="98000"/>
+                <a:satMod val="130000"/>
+                <a:shade val="90000"/>
+                <a:lumMod val="103000"/>
+              </a:schemeClr>
+            </a:gs>
+            <a:gs pos="100000">
+              <a:schemeClr val="phClr">
+                <a:shade val="63000"/>
+                <a:satMod val="120000"/>
+              </a:schemeClr>
+            </a:gs>
+          </a:gsLst>
+          <a:lin ang="5400000" scaled="0"/>
+        </a:gradFill>
+      </a:bgFillStyleLst>
+    </a:fmtScheme>
+  </a:themeElements>
+  <a:objectDefaults>
+    <a:lnDef>
+      <a:spPr/>
+      <a:bodyPr/>
+      <a:lstStyle/>
+      <a:style>
+        <a:lnRef idx="2">
+          <a:schemeClr val="accent1"/>
+        </a:lnRef>
+        <a:fillRef idx="0">
+          <a:schemeClr val="accent1"/>
+        </a:fillRef>
+        <a:effectRef idx="1">
+          <a:schemeClr val="accent1"/>
+        </a:effectRef>
+        <a:fontRef idx="minor">
+          <a:schemeClr val="tx1"/>
+        </a:fontRef>
+      </a:style>
+    </a:lnDef>
+  </a:objectDefaults>
+  <a:extraClrSchemeLst/>
+  <a:extLst>
+    <a:ext uri="{05A4C25C-085E-4340-85A3-A5531E510DB2}">
+      <thm15:themeFamily xmlns:thm15="http://schemas.microsoft.com/office/thememl/2012/main" name="Office Theme" id="{2E142A2C-CD16-42D6-873A-C26D2A0506FA}" vid="{1BDDFF52-6CD6-40A5-AB3C-68EB2F1E4D0A}"/>
+    </a:ext>
+  </a:extLst>
+</a:theme>
 </file>
</xml_diff>